<commit_message>
Updated the documentation in the developer's guide, to account for updates in the EnrolledClass Person attribute, as well as the new sorting feature of persons in the address book
</commit_message>
<xml_diff>
--- a/docs/diagrams/ModelComponentClassBetterOopDiagram.pptx
+++ b/docs/diagrams/ModelComponentClassBetterOopDiagram.pptx
@@ -208,7 +208,7 @@
           <a:p>
             <a:fld id="{F5CC4B3F-88C1-4FFA-B1B6-F41C21DC6924}" type="datetimeFigureOut">
               <a:rPr lang="en-US" smtClean="0"/>
-              <a:t>6/27/2018</a:t>
+              <a:t>10/16/18</a:t>
             </a:fld>
             <a:endParaRPr lang="en-US"/>
           </a:p>
@@ -654,7 +654,7 @@
           <a:p>
             <a:fld id="{78C97017-6FC3-485B-9764-EAC9E56C1D49}" type="datetimeFigureOut">
               <a:rPr lang="en-US" smtClean="0"/>
-              <a:t>6/27/2018</a:t>
+              <a:t>10/16/18</a:t>
             </a:fld>
             <a:endParaRPr lang="en-US"/>
           </a:p>
@@ -822,7 +822,7 @@
           <a:p>
             <a:fld id="{78C97017-6FC3-485B-9764-EAC9E56C1D49}" type="datetimeFigureOut">
               <a:rPr lang="en-US" smtClean="0"/>
-              <a:t>6/27/2018</a:t>
+              <a:t>10/16/18</a:t>
             </a:fld>
             <a:endParaRPr lang="en-US"/>
           </a:p>
@@ -1000,7 +1000,7 @@
           <a:p>
             <a:fld id="{78C97017-6FC3-485B-9764-EAC9E56C1D49}" type="datetimeFigureOut">
               <a:rPr lang="en-US" smtClean="0"/>
-              <a:t>6/27/2018</a:t>
+              <a:t>10/16/18</a:t>
             </a:fld>
             <a:endParaRPr lang="en-US"/>
           </a:p>
@@ -1168,7 +1168,7 @@
           <a:p>
             <a:fld id="{78C97017-6FC3-485B-9764-EAC9E56C1D49}" type="datetimeFigureOut">
               <a:rPr lang="en-US" smtClean="0"/>
-              <a:t>6/27/2018</a:t>
+              <a:t>10/16/18</a:t>
             </a:fld>
             <a:endParaRPr lang="en-US"/>
           </a:p>
@@ -1413,7 +1413,7 @@
           <a:p>
             <a:fld id="{78C97017-6FC3-485B-9764-EAC9E56C1D49}" type="datetimeFigureOut">
               <a:rPr lang="en-US" smtClean="0"/>
-              <a:t>6/27/2018</a:t>
+              <a:t>10/16/18</a:t>
             </a:fld>
             <a:endParaRPr lang="en-US"/>
           </a:p>
@@ -1698,7 +1698,7 @@
           <a:p>
             <a:fld id="{78C97017-6FC3-485B-9764-EAC9E56C1D49}" type="datetimeFigureOut">
               <a:rPr lang="en-US" smtClean="0"/>
-              <a:t>6/27/2018</a:t>
+              <a:t>10/16/18</a:t>
             </a:fld>
             <a:endParaRPr lang="en-US"/>
           </a:p>
@@ -2117,7 +2117,7 @@
           <a:p>
             <a:fld id="{78C97017-6FC3-485B-9764-EAC9E56C1D49}" type="datetimeFigureOut">
               <a:rPr lang="en-US" smtClean="0"/>
-              <a:t>6/27/2018</a:t>
+              <a:t>10/16/18</a:t>
             </a:fld>
             <a:endParaRPr lang="en-US"/>
           </a:p>
@@ -2234,7 +2234,7 @@
           <a:p>
             <a:fld id="{78C97017-6FC3-485B-9764-EAC9E56C1D49}" type="datetimeFigureOut">
               <a:rPr lang="en-US" smtClean="0"/>
-              <a:t>6/27/2018</a:t>
+              <a:t>10/16/18</a:t>
             </a:fld>
             <a:endParaRPr lang="en-US"/>
           </a:p>
@@ -2329,7 +2329,7 @@
           <a:p>
             <a:fld id="{78C97017-6FC3-485B-9764-EAC9E56C1D49}" type="datetimeFigureOut">
               <a:rPr lang="en-US" smtClean="0"/>
-              <a:t>6/27/2018</a:t>
+              <a:t>10/16/18</a:t>
             </a:fld>
             <a:endParaRPr lang="en-US"/>
           </a:p>
@@ -2604,7 +2604,7 @@
           <a:p>
             <a:fld id="{78C97017-6FC3-485B-9764-EAC9E56C1D49}" type="datetimeFigureOut">
               <a:rPr lang="en-US" smtClean="0"/>
-              <a:t>6/27/2018</a:t>
+              <a:t>10/16/18</a:t>
             </a:fld>
             <a:endParaRPr lang="en-US"/>
           </a:p>
@@ -2856,7 +2856,7 @@
           <a:p>
             <a:fld id="{78C97017-6FC3-485B-9764-EAC9E56C1D49}" type="datetimeFigureOut">
               <a:rPr lang="en-US" smtClean="0"/>
-              <a:t>6/27/2018</a:t>
+              <a:t>10/16/18</a:t>
             </a:fld>
             <a:endParaRPr lang="en-US"/>
           </a:p>
@@ -3067,7 +3067,7 @@
           <a:p>
             <a:fld id="{78C97017-6FC3-485B-9764-EAC9E56C1D49}" type="datetimeFigureOut">
               <a:rPr lang="en-US" smtClean="0"/>
-              <a:t>6/27/2018</a:t>
+              <a:t>10/16/18</a:t>
             </a:fld>
             <a:endParaRPr lang="en-US"/>
           </a:p>
@@ -3992,7 +3992,7 @@
           <a:p>
             <a:pPr algn="ctr"/>
             <a:r>
-              <a:rPr lang="en-US" sz="1050" dirty="0" err="1" smtClean="0">
+              <a:rPr lang="en-US" sz="1050" dirty="0" err="1">
                 <a:solidFill>
                   <a:srgbClr val="7030A0"/>
                 </a:solidFill>
@@ -4421,14 +4421,14 @@
           <a:p>
             <a:pPr algn="ctr"/>
             <a:r>
-              <a:rPr lang="en-US" sz="1050" dirty="0">
+              <a:rPr lang="en-US" sz="750" dirty="0">
                 <a:solidFill>
                   <a:srgbClr val="7030A0"/>
                 </a:solidFill>
               </a:rPr>
               <a:t>Name</a:t>
             </a:r>
-            <a:endParaRPr lang="en-SG" sz="1050" dirty="0">
+            <a:endParaRPr lang="en-SG" sz="750" dirty="0">
               <a:solidFill>
                 <a:srgbClr val="7030A0"/>
               </a:solidFill>
@@ -4564,14 +4564,14 @@
           <a:p>
             <a:pPr algn="ctr"/>
             <a:r>
-              <a:rPr lang="en-US" sz="1050" dirty="0">
+              <a:rPr lang="en-US" sz="750" dirty="0">
                 <a:solidFill>
                   <a:srgbClr val="7030A0"/>
                 </a:solidFill>
               </a:rPr>
               <a:t>Phone</a:t>
             </a:r>
-            <a:endParaRPr lang="en-SG" sz="1050" dirty="0">
+            <a:endParaRPr lang="en-SG" sz="750" dirty="0">
               <a:solidFill>
                 <a:srgbClr val="7030A0"/>
               </a:solidFill>
@@ -4661,14 +4661,14 @@
           <a:p>
             <a:pPr algn="ctr"/>
             <a:r>
-              <a:rPr lang="en-US" sz="1050" dirty="0">
+              <a:rPr lang="en-US" sz="750" dirty="0">
                 <a:solidFill>
                   <a:srgbClr val="7030A0"/>
                 </a:solidFill>
               </a:rPr>
               <a:t>Email</a:t>
             </a:r>
-            <a:endParaRPr lang="en-SG" sz="1050" dirty="0">
+            <a:endParaRPr lang="en-SG" sz="750" dirty="0">
               <a:solidFill>
                 <a:srgbClr val="7030A0"/>
               </a:solidFill>
@@ -4758,14 +4758,14 @@
           <a:p>
             <a:pPr algn="ctr"/>
             <a:r>
-              <a:rPr lang="en-US" sz="1050" dirty="0">
+              <a:rPr lang="en-US" sz="750" dirty="0">
                 <a:solidFill>
                   <a:srgbClr val="7030A0"/>
                 </a:solidFill>
               </a:rPr>
               <a:t>Address</a:t>
             </a:r>
-            <a:endParaRPr lang="en-SG" sz="1050" dirty="0">
+            <a:endParaRPr lang="en-SG" sz="750" dirty="0">
               <a:solidFill>
                 <a:srgbClr val="7030A0"/>
               </a:solidFill>
@@ -4900,14 +4900,6 @@
                 </a:solidFill>
               </a:rPr>
               <a:t>&lt;&lt;interface&gt;&gt;</a:t>
-            </a:r>
-            <a:r>
-              <a:rPr lang="en-US" sz="1050">
-                <a:solidFill>
-                  <a:srgbClr val="7030A0"/>
-                </a:solidFill>
-              </a:rPr>
-              <a:t/>
             </a:r>
             <a:br>
               <a:rPr lang="en-US" sz="1050">
@@ -5991,6 +5983,160 @@
           </a:fontRef>
         </p:style>
       </p:cxnSp>
+      <p:sp>
+        <p:nvSpPr>
+          <p:cNvPr id="56" name="Rectangle 8">
+            <a:extLst>
+              <a:ext uri="{FF2B5EF4-FFF2-40B4-BE49-F238E27FC236}">
+                <a16:creationId xmlns:a16="http://schemas.microsoft.com/office/drawing/2014/main" id="{189FCC6B-9B90-0446-9C53-F4E5F143E74F}"/>
+              </a:ext>
+            </a:extLst>
+          </p:cNvPr>
+          <p:cNvSpPr/>
+          <p:nvPr/>
+        </p:nvSpPr>
+        <p:spPr>
+          <a:xfrm>
+            <a:off x="7709338" y="2237286"/>
+            <a:ext cx="708186" cy="285783"/>
+          </a:xfrm>
+          <a:prstGeom prst="rect">
+            <a:avLst/>
+          </a:prstGeom>
+          <a:ln w="19050">
+            <a:solidFill>
+              <a:srgbClr val="7030A0"/>
+            </a:solidFill>
+          </a:ln>
+          <a:effectLst/>
+        </p:spPr>
+        <p:style>
+          <a:lnRef idx="1">
+            <a:schemeClr val="accent4"/>
+          </a:lnRef>
+          <a:fillRef idx="2">
+            <a:schemeClr val="accent4"/>
+          </a:fillRef>
+          <a:effectRef idx="1">
+            <a:schemeClr val="accent4"/>
+          </a:effectRef>
+          <a:fontRef idx="minor">
+            <a:schemeClr val="dk1"/>
+          </a:fontRef>
+        </p:style>
+        <p:txBody>
+          <a:bodyPr rtlCol="0" anchor="ctr"/>
+          <a:lstStyle/>
+          <a:p>
+            <a:pPr algn="ctr"/>
+            <a:r>
+              <a:rPr lang="en-US" sz="750" dirty="0" err="1">
+                <a:solidFill>
+                  <a:srgbClr val="7030A0"/>
+                </a:solidFill>
+              </a:rPr>
+              <a:t>EnrolledClass</a:t>
+            </a:r>
+            <a:endParaRPr lang="en-SG" sz="750" dirty="0">
+              <a:solidFill>
+                <a:srgbClr val="7030A0"/>
+              </a:solidFill>
+            </a:endParaRPr>
+          </a:p>
+        </p:txBody>
+      </p:sp>
+      <p:cxnSp>
+        <p:nvCxnSpPr>
+          <p:cNvPr id="6" name="Elbow Connector 5">
+            <a:extLst>
+              <a:ext uri="{FF2B5EF4-FFF2-40B4-BE49-F238E27FC236}">
+                <a16:creationId xmlns:a16="http://schemas.microsoft.com/office/drawing/2014/main" id="{E61B193B-4D2B-8F47-A6AF-BA767E451244}"/>
+              </a:ext>
+            </a:extLst>
+          </p:cNvPr>
+          <p:cNvCxnSpPr>
+            <a:stCxn id="78" idx="3"/>
+            <a:endCxn id="56" idx="1"/>
+          </p:cNvCxnSpPr>
+          <p:nvPr/>
+        </p:nvCxnSpPr>
+        <p:spPr>
+          <a:xfrm flipV="1">
+            <a:off x="7277995" y="2380178"/>
+            <a:ext cx="431343" cy="654713"/>
+          </a:xfrm>
+          <a:prstGeom prst="bentConnector3">
+            <a:avLst/>
+          </a:prstGeom>
+          <a:ln w="19050">
+            <a:solidFill>
+              <a:srgbClr val="7030A0"/>
+            </a:solidFill>
+            <a:headEnd type="none" w="med" len="med"/>
+            <a:tailEnd type="arrow" w="med" len="med"/>
+          </a:ln>
+          <a:effectLst/>
+        </p:spPr>
+        <p:style>
+          <a:lnRef idx="1">
+            <a:schemeClr val="accent2"/>
+          </a:lnRef>
+          <a:fillRef idx="2">
+            <a:schemeClr val="accent2"/>
+          </a:fillRef>
+          <a:effectRef idx="1">
+            <a:schemeClr val="accent2"/>
+          </a:effectRef>
+          <a:fontRef idx="minor">
+            <a:schemeClr val="dk1"/>
+          </a:fontRef>
+        </p:style>
+      </p:cxnSp>
+      <p:sp>
+        <p:nvSpPr>
+          <p:cNvPr id="60" name="TextBox 59">
+            <a:extLst>
+              <a:ext uri="{FF2B5EF4-FFF2-40B4-BE49-F238E27FC236}">
+                <a16:creationId xmlns:a16="http://schemas.microsoft.com/office/drawing/2014/main" id="{058B5FA9-7A55-3842-9144-5EB87D212ADF}"/>
+              </a:ext>
+            </a:extLst>
+          </p:cNvPr>
+          <p:cNvSpPr txBox="1"/>
+          <p:nvPr/>
+        </p:nvSpPr>
+        <p:spPr>
+          <a:xfrm>
+            <a:off x="7458905" y="2240908"/>
+            <a:ext cx="189257" cy="178683"/>
+          </a:xfrm>
+          <a:prstGeom prst="rect">
+            <a:avLst/>
+          </a:prstGeom>
+          <a:noFill/>
+        </p:spPr>
+        <p:txBody>
+          <a:bodyPr wrap="square" lIns="0" tIns="0" rIns="0" bIns="0" rtlCol="0">
+            <a:noAutofit/>
+          </a:bodyPr>
+          <a:lstStyle/>
+          <a:p>
+            <a:pPr algn="ctr"/>
+            <a:r>
+              <a:rPr lang="en-US" sz="1100" dirty="0">
+                <a:solidFill>
+                  <a:srgbClr val="7030A0"/>
+                </a:solidFill>
+              </a:rPr>
+              <a:t>*</a:t>
+            </a:r>
+            <a:endParaRPr lang="en-SG" sz="1100" dirty="0">
+              <a:solidFill>
+                <a:srgbClr val="7030A0"/>
+              </a:solidFill>
+            </a:endParaRPr>
+          </a:p>
+        </p:txBody>
+      </p:sp>
     </p:spTree>
     <p:extLst>
       <p:ext uri="{BB962C8B-B14F-4D97-AF65-F5344CB8AC3E}">

</xml_diff>

<commit_message>
documentation & diagram changes
</commit_message>
<xml_diff>
--- a/docs/diagrams/ModelComponentClassBetterOopDiagram.pptx
+++ b/docs/diagrams/ModelComponentClassBetterOopDiagram.pptx
@@ -208,7 +208,7 @@
           <a:p>
             <a:fld id="{F5CC4B3F-88C1-4FFA-B1B6-F41C21DC6924}" type="datetimeFigureOut">
               <a:rPr lang="en-US" smtClean="0"/>
-              <a:t>6/27/2018</a:t>
+              <a:t>10/16/2018</a:t>
             </a:fld>
             <a:endParaRPr lang="en-US"/>
           </a:p>
@@ -654,7 +654,7 @@
           <a:p>
             <a:fld id="{78C97017-6FC3-485B-9764-EAC9E56C1D49}" type="datetimeFigureOut">
               <a:rPr lang="en-US" smtClean="0"/>
-              <a:t>6/27/2018</a:t>
+              <a:t>10/16/2018</a:t>
             </a:fld>
             <a:endParaRPr lang="en-US"/>
           </a:p>
@@ -822,7 +822,7 @@
           <a:p>
             <a:fld id="{78C97017-6FC3-485B-9764-EAC9E56C1D49}" type="datetimeFigureOut">
               <a:rPr lang="en-US" smtClean="0"/>
-              <a:t>6/27/2018</a:t>
+              <a:t>10/16/2018</a:t>
             </a:fld>
             <a:endParaRPr lang="en-US"/>
           </a:p>
@@ -1000,7 +1000,7 @@
           <a:p>
             <a:fld id="{78C97017-6FC3-485B-9764-EAC9E56C1D49}" type="datetimeFigureOut">
               <a:rPr lang="en-US" smtClean="0"/>
-              <a:t>6/27/2018</a:t>
+              <a:t>10/16/2018</a:t>
             </a:fld>
             <a:endParaRPr lang="en-US"/>
           </a:p>
@@ -1168,7 +1168,7 @@
           <a:p>
             <a:fld id="{78C97017-6FC3-485B-9764-EAC9E56C1D49}" type="datetimeFigureOut">
               <a:rPr lang="en-US" smtClean="0"/>
-              <a:t>6/27/2018</a:t>
+              <a:t>10/16/2018</a:t>
             </a:fld>
             <a:endParaRPr lang="en-US"/>
           </a:p>
@@ -1413,7 +1413,7 @@
           <a:p>
             <a:fld id="{78C97017-6FC3-485B-9764-EAC9E56C1D49}" type="datetimeFigureOut">
               <a:rPr lang="en-US" smtClean="0"/>
-              <a:t>6/27/2018</a:t>
+              <a:t>10/16/2018</a:t>
             </a:fld>
             <a:endParaRPr lang="en-US"/>
           </a:p>
@@ -1698,7 +1698,7 @@
           <a:p>
             <a:fld id="{78C97017-6FC3-485B-9764-EAC9E56C1D49}" type="datetimeFigureOut">
               <a:rPr lang="en-US" smtClean="0"/>
-              <a:t>6/27/2018</a:t>
+              <a:t>10/16/2018</a:t>
             </a:fld>
             <a:endParaRPr lang="en-US"/>
           </a:p>
@@ -2117,7 +2117,7 @@
           <a:p>
             <a:fld id="{78C97017-6FC3-485B-9764-EAC9E56C1D49}" type="datetimeFigureOut">
               <a:rPr lang="en-US" smtClean="0"/>
-              <a:t>6/27/2018</a:t>
+              <a:t>10/16/2018</a:t>
             </a:fld>
             <a:endParaRPr lang="en-US"/>
           </a:p>
@@ -2234,7 +2234,7 @@
           <a:p>
             <a:fld id="{78C97017-6FC3-485B-9764-EAC9E56C1D49}" type="datetimeFigureOut">
               <a:rPr lang="en-US" smtClean="0"/>
-              <a:t>6/27/2018</a:t>
+              <a:t>10/16/2018</a:t>
             </a:fld>
             <a:endParaRPr lang="en-US"/>
           </a:p>
@@ -2329,7 +2329,7 @@
           <a:p>
             <a:fld id="{78C97017-6FC3-485B-9764-EAC9E56C1D49}" type="datetimeFigureOut">
               <a:rPr lang="en-US" smtClean="0"/>
-              <a:t>6/27/2018</a:t>
+              <a:t>10/16/2018</a:t>
             </a:fld>
             <a:endParaRPr lang="en-US"/>
           </a:p>
@@ -2604,7 +2604,7 @@
           <a:p>
             <a:fld id="{78C97017-6FC3-485B-9764-EAC9E56C1D49}" type="datetimeFigureOut">
               <a:rPr lang="en-US" smtClean="0"/>
-              <a:t>6/27/2018</a:t>
+              <a:t>10/16/2018</a:t>
             </a:fld>
             <a:endParaRPr lang="en-US"/>
           </a:p>
@@ -2856,7 +2856,7 @@
           <a:p>
             <a:fld id="{78C97017-6FC3-485B-9764-EAC9E56C1D49}" type="datetimeFigureOut">
               <a:rPr lang="en-US" smtClean="0"/>
-              <a:t>6/27/2018</a:t>
+              <a:t>10/16/2018</a:t>
             </a:fld>
             <a:endParaRPr lang="en-US"/>
           </a:p>
@@ -3067,7 +3067,7 @@
           <a:p>
             <a:fld id="{78C97017-6FC3-485B-9764-EAC9E56C1D49}" type="datetimeFigureOut">
               <a:rPr lang="en-US" smtClean="0"/>
-              <a:t>6/27/2018</a:t>
+              <a:t>10/16/2018</a:t>
             </a:fld>
             <a:endParaRPr lang="en-US"/>
           </a:p>
@@ -3992,7 +3992,7 @@
           <a:p>
             <a:pPr algn="ctr"/>
             <a:r>
-              <a:rPr lang="en-US" sz="1050" dirty="0" err="1" smtClean="0">
+              <a:rPr lang="en-US" sz="1050" dirty="0" err="1">
                 <a:solidFill>
                   <a:srgbClr val="7030A0"/>
                 </a:solidFill>
@@ -4900,14 +4900,6 @@
                 </a:solidFill>
               </a:rPr>
               <a:t>&lt;&lt;interface&gt;&gt;</a:t>
-            </a:r>
-            <a:r>
-              <a:rPr lang="en-US" sz="1050">
-                <a:solidFill>
-                  <a:srgbClr val="7030A0"/>
-                </a:solidFill>
-              </a:rPr>
-              <a:t/>
             </a:r>
             <a:br>
               <a:rPr lang="en-US" sz="1050">

</xml_diff>

<commit_message>
Refactored enrolledClass, changing all usages of the word class to modules.  This is to be coherent with Michael's usage of the word "mod" in the download function.
</commit_message>
<xml_diff>
--- a/docs/diagrams/ModelComponentClassBetterOopDiagram.pptx
+++ b/docs/diagrams/ModelComponentClassBetterOopDiagram.pptx
@@ -208,7 +208,7 @@
           <a:p>
             <a:fld id="{F5CC4B3F-88C1-4FFA-B1B6-F41C21DC6924}" type="datetimeFigureOut">
               <a:rPr lang="en-US" smtClean="0"/>
-              <a:t>10/16/18</a:t>
+              <a:t>10/23/18</a:t>
             </a:fld>
             <a:endParaRPr lang="en-US"/>
           </a:p>
@@ -654,7 +654,7 @@
           <a:p>
             <a:fld id="{78C97017-6FC3-485B-9764-EAC9E56C1D49}" type="datetimeFigureOut">
               <a:rPr lang="en-US" smtClean="0"/>
-              <a:t>10/16/18</a:t>
+              <a:t>10/23/18</a:t>
             </a:fld>
             <a:endParaRPr lang="en-US"/>
           </a:p>
@@ -822,7 +822,7 @@
           <a:p>
             <a:fld id="{78C97017-6FC3-485B-9764-EAC9E56C1D49}" type="datetimeFigureOut">
               <a:rPr lang="en-US" smtClean="0"/>
-              <a:t>10/16/18</a:t>
+              <a:t>10/23/18</a:t>
             </a:fld>
             <a:endParaRPr lang="en-US"/>
           </a:p>
@@ -1000,7 +1000,7 @@
           <a:p>
             <a:fld id="{78C97017-6FC3-485B-9764-EAC9E56C1D49}" type="datetimeFigureOut">
               <a:rPr lang="en-US" smtClean="0"/>
-              <a:t>10/16/18</a:t>
+              <a:t>10/23/18</a:t>
             </a:fld>
             <a:endParaRPr lang="en-US"/>
           </a:p>
@@ -1168,7 +1168,7 @@
           <a:p>
             <a:fld id="{78C97017-6FC3-485B-9764-EAC9E56C1D49}" type="datetimeFigureOut">
               <a:rPr lang="en-US" smtClean="0"/>
-              <a:t>10/16/18</a:t>
+              <a:t>10/23/18</a:t>
             </a:fld>
             <a:endParaRPr lang="en-US"/>
           </a:p>
@@ -1413,7 +1413,7 @@
           <a:p>
             <a:fld id="{78C97017-6FC3-485B-9764-EAC9E56C1D49}" type="datetimeFigureOut">
               <a:rPr lang="en-US" smtClean="0"/>
-              <a:t>10/16/18</a:t>
+              <a:t>10/23/18</a:t>
             </a:fld>
             <a:endParaRPr lang="en-US"/>
           </a:p>
@@ -1698,7 +1698,7 @@
           <a:p>
             <a:fld id="{78C97017-6FC3-485B-9764-EAC9E56C1D49}" type="datetimeFigureOut">
               <a:rPr lang="en-US" smtClean="0"/>
-              <a:t>10/16/18</a:t>
+              <a:t>10/23/18</a:t>
             </a:fld>
             <a:endParaRPr lang="en-US"/>
           </a:p>
@@ -2117,7 +2117,7 @@
           <a:p>
             <a:fld id="{78C97017-6FC3-485B-9764-EAC9E56C1D49}" type="datetimeFigureOut">
               <a:rPr lang="en-US" smtClean="0"/>
-              <a:t>10/16/18</a:t>
+              <a:t>10/23/18</a:t>
             </a:fld>
             <a:endParaRPr lang="en-US"/>
           </a:p>
@@ -2234,7 +2234,7 @@
           <a:p>
             <a:fld id="{78C97017-6FC3-485B-9764-EAC9E56C1D49}" type="datetimeFigureOut">
               <a:rPr lang="en-US" smtClean="0"/>
-              <a:t>10/16/18</a:t>
+              <a:t>10/23/18</a:t>
             </a:fld>
             <a:endParaRPr lang="en-US"/>
           </a:p>
@@ -2329,7 +2329,7 @@
           <a:p>
             <a:fld id="{78C97017-6FC3-485B-9764-EAC9E56C1D49}" type="datetimeFigureOut">
               <a:rPr lang="en-US" smtClean="0"/>
-              <a:t>10/16/18</a:t>
+              <a:t>10/23/18</a:t>
             </a:fld>
             <a:endParaRPr lang="en-US"/>
           </a:p>
@@ -2604,7 +2604,7 @@
           <a:p>
             <a:fld id="{78C97017-6FC3-485B-9764-EAC9E56C1D49}" type="datetimeFigureOut">
               <a:rPr lang="en-US" smtClean="0"/>
-              <a:t>10/16/18</a:t>
+              <a:t>10/23/18</a:t>
             </a:fld>
             <a:endParaRPr lang="en-US"/>
           </a:p>
@@ -2856,7 +2856,7 @@
           <a:p>
             <a:fld id="{78C97017-6FC3-485B-9764-EAC9E56C1D49}" type="datetimeFigureOut">
               <a:rPr lang="en-US" smtClean="0"/>
-              <a:t>10/16/18</a:t>
+              <a:t>10/23/18</a:t>
             </a:fld>
             <a:endParaRPr lang="en-US"/>
           </a:p>
@@ -3067,7 +3067,7 @@
           <a:p>
             <a:fld id="{78C97017-6FC3-485B-9764-EAC9E56C1D49}" type="datetimeFigureOut">
               <a:rPr lang="en-US" smtClean="0"/>
-              <a:t>10/16/18</a:t>
+              <a:t>10/23/18</a:t>
             </a:fld>
             <a:endParaRPr lang="en-US"/>
           </a:p>
@@ -6030,12 +6030,12 @@
           <a:p>
             <a:pPr algn="ctr"/>
             <a:r>
-              <a:rPr lang="en-US" sz="750" dirty="0" err="1">
+              <a:rPr lang="en-US" sz="600" dirty="0" err="1">
                 <a:solidFill>
                   <a:srgbClr val="7030A0"/>
                 </a:solidFill>
               </a:rPr>
-              <a:t>EnrolledClass</a:t>
+              <a:t>EnrolledModule</a:t>
             </a:r>
             <a:endParaRPr lang="en-SG" sz="750" dirty="0">
               <a:solidFill>

</xml_diff>

<commit_message>
Update UG, DG and PPP for v1.4
</commit_message>
<xml_diff>
--- a/docs/diagrams/ModelComponentClassBetterOopDiagram.pptx
+++ b/docs/diagrams/ModelComponentClassBetterOopDiagram.pptx
@@ -208,7 +208,7 @@
           <a:p>
             <a:fld id="{F5CC4B3F-88C1-4FFA-B1B6-F41C21DC6924}" type="datetimeFigureOut">
               <a:rPr lang="en-US" smtClean="0"/>
-              <a:t>11/7/2018</a:t>
+              <a:t>11/12/2018</a:t>
             </a:fld>
             <a:endParaRPr lang="en-US"/>
           </a:p>
@@ -654,7 +654,7 @@
           <a:p>
             <a:fld id="{78C97017-6FC3-485B-9764-EAC9E56C1D49}" type="datetimeFigureOut">
               <a:rPr lang="en-US" smtClean="0"/>
-              <a:t>11/7/2018</a:t>
+              <a:t>11/12/2018</a:t>
             </a:fld>
             <a:endParaRPr lang="en-US"/>
           </a:p>
@@ -822,7 +822,7 @@
           <a:p>
             <a:fld id="{78C97017-6FC3-485B-9764-EAC9E56C1D49}" type="datetimeFigureOut">
               <a:rPr lang="en-US" smtClean="0"/>
-              <a:t>11/7/2018</a:t>
+              <a:t>11/12/2018</a:t>
             </a:fld>
             <a:endParaRPr lang="en-US"/>
           </a:p>
@@ -1000,7 +1000,7 @@
           <a:p>
             <a:fld id="{78C97017-6FC3-485B-9764-EAC9E56C1D49}" type="datetimeFigureOut">
               <a:rPr lang="en-US" smtClean="0"/>
-              <a:t>11/7/2018</a:t>
+              <a:t>11/12/2018</a:t>
             </a:fld>
             <a:endParaRPr lang="en-US"/>
           </a:p>
@@ -1168,7 +1168,7 @@
           <a:p>
             <a:fld id="{78C97017-6FC3-485B-9764-EAC9E56C1D49}" type="datetimeFigureOut">
               <a:rPr lang="en-US" smtClean="0"/>
-              <a:t>11/7/2018</a:t>
+              <a:t>11/12/2018</a:t>
             </a:fld>
             <a:endParaRPr lang="en-US"/>
           </a:p>
@@ -1413,7 +1413,7 @@
           <a:p>
             <a:fld id="{78C97017-6FC3-485B-9764-EAC9E56C1D49}" type="datetimeFigureOut">
               <a:rPr lang="en-US" smtClean="0"/>
-              <a:t>11/7/2018</a:t>
+              <a:t>11/12/2018</a:t>
             </a:fld>
             <a:endParaRPr lang="en-US"/>
           </a:p>
@@ -1698,7 +1698,7 @@
           <a:p>
             <a:fld id="{78C97017-6FC3-485B-9764-EAC9E56C1D49}" type="datetimeFigureOut">
               <a:rPr lang="en-US" smtClean="0"/>
-              <a:t>11/7/2018</a:t>
+              <a:t>11/12/2018</a:t>
             </a:fld>
             <a:endParaRPr lang="en-US"/>
           </a:p>
@@ -2117,7 +2117,7 @@
           <a:p>
             <a:fld id="{78C97017-6FC3-485B-9764-EAC9E56C1D49}" type="datetimeFigureOut">
               <a:rPr lang="en-US" smtClean="0"/>
-              <a:t>11/7/2018</a:t>
+              <a:t>11/12/2018</a:t>
             </a:fld>
             <a:endParaRPr lang="en-US"/>
           </a:p>
@@ -2234,7 +2234,7 @@
           <a:p>
             <a:fld id="{78C97017-6FC3-485B-9764-EAC9E56C1D49}" type="datetimeFigureOut">
               <a:rPr lang="en-US" smtClean="0"/>
-              <a:t>11/7/2018</a:t>
+              <a:t>11/12/2018</a:t>
             </a:fld>
             <a:endParaRPr lang="en-US"/>
           </a:p>
@@ -2329,7 +2329,7 @@
           <a:p>
             <a:fld id="{78C97017-6FC3-485B-9764-EAC9E56C1D49}" type="datetimeFigureOut">
               <a:rPr lang="en-US" smtClean="0"/>
-              <a:t>11/7/2018</a:t>
+              <a:t>11/12/2018</a:t>
             </a:fld>
             <a:endParaRPr lang="en-US"/>
           </a:p>
@@ -2604,7 +2604,7 @@
           <a:p>
             <a:fld id="{78C97017-6FC3-485B-9764-EAC9E56C1D49}" type="datetimeFigureOut">
               <a:rPr lang="en-US" smtClean="0"/>
-              <a:t>11/7/2018</a:t>
+              <a:t>11/12/2018</a:t>
             </a:fld>
             <a:endParaRPr lang="en-US"/>
           </a:p>
@@ -2856,7 +2856,7 @@
           <a:p>
             <a:fld id="{78C97017-6FC3-485B-9764-EAC9E56C1D49}" type="datetimeFigureOut">
               <a:rPr lang="en-US" smtClean="0"/>
-              <a:t>11/7/2018</a:t>
+              <a:t>11/12/2018</a:t>
             </a:fld>
             <a:endParaRPr lang="en-US"/>
           </a:p>
@@ -3067,7 +3067,7 @@
           <a:p>
             <a:fld id="{78C97017-6FC3-485B-9764-EAC9E56C1D49}" type="datetimeFigureOut">
               <a:rPr lang="en-US" smtClean="0"/>
-              <a:t>11/7/2018</a:t>
+              <a:t>11/12/2018</a:t>
             </a:fld>
             <a:endParaRPr lang="en-US"/>
           </a:p>
@@ -3456,8 +3456,8 @@
         </p:nvSpPr>
         <p:spPr>
           <a:xfrm>
-            <a:off x="1119865" y="1318280"/>
-            <a:ext cx="7719335" cy="4777720"/>
+            <a:off x="1119865" y="1447800"/>
+            <a:ext cx="7719335" cy="4895800"/>
           </a:xfrm>
           <a:prstGeom prst="roundRect">
             <a:avLst>
@@ -5510,10 +5510,10 @@
       </p:sp>
       <p:sp>
         <p:nvSpPr>
-          <p:cNvPr id="215" name="Rectangle 8">
-            <a:extLst>
-              <a:ext uri="{FF2B5EF4-FFF2-40B4-BE49-F238E27FC236}">
-                <a16:creationId xmlns:a16="http://schemas.microsoft.com/office/drawing/2014/main" id="{1C555377-58C2-48B9-B5C7-3729910C208B}"/>
+          <p:cNvPr id="218" name="Rectangle 8">
+            <a:extLst>
+              <a:ext uri="{FF2B5EF4-FFF2-40B4-BE49-F238E27FC236}">
+                <a16:creationId xmlns:a16="http://schemas.microsoft.com/office/drawing/2014/main" id="{2F8D4629-D8BC-405A-BF7F-3656BCD42FB2}"/>
               </a:ext>
             </a:extLst>
           </p:cNvPr>
@@ -5522,8 +5522,8 @@
         </p:nvSpPr>
         <p:spPr>
           <a:xfrm>
-            <a:off x="7712397" y="2096511"/>
-            <a:ext cx="708186" cy="285783"/>
+            <a:off x="3170181" y="1883241"/>
+            <a:ext cx="1060683" cy="364396"/>
           </a:xfrm>
           <a:prstGeom prst="rect">
             <a:avLst/>
@@ -5555,12 +5555,12 @@
           <a:p>
             <a:pPr algn="ctr"/>
             <a:r>
-              <a:rPr lang="en-US" sz="1050" dirty="0">
+              <a:rPr lang="en-US" sz="1050" dirty="0" err="1">
                 <a:solidFill>
                   <a:srgbClr val="7030A0"/>
                 </a:solidFill>
               </a:rPr>
-              <a:t>Tag</a:t>
+              <a:t>AddressBook</a:t>
             </a:r>
             <a:endParaRPr lang="en-SG" sz="1050" dirty="0">
               <a:solidFill>
@@ -5572,29 +5572,26 @@
       </p:sp>
       <p:cxnSp>
         <p:nvCxnSpPr>
-          <p:cNvPr id="216" name="Elbow Connector 78">
-            <a:extLst>
-              <a:ext uri="{FF2B5EF4-FFF2-40B4-BE49-F238E27FC236}">
-                <a16:creationId xmlns:a16="http://schemas.microsoft.com/office/drawing/2014/main" id="{DD5861F4-A25C-45D0-905B-F4F9AF16077B}"/>
+          <p:cNvPr id="219" name="Straight Arrow Connector 218">
+            <a:extLst>
+              <a:ext uri="{FF2B5EF4-FFF2-40B4-BE49-F238E27FC236}">
+                <a16:creationId xmlns:a16="http://schemas.microsoft.com/office/drawing/2014/main" id="{533BD535-16BE-44AD-AA58-75A4D200A5FF}"/>
               </a:ext>
             </a:extLst>
           </p:cNvPr>
           <p:cNvCxnSpPr>
             <a:cxnSpLocks/>
-            <a:stCxn id="196" idx="3"/>
-            <a:endCxn id="215" idx="1"/>
+            <a:endCxn id="190" idx="1"/>
           </p:cNvCxnSpPr>
           <p:nvPr/>
         </p:nvCxnSpPr>
         <p:spPr>
-          <a:xfrm flipV="1">
-            <a:off x="7277995" y="2239403"/>
-            <a:ext cx="434402" cy="663182"/>
-          </a:xfrm>
-          <a:prstGeom prst="bentConnector3">
-            <a:avLst>
-              <a:gd name="adj1" fmla="val 50000"/>
-            </a:avLst>
+          <a:xfrm>
+            <a:off x="4324972" y="2874916"/>
+            <a:ext cx="367678" cy="12320"/>
+          </a:xfrm>
+          <a:prstGeom prst="straightConnector1">
+            <a:avLst/>
           </a:prstGeom>
           <a:ln w="19050">
             <a:solidFill>
@@ -5622,55 +5619,118 @@
       </p:cxnSp>
       <p:sp>
         <p:nvSpPr>
-          <p:cNvPr id="217" name="TextBox 216">
-            <a:extLst>
-              <a:ext uri="{FF2B5EF4-FFF2-40B4-BE49-F238E27FC236}">
-                <a16:creationId xmlns:a16="http://schemas.microsoft.com/office/drawing/2014/main" id="{2EA638DC-3261-4CDF-97BF-A40E923DF83D}"/>
-              </a:ext>
-            </a:extLst>
-          </p:cNvPr>
-          <p:cNvSpPr txBox="1"/>
-          <p:nvPr/>
-        </p:nvSpPr>
-        <p:spPr>
-          <a:xfrm>
-            <a:off x="7466243" y="2255711"/>
-            <a:ext cx="189257" cy="178683"/>
-          </a:xfrm>
-          <a:prstGeom prst="rect">
-            <a:avLst/>
-          </a:prstGeom>
-          <a:noFill/>
-        </p:spPr>
-        <p:txBody>
-          <a:bodyPr wrap="square" lIns="0" tIns="0" rIns="0" bIns="0" rtlCol="0">
-            <a:noAutofit/>
-          </a:bodyPr>
+          <p:cNvPr id="220" name="Isosceles Triangle 102">
+            <a:extLst>
+              <a:ext uri="{FF2B5EF4-FFF2-40B4-BE49-F238E27FC236}">
+                <a16:creationId xmlns:a16="http://schemas.microsoft.com/office/drawing/2014/main" id="{C31312B4-D123-4696-AB36-E6C4FC15A30B}"/>
+              </a:ext>
+            </a:extLst>
+          </p:cNvPr>
+          <p:cNvSpPr/>
+          <p:nvPr/>
+        </p:nvSpPr>
+        <p:spPr>
+          <a:xfrm rot="16200000">
+            <a:off x="2669073" y="1954049"/>
+            <a:ext cx="271014" cy="187417"/>
+          </a:xfrm>
+          <a:prstGeom prst="triangle">
+            <a:avLst>
+              <a:gd name="adj" fmla="val 44517"/>
+            </a:avLst>
+          </a:prstGeom>
+          <a:solidFill>
+            <a:schemeClr val="accent4">
+              <a:lumMod val="20000"/>
+              <a:lumOff val="80000"/>
+            </a:schemeClr>
+          </a:solidFill>
+          <a:ln w="19050">
+            <a:solidFill>
+              <a:srgbClr val="7030A0"/>
+            </a:solidFill>
+          </a:ln>
+          <a:effectLst/>
+        </p:spPr>
+        <p:style>
+          <a:lnRef idx="1">
+            <a:schemeClr val="accent6"/>
+          </a:lnRef>
+          <a:fillRef idx="2">
+            <a:schemeClr val="accent6"/>
+          </a:fillRef>
+          <a:effectRef idx="1">
+            <a:schemeClr val="accent6"/>
+          </a:effectRef>
+          <a:fontRef idx="minor">
+            <a:schemeClr val="dk1"/>
+          </a:fontRef>
+        </p:style>
+        <p:txBody>
+          <a:bodyPr rtlCol="0" anchor="ctr"/>
           <a:lstStyle/>
           <a:p>
             <a:pPr algn="ctr"/>
-            <a:r>
-              <a:rPr lang="en-US" sz="1100" dirty="0">
-                <a:solidFill>
-                  <a:srgbClr val="7030A0"/>
-                </a:solidFill>
-              </a:rPr>
-              <a:t>*</a:t>
-            </a:r>
-            <a:endParaRPr lang="en-SG" sz="1100" dirty="0">
-              <a:solidFill>
-                <a:srgbClr val="7030A0"/>
-              </a:solidFill>
-            </a:endParaRPr>
-          </a:p>
-        </p:txBody>
-      </p:sp>
-      <p:sp>
-        <p:nvSpPr>
-          <p:cNvPr id="218" name="Rectangle 8">
-            <a:extLst>
-              <a:ext uri="{FF2B5EF4-FFF2-40B4-BE49-F238E27FC236}">
-                <a16:creationId xmlns:a16="http://schemas.microsoft.com/office/drawing/2014/main" id="{2F8D4629-D8BC-405A-BF7F-3656BCD42FB2}"/>
+            <a:endParaRPr lang="en-SG" sz="1050"/>
+          </a:p>
+        </p:txBody>
+      </p:sp>
+      <p:cxnSp>
+        <p:nvCxnSpPr>
+          <p:cNvPr id="221" name="Elbow Connector 63">
+            <a:extLst>
+              <a:ext uri="{FF2B5EF4-FFF2-40B4-BE49-F238E27FC236}">
+                <a16:creationId xmlns:a16="http://schemas.microsoft.com/office/drawing/2014/main" id="{F23A24C8-102B-442D-8C02-F05D0A53BC8D}"/>
+              </a:ext>
+            </a:extLst>
+          </p:cNvPr>
+          <p:cNvCxnSpPr>
+            <a:stCxn id="220" idx="3"/>
+            <a:endCxn id="218" idx="1"/>
+          </p:cNvCxnSpPr>
+          <p:nvPr/>
+        </p:nvCxnSpPr>
+        <p:spPr>
+          <a:xfrm>
+            <a:off x="2898289" y="2062618"/>
+            <a:ext cx="271892" cy="2821"/>
+          </a:xfrm>
+          <a:prstGeom prst="bentConnector3">
+            <a:avLst>
+              <a:gd name="adj1" fmla="val 50000"/>
+            </a:avLst>
+          </a:prstGeom>
+          <a:ln w="19050">
+            <a:solidFill>
+              <a:srgbClr val="7030A0"/>
+            </a:solidFill>
+            <a:prstDash val="sysDot"/>
+            <a:headEnd type="none" w="med" len="med"/>
+            <a:tailEnd type="none" w="med" len="med"/>
+          </a:ln>
+          <a:effectLst/>
+        </p:spPr>
+        <p:style>
+          <a:lnRef idx="1">
+            <a:schemeClr val="accent2"/>
+          </a:lnRef>
+          <a:fillRef idx="2">
+            <a:schemeClr val="accent2"/>
+          </a:fillRef>
+          <a:effectRef idx="1">
+            <a:schemeClr val="accent2"/>
+          </a:effectRef>
+          <a:fontRef idx="minor">
+            <a:schemeClr val="dk1"/>
+          </a:fontRef>
+        </p:style>
+      </p:cxnSp>
+      <p:sp>
+        <p:nvSpPr>
+          <p:cNvPr id="222" name="Rectangle 8">
+            <a:extLst>
+              <a:ext uri="{FF2B5EF4-FFF2-40B4-BE49-F238E27FC236}">
+                <a16:creationId xmlns:a16="http://schemas.microsoft.com/office/drawing/2014/main" id="{F087045D-28B2-42B5-9C83-02AC6E68AFD4}"/>
               </a:ext>
             </a:extLst>
           </p:cNvPr>
@@ -5679,8 +5739,8 @@
         </p:nvSpPr>
         <p:spPr>
           <a:xfrm>
-            <a:off x="3170181" y="1883241"/>
-            <a:ext cx="1060683" cy="364396"/>
+            <a:off x="7712396" y="2075770"/>
+            <a:ext cx="898204" cy="285783"/>
           </a:xfrm>
           <a:prstGeom prst="rect">
             <a:avLst/>
@@ -5712,12 +5772,12 @@
           <a:p>
             <a:pPr algn="ctr"/>
             <a:r>
-              <a:rPr lang="en-US" sz="1050" dirty="0" err="1">
+              <a:rPr lang="en-US" sz="1050" dirty="0">
                 <a:solidFill>
                   <a:srgbClr val="7030A0"/>
                 </a:solidFill>
               </a:rPr>
-              <a:t>AddressBook</a:t>
+              <a:t>Department</a:t>
             </a:r>
             <a:endParaRPr lang="en-SG" sz="1050" dirty="0">
               <a:solidFill>
@@ -5727,28 +5787,93 @@
           </a:p>
         </p:txBody>
       </p:sp>
+      <p:sp>
+        <p:nvSpPr>
+          <p:cNvPr id="223" name="Rectangle 8">
+            <a:extLst>
+              <a:ext uri="{FF2B5EF4-FFF2-40B4-BE49-F238E27FC236}">
+                <a16:creationId xmlns:a16="http://schemas.microsoft.com/office/drawing/2014/main" id="{9EEC79AC-1DB9-4342-8812-5044F64E31AA}"/>
+              </a:ext>
+            </a:extLst>
+          </p:cNvPr>
+          <p:cNvSpPr/>
+          <p:nvPr/>
+        </p:nvSpPr>
+        <p:spPr>
+          <a:xfrm>
+            <a:off x="7712396" y="1740349"/>
+            <a:ext cx="898204" cy="285783"/>
+          </a:xfrm>
+          <a:prstGeom prst="rect">
+            <a:avLst/>
+          </a:prstGeom>
+          <a:ln w="19050">
+            <a:solidFill>
+              <a:srgbClr val="7030A0"/>
+            </a:solidFill>
+          </a:ln>
+          <a:effectLst/>
+        </p:spPr>
+        <p:style>
+          <a:lnRef idx="1">
+            <a:schemeClr val="accent4"/>
+          </a:lnRef>
+          <a:fillRef idx="2">
+            <a:schemeClr val="accent4"/>
+          </a:fillRef>
+          <a:effectRef idx="1">
+            <a:schemeClr val="accent4"/>
+          </a:effectRef>
+          <a:fontRef idx="minor">
+            <a:schemeClr val="dk1"/>
+          </a:fontRef>
+        </p:style>
+        <p:txBody>
+          <a:bodyPr rtlCol="0" anchor="ctr"/>
+          <a:lstStyle/>
+          <a:p>
+            <a:pPr algn="ctr"/>
+            <a:r>
+              <a:rPr lang="en-US" sz="1050" dirty="0">
+                <a:solidFill>
+                  <a:srgbClr val="7030A0"/>
+                </a:solidFill>
+              </a:rPr>
+              <a:t>Designation</a:t>
+            </a:r>
+            <a:endParaRPr lang="en-SG" sz="1050" dirty="0">
+              <a:solidFill>
+                <a:srgbClr val="7030A0"/>
+              </a:solidFill>
+            </a:endParaRPr>
+          </a:p>
+        </p:txBody>
+      </p:sp>
       <p:cxnSp>
         <p:nvCxnSpPr>
-          <p:cNvPr id="219" name="Straight Arrow Connector 218">
-            <a:extLst>
-              <a:ext uri="{FF2B5EF4-FFF2-40B4-BE49-F238E27FC236}">
-                <a16:creationId xmlns:a16="http://schemas.microsoft.com/office/drawing/2014/main" id="{533BD535-16BE-44AD-AA58-75A4D200A5FF}"/>
+          <p:cNvPr id="225" name="Elbow Connector 78">
+            <a:extLst>
+              <a:ext uri="{FF2B5EF4-FFF2-40B4-BE49-F238E27FC236}">
+                <a16:creationId xmlns:a16="http://schemas.microsoft.com/office/drawing/2014/main" id="{8D86C177-4A09-4CB2-87AC-447B44BA63FA}"/>
               </a:ext>
             </a:extLst>
           </p:cNvPr>
           <p:cNvCxnSpPr>
             <a:cxnSpLocks/>
-            <a:endCxn id="190" idx="1"/>
+            <a:stCxn id="196" idx="3"/>
+            <a:endCxn id="222" idx="1"/>
           </p:cNvCxnSpPr>
           <p:nvPr/>
         </p:nvCxnSpPr>
         <p:spPr>
-          <a:xfrm>
-            <a:off x="4324972" y="2874916"/>
-            <a:ext cx="367678" cy="12320"/>
-          </a:xfrm>
-          <a:prstGeom prst="straightConnector1">
-            <a:avLst/>
+          <a:xfrm flipV="1">
+            <a:off x="7277995" y="2218662"/>
+            <a:ext cx="434401" cy="683923"/>
+          </a:xfrm>
+          <a:prstGeom prst="bentConnector3">
+            <a:avLst>
+              <a:gd name="adj1" fmla="val 50000"/>
+            </a:avLst>
           </a:prstGeom>
           <a:ln w="19050">
             <a:solidFill>
@@ -5774,12 +5899,62 @@
           </a:fontRef>
         </p:style>
       </p:cxnSp>
-      <p:sp>
-        <p:nvSpPr>
-          <p:cNvPr id="220" name="Isosceles Triangle 102">
-            <a:extLst>
-              <a:ext uri="{FF2B5EF4-FFF2-40B4-BE49-F238E27FC236}">
-                <a16:creationId xmlns:a16="http://schemas.microsoft.com/office/drawing/2014/main" id="{C31312B4-D123-4696-AB36-E6C4FC15A30B}"/>
+      <p:cxnSp>
+        <p:nvCxnSpPr>
+          <p:cNvPr id="226" name="Elbow Connector 78">
+            <a:extLst>
+              <a:ext uri="{FF2B5EF4-FFF2-40B4-BE49-F238E27FC236}">
+                <a16:creationId xmlns:a16="http://schemas.microsoft.com/office/drawing/2014/main" id="{A11078A2-4EAF-4109-AE2C-CADB3C023EEB}"/>
+              </a:ext>
+            </a:extLst>
+          </p:cNvPr>
+          <p:cNvCxnSpPr>
+            <a:cxnSpLocks/>
+            <a:stCxn id="196" idx="3"/>
+            <a:endCxn id="223" idx="1"/>
+          </p:cNvCxnSpPr>
+          <p:nvPr/>
+        </p:nvCxnSpPr>
+        <p:spPr>
+          <a:xfrm flipV="1">
+            <a:off x="7277995" y="1883241"/>
+            <a:ext cx="434401" cy="1019344"/>
+          </a:xfrm>
+          <a:prstGeom prst="bentConnector3">
+            <a:avLst>
+              <a:gd name="adj1" fmla="val 50000"/>
+            </a:avLst>
+          </a:prstGeom>
+          <a:ln w="19050">
+            <a:solidFill>
+              <a:srgbClr val="7030A0"/>
+            </a:solidFill>
+            <a:headEnd type="none" w="med" len="med"/>
+            <a:tailEnd type="arrow" w="med" len="med"/>
+          </a:ln>
+          <a:effectLst/>
+        </p:spPr>
+        <p:style>
+          <a:lnRef idx="1">
+            <a:schemeClr val="accent2"/>
+          </a:lnRef>
+          <a:fillRef idx="2">
+            <a:schemeClr val="accent2"/>
+          </a:fillRef>
+          <a:effectRef idx="1">
+            <a:schemeClr val="accent2"/>
+          </a:effectRef>
+          <a:fontRef idx="minor">
+            <a:schemeClr val="dk1"/>
+          </a:fontRef>
+        </p:style>
+      </p:cxnSp>
+      <p:sp>
+        <p:nvSpPr>
+          <p:cNvPr id="227" name="Rectangle 8">
+            <a:extLst>
+              <a:ext uri="{FF2B5EF4-FFF2-40B4-BE49-F238E27FC236}">
+                <a16:creationId xmlns:a16="http://schemas.microsoft.com/office/drawing/2014/main" id="{CF29C074-CDE0-47FC-91AC-B2EB995EE04F}"/>
               </a:ext>
             </a:extLst>
           </p:cNvPr>
@@ -5787,21 +5962,123 @@
           <p:nvPr/>
         </p:nvSpPr>
         <p:spPr>
-          <a:xfrm rot="16200000">
-            <a:off x="2669073" y="1954049"/>
-            <a:ext cx="271014" cy="187417"/>
-          </a:xfrm>
-          <a:prstGeom prst="triangle">
-            <a:avLst>
-              <a:gd name="adj" fmla="val 44517"/>
-            </a:avLst>
-          </a:prstGeom>
-          <a:solidFill>
-            <a:schemeClr val="accent4">
-              <a:lumMod val="20000"/>
-              <a:lumOff val="80000"/>
-            </a:schemeClr>
-          </a:solidFill>
+          <a:xfrm>
+            <a:off x="2834412" y="4123465"/>
+            <a:ext cx="1490560" cy="334856"/>
+          </a:xfrm>
+          <a:prstGeom prst="rect">
+            <a:avLst/>
+          </a:prstGeom>
+          <a:ln w="19050">
+            <a:solidFill>
+              <a:srgbClr val="7030A0"/>
+            </a:solidFill>
+          </a:ln>
+          <a:effectLst/>
+        </p:spPr>
+        <p:style>
+          <a:lnRef idx="1">
+            <a:schemeClr val="accent4"/>
+          </a:lnRef>
+          <a:fillRef idx="2">
+            <a:schemeClr val="accent4"/>
+          </a:fillRef>
+          <a:effectRef idx="1">
+            <a:schemeClr val="accent4"/>
+          </a:effectRef>
+          <a:fontRef idx="minor">
+            <a:schemeClr val="dk1"/>
+          </a:fontRef>
+        </p:style>
+        <p:txBody>
+          <a:bodyPr rtlCol="0" anchor="ctr"/>
+          <a:lstStyle/>
+          <a:p>
+            <a:pPr algn="ctr"/>
+            <a:r>
+              <a:rPr lang="en-US" sz="1050" dirty="0" err="1">
+                <a:solidFill>
+                  <a:srgbClr val="7030A0"/>
+                </a:solidFill>
+              </a:rPr>
+              <a:t>VersionedEventList</a:t>
+            </a:r>
+            <a:endParaRPr lang="en-SG" sz="1050" dirty="0">
+              <a:solidFill>
+                <a:srgbClr val="7030A0"/>
+              </a:solidFill>
+            </a:endParaRPr>
+          </a:p>
+        </p:txBody>
+      </p:sp>
+      <p:cxnSp>
+        <p:nvCxnSpPr>
+          <p:cNvPr id="228" name="Straight Arrow Connector 227">
+            <a:extLst>
+              <a:ext uri="{FF2B5EF4-FFF2-40B4-BE49-F238E27FC236}">
+                <a16:creationId xmlns:a16="http://schemas.microsoft.com/office/drawing/2014/main" id="{E924F568-5BB6-4225-B9DE-31C831FCBF4A}"/>
+              </a:ext>
+            </a:extLst>
+          </p:cNvPr>
+          <p:cNvCxnSpPr>
+            <a:stCxn id="229" idx="3"/>
+            <a:endCxn id="227" idx="1"/>
+          </p:cNvCxnSpPr>
+          <p:nvPr/>
+        </p:nvCxnSpPr>
+        <p:spPr>
+          <a:xfrm>
+            <a:off x="2633492" y="4280336"/>
+            <a:ext cx="200920" cy="10557"/>
+          </a:xfrm>
+          <a:prstGeom prst="straightConnector1">
+            <a:avLst/>
+          </a:prstGeom>
+          <a:ln w="19050">
+            <a:solidFill>
+              <a:srgbClr val="7030A0"/>
+            </a:solidFill>
+            <a:headEnd type="none" w="med" len="med"/>
+            <a:tailEnd type="arrow" w="med" len="med"/>
+          </a:ln>
+          <a:effectLst/>
+        </p:spPr>
+        <p:style>
+          <a:lnRef idx="1">
+            <a:schemeClr val="accent2"/>
+          </a:lnRef>
+          <a:fillRef idx="2">
+            <a:schemeClr val="accent2"/>
+          </a:fillRef>
+          <a:effectRef idx="1">
+            <a:schemeClr val="accent2"/>
+          </a:effectRef>
+          <a:fontRef idx="minor">
+            <a:schemeClr val="dk1"/>
+          </a:fontRef>
+        </p:style>
+      </p:cxnSp>
+      <p:sp>
+        <p:nvSpPr>
+          <p:cNvPr id="229" name="Flowchart: Decision 96">
+            <a:extLst>
+              <a:ext uri="{FF2B5EF4-FFF2-40B4-BE49-F238E27FC236}">
+                <a16:creationId xmlns:a16="http://schemas.microsoft.com/office/drawing/2014/main" id="{92EE9209-1D18-4E70-B55D-D9F70EF59420}"/>
+              </a:ext>
+            </a:extLst>
+          </p:cNvPr>
+          <p:cNvSpPr/>
+          <p:nvPr/>
+        </p:nvSpPr>
+        <p:spPr>
+          <a:xfrm>
+            <a:off x="2397444" y="4193646"/>
+            <a:ext cx="236048" cy="173380"/>
+          </a:xfrm>
+          <a:prstGeom prst="flowChartDecision">
+            <a:avLst/>
+          </a:prstGeom>
+          <a:noFill/>
           <a:ln w="19050">
             <a:solidFill>
               <a:srgbClr val="7030A0"/>
@@ -5828,66 +6105,16 @@
           <a:lstStyle/>
           <a:p>
             <a:pPr algn="ctr"/>
-            <a:endParaRPr lang="en-SG" sz="1050"/>
-          </a:p>
-        </p:txBody>
-      </p:sp>
-      <p:cxnSp>
-        <p:nvCxnSpPr>
-          <p:cNvPr id="221" name="Elbow Connector 63">
-            <a:extLst>
-              <a:ext uri="{FF2B5EF4-FFF2-40B4-BE49-F238E27FC236}">
-                <a16:creationId xmlns:a16="http://schemas.microsoft.com/office/drawing/2014/main" id="{F23A24C8-102B-442D-8C02-F05D0A53BC8D}"/>
-              </a:ext>
-            </a:extLst>
-          </p:cNvPr>
-          <p:cNvCxnSpPr>
-            <a:stCxn id="220" idx="3"/>
-            <a:endCxn id="218" idx="1"/>
-          </p:cNvCxnSpPr>
-          <p:nvPr/>
-        </p:nvCxnSpPr>
-        <p:spPr>
-          <a:xfrm>
-            <a:off x="2898289" y="2062618"/>
-            <a:ext cx="271892" cy="2821"/>
-          </a:xfrm>
-          <a:prstGeom prst="bentConnector3">
-            <a:avLst>
-              <a:gd name="adj1" fmla="val 50000"/>
-            </a:avLst>
-          </a:prstGeom>
-          <a:ln w="19050">
-            <a:solidFill>
-              <a:srgbClr val="7030A0"/>
-            </a:solidFill>
-            <a:prstDash val="sysDot"/>
-            <a:headEnd type="none" w="med" len="med"/>
-            <a:tailEnd type="none" w="med" len="med"/>
-          </a:ln>
-          <a:effectLst/>
-        </p:spPr>
-        <p:style>
-          <a:lnRef idx="1">
-            <a:schemeClr val="accent2"/>
-          </a:lnRef>
-          <a:fillRef idx="2">
-            <a:schemeClr val="accent2"/>
-          </a:fillRef>
-          <a:effectRef idx="1">
-            <a:schemeClr val="accent2"/>
-          </a:effectRef>
-          <a:fontRef idx="minor">
-            <a:schemeClr val="dk1"/>
-          </a:fontRef>
-        </p:style>
-      </p:cxnSp>
-      <p:sp>
-        <p:nvSpPr>
-          <p:cNvPr id="222" name="Rectangle 8">
-            <a:extLst>
-              <a:ext uri="{FF2B5EF4-FFF2-40B4-BE49-F238E27FC236}">
-                <a16:creationId xmlns:a16="http://schemas.microsoft.com/office/drawing/2014/main" id="{F087045D-28B2-42B5-9C83-02AC6E68AFD4}"/>
+            <a:endParaRPr lang="en-US" sz="1050"/>
+          </a:p>
+        </p:txBody>
+      </p:sp>
+      <p:sp>
+        <p:nvSpPr>
+          <p:cNvPr id="230" name="Rectangle 8">
+            <a:extLst>
+              <a:ext uri="{FF2B5EF4-FFF2-40B4-BE49-F238E27FC236}">
+                <a16:creationId xmlns:a16="http://schemas.microsoft.com/office/drawing/2014/main" id="{E9F68D61-B676-433B-B28E-B6A1A35E56F4}"/>
               </a:ext>
             </a:extLst>
           </p:cNvPr>
@@ -5896,8 +6123,8 @@
         </p:nvSpPr>
         <p:spPr>
           <a:xfrm>
-            <a:off x="7712396" y="1764616"/>
-            <a:ext cx="898204" cy="285783"/>
+            <a:off x="4701782" y="4123465"/>
+            <a:ext cx="1156969" cy="346760"/>
           </a:xfrm>
           <a:prstGeom prst="rect">
             <a:avLst/>
@@ -5929,12 +6156,12 @@
           <a:p>
             <a:pPr algn="ctr"/>
             <a:r>
-              <a:rPr lang="en-US" sz="1050" dirty="0">
+              <a:rPr lang="en-US" sz="1050" dirty="0" err="1">
                 <a:solidFill>
                   <a:srgbClr val="7030A0"/>
                 </a:solidFill>
               </a:rPr>
-              <a:t>Department</a:t>
+              <a:t>UniqueEventList</a:t>
             </a:r>
             <a:endParaRPr lang="en-SG" sz="1050" dirty="0">
               <a:solidFill>
@@ -5946,10 +6173,10 @@
       </p:sp>
       <p:sp>
         <p:nvSpPr>
-          <p:cNvPr id="223" name="Rectangle 8">
-            <a:extLst>
-              <a:ext uri="{FF2B5EF4-FFF2-40B4-BE49-F238E27FC236}">
-                <a16:creationId xmlns:a16="http://schemas.microsoft.com/office/drawing/2014/main" id="{9EEC79AC-1DB9-4342-8812-5044F64E31AA}"/>
+          <p:cNvPr id="231" name="Flowchart: Decision 96">
+            <a:extLst>
+              <a:ext uri="{FF2B5EF4-FFF2-40B4-BE49-F238E27FC236}">
+                <a16:creationId xmlns:a16="http://schemas.microsoft.com/office/drawing/2014/main" id="{2211BBB8-72FB-4217-BF9B-94407CAEEDE3}"/>
               </a:ext>
             </a:extLst>
           </p:cNvPr>
@@ -5958,8 +6185,61 @@
         </p:nvSpPr>
         <p:spPr>
           <a:xfrm>
-            <a:off x="7712396" y="1429195"/>
-            <a:ext cx="898204" cy="285783"/>
+            <a:off x="4334104" y="4330141"/>
+            <a:ext cx="236048" cy="173380"/>
+          </a:xfrm>
+          <a:prstGeom prst="flowChartDecision">
+            <a:avLst/>
+          </a:prstGeom>
+          <a:solidFill>
+            <a:srgbClr val="7030A0"/>
+          </a:solidFill>
+          <a:ln w="19050">
+            <a:solidFill>
+              <a:srgbClr val="7030A0"/>
+            </a:solidFill>
+          </a:ln>
+          <a:effectLst/>
+        </p:spPr>
+        <p:style>
+          <a:lnRef idx="1">
+            <a:schemeClr val="accent6"/>
+          </a:lnRef>
+          <a:fillRef idx="2">
+            <a:schemeClr val="accent6"/>
+          </a:fillRef>
+          <a:effectRef idx="1">
+            <a:schemeClr val="accent6"/>
+          </a:effectRef>
+          <a:fontRef idx="minor">
+            <a:schemeClr val="dk1"/>
+          </a:fontRef>
+        </p:style>
+        <p:txBody>
+          <a:bodyPr rtlCol="0" anchor="ctr"/>
+          <a:lstStyle/>
+          <a:p>
+            <a:pPr algn="ctr"/>
+            <a:endParaRPr lang="en-US" sz="1050"/>
+          </a:p>
+        </p:txBody>
+      </p:sp>
+      <p:sp>
+        <p:nvSpPr>
+          <p:cNvPr id="232" name="Rectangle 8">
+            <a:extLst>
+              <a:ext uri="{FF2B5EF4-FFF2-40B4-BE49-F238E27FC236}">
+                <a16:creationId xmlns:a16="http://schemas.microsoft.com/office/drawing/2014/main" id="{2216C3AB-18CE-4B48-BDE2-DA7C7395E0B2}"/>
+              </a:ext>
+            </a:extLst>
+          </p:cNvPr>
+          <p:cNvSpPr/>
+          <p:nvPr/>
+        </p:nvSpPr>
+        <p:spPr>
+          <a:xfrm>
+            <a:off x="6322809" y="4135369"/>
+            <a:ext cx="708186" cy="346760"/>
           </a:xfrm>
           <a:prstGeom prst="rect">
             <a:avLst/>
@@ -5996,7 +6276,7 @@
                   <a:srgbClr val="7030A0"/>
                 </a:solidFill>
               </a:rPr>
-              <a:t>Designation</a:t>
+              <a:t>Event</a:t>
             </a:r>
             <a:endParaRPr lang="en-SG" sz="1050" dirty="0">
               <a:solidFill>
@@ -6006,29 +6286,79 @@
           </a:p>
         </p:txBody>
       </p:sp>
+      <p:sp>
+        <p:nvSpPr>
+          <p:cNvPr id="233" name="Flowchart: Decision 96">
+            <a:extLst>
+              <a:ext uri="{FF2B5EF4-FFF2-40B4-BE49-F238E27FC236}">
+                <a16:creationId xmlns:a16="http://schemas.microsoft.com/office/drawing/2014/main" id="{E98CD532-7AA9-4A5D-89CE-67D552B184E5}"/>
+              </a:ext>
+            </a:extLst>
+          </p:cNvPr>
+          <p:cNvSpPr/>
+          <p:nvPr/>
+        </p:nvSpPr>
+        <p:spPr>
+          <a:xfrm>
+            <a:off x="5867883" y="4218979"/>
+            <a:ext cx="236048" cy="173380"/>
+          </a:xfrm>
+          <a:prstGeom prst="flowChartDecision">
+            <a:avLst/>
+          </a:prstGeom>
+          <a:noFill/>
+          <a:ln w="19050">
+            <a:solidFill>
+              <a:srgbClr val="7030A0"/>
+            </a:solidFill>
+          </a:ln>
+          <a:effectLst/>
+        </p:spPr>
+        <p:style>
+          <a:lnRef idx="1">
+            <a:schemeClr val="accent6"/>
+          </a:lnRef>
+          <a:fillRef idx="2">
+            <a:schemeClr val="accent6"/>
+          </a:fillRef>
+          <a:effectRef idx="1">
+            <a:schemeClr val="accent6"/>
+          </a:effectRef>
+          <a:fontRef idx="minor">
+            <a:schemeClr val="dk1"/>
+          </a:fontRef>
+        </p:style>
+        <p:txBody>
+          <a:bodyPr rtlCol="0" anchor="ctr"/>
+          <a:lstStyle/>
+          <a:p>
+            <a:pPr algn="ctr"/>
+            <a:endParaRPr lang="en-US" sz="1050"/>
+          </a:p>
+        </p:txBody>
+      </p:sp>
       <p:cxnSp>
         <p:nvCxnSpPr>
-          <p:cNvPr id="224" name="Elbow Connector 78">
-            <a:extLst>
-              <a:ext uri="{FF2B5EF4-FFF2-40B4-BE49-F238E27FC236}">
-                <a16:creationId xmlns:a16="http://schemas.microsoft.com/office/drawing/2014/main" id="{D9E27835-B31D-4C49-842B-CE8ED4A11EB9}"/>
+          <p:cNvPr id="234" name="Elbow Connector 63">
+            <a:extLst>
+              <a:ext uri="{FF2B5EF4-FFF2-40B4-BE49-F238E27FC236}">
+                <a16:creationId xmlns:a16="http://schemas.microsoft.com/office/drawing/2014/main" id="{FEEF3E50-D97E-4AB6-AF95-29613B5E0D57}"/>
               </a:ext>
             </a:extLst>
           </p:cNvPr>
           <p:cNvCxnSpPr>
-            <a:cxnSpLocks/>
+            <a:stCxn id="233" idx="3"/>
+            <a:endCxn id="232" idx="1"/>
           </p:cNvCxnSpPr>
           <p:nvPr/>
         </p:nvCxnSpPr>
         <p:spPr>
-          <a:xfrm flipV="1">
-            <a:off x="7270103" y="2232878"/>
-            <a:ext cx="434402" cy="663182"/>
+          <a:xfrm>
+            <a:off x="6103931" y="4305669"/>
+            <a:ext cx="218878" cy="3080"/>
           </a:xfrm>
           <a:prstGeom prst="bentConnector3">
-            <a:avLst>
-              <a:gd name="adj1" fmla="val 50000"/>
-            </a:avLst>
+            <a:avLst/>
           </a:prstGeom>
           <a:ln w="19050">
             <a:solidFill>
@@ -6054,31 +6384,163 @@
           </a:fontRef>
         </p:style>
       </p:cxnSp>
+      <p:sp>
+        <p:nvSpPr>
+          <p:cNvPr id="235" name="TextBox 234">
+            <a:extLst>
+              <a:ext uri="{FF2B5EF4-FFF2-40B4-BE49-F238E27FC236}">
+                <a16:creationId xmlns:a16="http://schemas.microsoft.com/office/drawing/2014/main" id="{E3A4F28D-5759-412C-893D-54BE367538B1}"/>
+              </a:ext>
+            </a:extLst>
+          </p:cNvPr>
+          <p:cNvSpPr txBox="1"/>
+          <p:nvPr/>
+        </p:nvSpPr>
+        <p:spPr>
+          <a:xfrm>
+            <a:off x="4484389" y="4464560"/>
+            <a:ext cx="189257" cy="178683"/>
+          </a:xfrm>
+          <a:prstGeom prst="rect">
+            <a:avLst/>
+          </a:prstGeom>
+          <a:noFill/>
+        </p:spPr>
+        <p:txBody>
+          <a:bodyPr wrap="square" lIns="0" tIns="0" rIns="0" bIns="0" rtlCol="0">
+            <a:noAutofit/>
+          </a:bodyPr>
+          <a:lstStyle/>
+          <a:p>
+            <a:pPr algn="ctr"/>
+            <a:r>
+              <a:rPr lang="en-US" sz="1100" dirty="0">
+                <a:solidFill>
+                  <a:srgbClr val="7030A0"/>
+                </a:solidFill>
+              </a:rPr>
+              <a:t>1</a:t>
+            </a:r>
+            <a:endParaRPr lang="en-SG" sz="1100" dirty="0">
+              <a:solidFill>
+                <a:srgbClr val="7030A0"/>
+              </a:solidFill>
+            </a:endParaRPr>
+          </a:p>
+        </p:txBody>
+      </p:sp>
+      <p:sp>
+        <p:nvSpPr>
+          <p:cNvPr id="236" name="TextBox 235">
+            <a:extLst>
+              <a:ext uri="{FF2B5EF4-FFF2-40B4-BE49-F238E27FC236}">
+                <a16:creationId xmlns:a16="http://schemas.microsoft.com/office/drawing/2014/main" id="{C2C0BA7E-073F-4633-8F25-6547099A30AD}"/>
+              </a:ext>
+            </a:extLst>
+          </p:cNvPr>
+          <p:cNvSpPr txBox="1"/>
+          <p:nvPr/>
+        </p:nvSpPr>
+        <p:spPr>
+          <a:xfrm>
+            <a:off x="6144388" y="4375220"/>
+            <a:ext cx="189257" cy="178683"/>
+          </a:xfrm>
+          <a:prstGeom prst="rect">
+            <a:avLst/>
+          </a:prstGeom>
+          <a:noFill/>
+        </p:spPr>
+        <p:txBody>
+          <a:bodyPr wrap="square" lIns="0" tIns="0" rIns="0" bIns="0" rtlCol="0">
+            <a:noAutofit/>
+          </a:bodyPr>
+          <a:lstStyle/>
+          <a:p>
+            <a:pPr algn="ctr"/>
+            <a:r>
+              <a:rPr lang="en-US" sz="1100" dirty="0">
+                <a:solidFill>
+                  <a:srgbClr val="7030A0"/>
+                </a:solidFill>
+              </a:rPr>
+              <a:t>*</a:t>
+            </a:r>
+            <a:endParaRPr lang="en-SG" sz="1100" dirty="0">
+              <a:solidFill>
+                <a:srgbClr val="7030A0"/>
+              </a:solidFill>
+            </a:endParaRPr>
+          </a:p>
+        </p:txBody>
+      </p:sp>
+      <p:sp>
+        <p:nvSpPr>
+          <p:cNvPr id="237" name="TextBox 236">
+            <a:extLst>
+              <a:ext uri="{FF2B5EF4-FFF2-40B4-BE49-F238E27FC236}">
+                <a16:creationId xmlns:a16="http://schemas.microsoft.com/office/drawing/2014/main" id="{7926C44F-B509-475E-ABB3-1B890D0378B5}"/>
+              </a:ext>
+            </a:extLst>
+          </p:cNvPr>
+          <p:cNvSpPr txBox="1"/>
+          <p:nvPr/>
+        </p:nvSpPr>
+        <p:spPr>
+          <a:xfrm>
+            <a:off x="2582526" y="4034018"/>
+            <a:ext cx="170110" cy="137542"/>
+          </a:xfrm>
+          <a:prstGeom prst="rect">
+            <a:avLst/>
+          </a:prstGeom>
+          <a:noFill/>
+        </p:spPr>
+        <p:txBody>
+          <a:bodyPr wrap="square" lIns="0" tIns="0" rIns="0" bIns="0" rtlCol="0">
+            <a:noAutofit/>
+          </a:bodyPr>
+          <a:lstStyle/>
+          <a:p>
+            <a:pPr algn="ctr"/>
+            <a:r>
+              <a:rPr lang="en-US" sz="1100" dirty="0">
+                <a:solidFill>
+                  <a:srgbClr val="7030A0"/>
+                </a:solidFill>
+              </a:rPr>
+              <a:t>1</a:t>
+            </a:r>
+            <a:endParaRPr lang="en-SG" sz="1100" dirty="0">
+              <a:solidFill>
+                <a:srgbClr val="7030A0"/>
+              </a:solidFill>
+            </a:endParaRPr>
+          </a:p>
+        </p:txBody>
+      </p:sp>
       <p:cxnSp>
         <p:nvCxnSpPr>
-          <p:cNvPr id="225" name="Elbow Connector 78">
-            <a:extLst>
-              <a:ext uri="{FF2B5EF4-FFF2-40B4-BE49-F238E27FC236}">
-                <a16:creationId xmlns:a16="http://schemas.microsoft.com/office/drawing/2014/main" id="{8D86C177-4A09-4CB2-87AC-447B44BA63FA}"/>
+          <p:cNvPr id="238" name="Straight Arrow Connector 237">
+            <a:extLst>
+              <a:ext uri="{FF2B5EF4-FFF2-40B4-BE49-F238E27FC236}">
+                <a16:creationId xmlns:a16="http://schemas.microsoft.com/office/drawing/2014/main" id="{221AD497-D1C8-4227-88B1-F79A55C206EF}"/>
               </a:ext>
             </a:extLst>
           </p:cNvPr>
           <p:cNvCxnSpPr>
             <a:cxnSpLocks/>
-            <a:stCxn id="196" idx="3"/>
-            <a:endCxn id="222" idx="1"/>
+            <a:endCxn id="230" idx="1"/>
           </p:cNvCxnSpPr>
           <p:nvPr/>
         </p:nvCxnSpPr>
         <p:spPr>
-          <a:xfrm flipV="1">
-            <a:off x="7277995" y="1907508"/>
-            <a:ext cx="434401" cy="995077"/>
-          </a:xfrm>
-          <a:prstGeom prst="bentConnector3">
-            <a:avLst>
-              <a:gd name="adj1" fmla="val 50000"/>
-            </a:avLst>
+          <a:xfrm>
+            <a:off x="4334104" y="4284525"/>
+            <a:ext cx="367678" cy="12320"/>
+          </a:xfrm>
+          <a:prstGeom prst="straightConnector1">
+            <a:avLst/>
           </a:prstGeom>
           <a:ln w="19050">
             <a:solidFill>
@@ -6106,34 +6568,32 @@
       </p:cxnSp>
       <p:cxnSp>
         <p:nvCxnSpPr>
-          <p:cNvPr id="226" name="Elbow Connector 78">
-            <a:extLst>
-              <a:ext uri="{FF2B5EF4-FFF2-40B4-BE49-F238E27FC236}">
-                <a16:creationId xmlns:a16="http://schemas.microsoft.com/office/drawing/2014/main" id="{A11078A2-4EAF-4109-AE2C-CADB3C023EEB}"/>
+          <p:cNvPr id="239" name="Elbow Connector 106">
+            <a:extLst>
+              <a:ext uri="{FF2B5EF4-FFF2-40B4-BE49-F238E27FC236}">
+                <a16:creationId xmlns:a16="http://schemas.microsoft.com/office/drawing/2014/main" id="{51CE78C2-068D-47D9-8B14-B86651FB37F9}"/>
               </a:ext>
             </a:extLst>
           </p:cNvPr>
           <p:cNvCxnSpPr>
             <a:cxnSpLocks/>
-            <a:stCxn id="196" idx="3"/>
-            <a:endCxn id="223" idx="1"/>
+            <a:endCxn id="232" idx="0"/>
           </p:cNvCxnSpPr>
           <p:nvPr/>
         </p:nvCxnSpPr>
         <p:spPr>
-          <a:xfrm flipV="1">
-            <a:off x="7277995" y="1572087"/>
-            <a:ext cx="434401" cy="1330498"/>
-          </a:xfrm>
-          <a:prstGeom prst="bentConnector3">
-            <a:avLst>
-              <a:gd name="adj1" fmla="val 50000"/>
-            </a:avLst>
+          <a:xfrm>
+            <a:off x="2220076" y="3938972"/>
+            <a:ext cx="4456826" cy="196397"/>
+          </a:xfrm>
+          <a:prstGeom prst="bentConnector2">
+            <a:avLst/>
           </a:prstGeom>
           <a:ln w="19050">
             <a:solidFill>
               <a:srgbClr val="7030A0"/>
             </a:solidFill>
+            <a:prstDash val="solid"/>
             <a:headEnd type="none" w="med" len="med"/>
             <a:tailEnd type="arrow" w="med" len="med"/>
           </a:ln>
@@ -6156,10 +6616,105 @@
       </p:cxnSp>
       <p:sp>
         <p:nvSpPr>
-          <p:cNvPr id="227" name="Rectangle 8">
-            <a:extLst>
-              <a:ext uri="{FF2B5EF4-FFF2-40B4-BE49-F238E27FC236}">
-                <a16:creationId xmlns:a16="http://schemas.microsoft.com/office/drawing/2014/main" id="{CF29C074-CDE0-47FC-91AC-B2EB995EE04F}"/>
+          <p:cNvPr id="240" name="TextBox 239">
+            <a:extLst>
+              <a:ext uri="{FF2B5EF4-FFF2-40B4-BE49-F238E27FC236}">
+                <a16:creationId xmlns:a16="http://schemas.microsoft.com/office/drawing/2014/main" id="{4A5346F5-1BD5-4A06-B22D-9CC08EB5A9F3}"/>
+              </a:ext>
+            </a:extLst>
+          </p:cNvPr>
+          <p:cNvSpPr txBox="1"/>
+          <p:nvPr/>
+        </p:nvSpPr>
+        <p:spPr>
+          <a:xfrm>
+            <a:off x="6302294" y="3670461"/>
+            <a:ext cx="881018" cy="261610"/>
+          </a:xfrm>
+          <a:prstGeom prst="rect">
+            <a:avLst/>
+          </a:prstGeom>
+          <a:noFill/>
+        </p:spPr>
+        <p:txBody>
+          <a:bodyPr wrap="square" rtlCol="0">
+            <a:spAutoFit/>
+          </a:bodyPr>
+          <a:lstStyle/>
+          <a:p>
+            <a:pPr algn="r"/>
+            <a:r>
+              <a:rPr lang="en-US" sz="1100" dirty="0">
+                <a:solidFill>
+                  <a:srgbClr val="7030A0"/>
+                </a:solidFill>
+              </a:rPr>
+              <a:t>filtered list</a:t>
+            </a:r>
+            <a:endParaRPr lang="en-SG" sz="1100" dirty="0">
+              <a:solidFill>
+                <a:srgbClr val="7030A0"/>
+              </a:solidFill>
+            </a:endParaRPr>
+          </a:p>
+        </p:txBody>
+      </p:sp>
+      <p:cxnSp>
+        <p:nvCxnSpPr>
+          <p:cNvPr id="241" name="Elbow Connector 63">
+            <a:extLst>
+              <a:ext uri="{FF2B5EF4-FFF2-40B4-BE49-F238E27FC236}">
+                <a16:creationId xmlns:a16="http://schemas.microsoft.com/office/drawing/2014/main" id="{920C4039-8159-4646-9C2D-DED62064D0BC}"/>
+              </a:ext>
+            </a:extLst>
+          </p:cNvPr>
+          <p:cNvCxnSpPr>
+            <a:cxnSpLocks/>
+            <a:stCxn id="242" idx="3"/>
+          </p:cNvCxnSpPr>
+          <p:nvPr/>
+        </p:nvCxnSpPr>
+        <p:spPr>
+          <a:xfrm rot="16200000" flipV="1">
+            <a:off x="3989653" y="4516981"/>
+            <a:ext cx="119389" cy="2069"/>
+          </a:xfrm>
+          <a:prstGeom prst="bentConnector3">
+            <a:avLst>
+              <a:gd name="adj1" fmla="val 50000"/>
+            </a:avLst>
+          </a:prstGeom>
+          <a:ln w="19050">
+            <a:solidFill>
+              <a:srgbClr val="7030A0"/>
+            </a:solidFill>
+            <a:prstDash val="sysDot"/>
+            <a:headEnd type="none" w="med" len="med"/>
+            <a:tailEnd type="none" w="med" len="med"/>
+          </a:ln>
+          <a:effectLst/>
+        </p:spPr>
+        <p:style>
+          <a:lnRef idx="1">
+            <a:schemeClr val="accent2"/>
+          </a:lnRef>
+          <a:fillRef idx="2">
+            <a:schemeClr val="accent2"/>
+          </a:fillRef>
+          <a:effectRef idx="1">
+            <a:schemeClr val="accent2"/>
+          </a:effectRef>
+          <a:fontRef idx="minor">
+            <a:schemeClr val="dk1"/>
+          </a:fontRef>
+        </p:style>
+      </p:cxnSp>
+      <p:sp>
+        <p:nvSpPr>
+          <p:cNvPr id="242" name="Isosceles Triangle 102">
+            <a:extLst>
+              <a:ext uri="{FF2B5EF4-FFF2-40B4-BE49-F238E27FC236}">
+                <a16:creationId xmlns:a16="http://schemas.microsoft.com/office/drawing/2014/main" id="{526F689F-1E11-4887-A8B8-C3A964E780EB}"/>
               </a:ext>
             </a:extLst>
           </p:cNvPr>
@@ -6167,11 +6722,11 @@
           <p:nvPr/>
         </p:nvSpPr>
         <p:spPr>
-          <a:xfrm>
-            <a:off x="2834412" y="4123465"/>
-            <a:ext cx="1490560" cy="334856"/>
-          </a:xfrm>
-          <a:prstGeom prst="rect">
+          <a:xfrm flipV="1">
+            <a:off x="3909187" y="4577710"/>
+            <a:ext cx="282387" cy="157062"/>
+          </a:xfrm>
+          <a:prstGeom prst="triangle">
             <a:avLst/>
           </a:prstGeom>
           <a:ln w="19050">
@@ -6200,13 +6755,67 @@
           <a:lstStyle/>
           <a:p>
             <a:pPr algn="ctr"/>
+            <a:endParaRPr lang="en-SG" sz="1050" b="1">
+              <a:solidFill>
+                <a:srgbClr val="92D050"/>
+              </a:solidFill>
+            </a:endParaRPr>
+          </a:p>
+        </p:txBody>
+      </p:sp>
+      <p:sp>
+        <p:nvSpPr>
+          <p:cNvPr id="243" name="Rectangle 8">
+            <a:extLst>
+              <a:ext uri="{FF2B5EF4-FFF2-40B4-BE49-F238E27FC236}">
+                <a16:creationId xmlns:a16="http://schemas.microsoft.com/office/drawing/2014/main" id="{69B1CE57-749A-4561-BEDB-976ADBA2DB5F}"/>
+              </a:ext>
+            </a:extLst>
+          </p:cNvPr>
+          <p:cNvSpPr/>
+          <p:nvPr/>
+        </p:nvSpPr>
+        <p:spPr>
+          <a:xfrm>
+            <a:off x="3479784" y="4751288"/>
+            <a:ext cx="1060683" cy="364396"/>
+          </a:xfrm>
+          <a:prstGeom prst="rect">
+            <a:avLst/>
+          </a:prstGeom>
+          <a:ln w="19050">
+            <a:solidFill>
+              <a:srgbClr val="7030A0"/>
+            </a:solidFill>
+          </a:ln>
+          <a:effectLst/>
+        </p:spPr>
+        <p:style>
+          <a:lnRef idx="1">
+            <a:schemeClr val="accent4"/>
+          </a:lnRef>
+          <a:fillRef idx="2">
+            <a:schemeClr val="accent4"/>
+          </a:fillRef>
+          <a:effectRef idx="1">
+            <a:schemeClr val="accent4"/>
+          </a:effectRef>
+          <a:fontRef idx="minor">
+            <a:schemeClr val="dk1"/>
+          </a:fontRef>
+        </p:style>
+        <p:txBody>
+          <a:bodyPr rtlCol="0" anchor="ctr"/>
+          <a:lstStyle/>
+          <a:p>
+            <a:pPr algn="ctr"/>
             <a:r>
               <a:rPr lang="en-US" sz="1050" dirty="0" err="1">
                 <a:solidFill>
                   <a:srgbClr val="7030A0"/>
                 </a:solidFill>
               </a:rPr>
-              <a:t>VersionedEventList</a:t>
+              <a:t>EventList</a:t>
             </a:r>
             <a:endParaRPr lang="en-SG" sz="1050" dirty="0">
               <a:solidFill>
@@ -6216,59 +6825,89 @@
           </a:p>
         </p:txBody>
       </p:sp>
-      <p:cxnSp>
-        <p:nvCxnSpPr>
-          <p:cNvPr id="228" name="Straight Arrow Connector 227">
-            <a:extLst>
-              <a:ext uri="{FF2B5EF4-FFF2-40B4-BE49-F238E27FC236}">
-                <a16:creationId xmlns:a16="http://schemas.microsoft.com/office/drawing/2014/main" id="{E924F568-5BB6-4225-B9DE-31C831FCBF4A}"/>
-              </a:ext>
-            </a:extLst>
-          </p:cNvPr>
-          <p:cNvCxnSpPr>
-            <a:stCxn id="229" idx="3"/>
-            <a:endCxn id="227" idx="1"/>
-          </p:cNvCxnSpPr>
-          <p:nvPr/>
-        </p:nvCxnSpPr>
-        <p:spPr>
-          <a:xfrm>
-            <a:off x="2633492" y="4280336"/>
-            <a:ext cx="200920" cy="10557"/>
-          </a:xfrm>
-          <a:prstGeom prst="straightConnector1">
+      <p:sp>
+        <p:nvSpPr>
+          <p:cNvPr id="244" name="Rectangle 8">
+            <a:extLst>
+              <a:ext uri="{FF2B5EF4-FFF2-40B4-BE49-F238E27FC236}">
+                <a16:creationId xmlns:a16="http://schemas.microsoft.com/office/drawing/2014/main" id="{03C14A99-AFE2-4118-A16F-28A955A84754}"/>
+              </a:ext>
+            </a:extLst>
+          </p:cNvPr>
+          <p:cNvSpPr/>
+          <p:nvPr/>
+        </p:nvSpPr>
+        <p:spPr>
+          <a:xfrm>
+            <a:off x="1582708" y="4751288"/>
+            <a:ext cx="1443661" cy="364396"/>
+          </a:xfrm>
+          <a:prstGeom prst="rect">
             <a:avLst/>
           </a:prstGeom>
           <a:ln w="19050">
             <a:solidFill>
               <a:srgbClr val="7030A0"/>
             </a:solidFill>
-            <a:headEnd type="none" w="med" len="med"/>
-            <a:tailEnd type="arrow" w="med" len="med"/>
           </a:ln>
           <a:effectLst/>
         </p:spPr>
         <p:style>
           <a:lnRef idx="1">
-            <a:schemeClr val="accent2"/>
+            <a:schemeClr val="accent4"/>
           </a:lnRef>
           <a:fillRef idx="2">
-            <a:schemeClr val="accent2"/>
+            <a:schemeClr val="accent4"/>
           </a:fillRef>
           <a:effectRef idx="1">
-            <a:schemeClr val="accent2"/>
+            <a:schemeClr val="accent4"/>
           </a:effectRef>
           <a:fontRef idx="minor">
             <a:schemeClr val="dk1"/>
           </a:fontRef>
         </p:style>
-      </p:cxnSp>
-      <p:sp>
-        <p:nvSpPr>
-          <p:cNvPr id="229" name="Flowchart: Decision 96">
-            <a:extLst>
-              <a:ext uri="{FF2B5EF4-FFF2-40B4-BE49-F238E27FC236}">
-                <a16:creationId xmlns:a16="http://schemas.microsoft.com/office/drawing/2014/main" id="{92EE9209-1D18-4E70-B55D-D9F70EF59420}"/>
+        <p:txBody>
+          <a:bodyPr rtlCol="0" anchor="ctr"/>
+          <a:lstStyle/>
+          <a:p>
+            <a:pPr algn="ctr"/>
+            <a:r>
+              <a:rPr lang="en-US" sz="1050" dirty="0">
+                <a:solidFill>
+                  <a:srgbClr val="7030A0"/>
+                </a:solidFill>
+              </a:rPr>
+              <a:t>&lt;&lt;interface&gt;&gt;</a:t>
+            </a:r>
+            <a:br>
+              <a:rPr lang="en-US" sz="1050" dirty="0">
+                <a:solidFill>
+                  <a:srgbClr val="7030A0"/>
+                </a:solidFill>
+              </a:rPr>
+            </a:br>
+            <a:r>
+              <a:rPr lang="en-US" sz="1050" dirty="0" err="1">
+                <a:solidFill>
+                  <a:srgbClr val="7030A0"/>
+                </a:solidFill>
+              </a:rPr>
+              <a:t>ReadOnlyEventList</a:t>
+            </a:r>
+            <a:endParaRPr lang="en-SG" sz="1050" dirty="0">
+              <a:solidFill>
+                <a:srgbClr val="7030A0"/>
+              </a:solidFill>
+            </a:endParaRPr>
+          </a:p>
+        </p:txBody>
+      </p:sp>
+      <p:sp>
+        <p:nvSpPr>
+          <p:cNvPr id="245" name="Isosceles Triangle 102">
+            <a:extLst>
+              <a:ext uri="{FF2B5EF4-FFF2-40B4-BE49-F238E27FC236}">
+                <a16:creationId xmlns:a16="http://schemas.microsoft.com/office/drawing/2014/main" id="{E4824317-C158-4E45-941F-4FCDC2ED7FBD}"/>
               </a:ext>
             </a:extLst>
           </p:cNvPr>
@@ -6276,14 +6915,21 @@
           <p:nvPr/>
         </p:nvSpPr>
         <p:spPr>
-          <a:xfrm>
-            <a:off x="2397444" y="4193646"/>
-            <a:ext cx="236048" cy="173380"/>
-          </a:xfrm>
-          <a:prstGeom prst="flowChartDecision">
-            <a:avLst/>
-          </a:prstGeom>
-          <a:noFill/>
+          <a:xfrm rot="16200000">
+            <a:off x="2990859" y="4822096"/>
+            <a:ext cx="271014" cy="187417"/>
+          </a:xfrm>
+          <a:prstGeom prst="triangle">
+            <a:avLst>
+              <a:gd name="adj" fmla="val 44517"/>
+            </a:avLst>
+          </a:prstGeom>
+          <a:solidFill>
+            <a:schemeClr val="accent4">
+              <a:lumMod val="20000"/>
+              <a:lumOff val="80000"/>
+            </a:schemeClr>
+          </a:solidFill>
           <a:ln w="19050">
             <a:solidFill>
               <a:srgbClr val="7030A0"/>
@@ -6310,16 +6956,118 @@
           <a:lstStyle/>
           <a:p>
             <a:pPr algn="ctr"/>
+            <a:endParaRPr lang="en-SG" sz="1050"/>
+          </a:p>
+        </p:txBody>
+      </p:sp>
+      <p:cxnSp>
+        <p:nvCxnSpPr>
+          <p:cNvPr id="246" name="Elbow Connector 63">
+            <a:extLst>
+              <a:ext uri="{FF2B5EF4-FFF2-40B4-BE49-F238E27FC236}">
+                <a16:creationId xmlns:a16="http://schemas.microsoft.com/office/drawing/2014/main" id="{E83DBFE0-E92A-4F52-8869-3C6BDDA369AB}"/>
+              </a:ext>
+            </a:extLst>
+          </p:cNvPr>
+          <p:cNvCxnSpPr>
+            <a:stCxn id="245" idx="3"/>
+          </p:cNvCxnSpPr>
+          <p:nvPr/>
+        </p:nvCxnSpPr>
+        <p:spPr>
+          <a:xfrm>
+            <a:off x="3220075" y="4930665"/>
+            <a:ext cx="271892" cy="2821"/>
+          </a:xfrm>
+          <a:prstGeom prst="bentConnector3">
+            <a:avLst>
+              <a:gd name="adj1" fmla="val 50000"/>
+            </a:avLst>
+          </a:prstGeom>
+          <a:ln w="19050">
+            <a:solidFill>
+              <a:srgbClr val="7030A0"/>
+            </a:solidFill>
+            <a:prstDash val="sysDot"/>
+            <a:headEnd type="none" w="med" len="med"/>
+            <a:tailEnd type="none" w="med" len="med"/>
+          </a:ln>
+          <a:effectLst/>
+        </p:spPr>
+        <p:style>
+          <a:lnRef idx="1">
+            <a:schemeClr val="accent2"/>
+          </a:lnRef>
+          <a:fillRef idx="2">
+            <a:schemeClr val="accent2"/>
+          </a:fillRef>
+          <a:effectRef idx="1">
+            <a:schemeClr val="accent2"/>
+          </a:effectRef>
+          <a:fontRef idx="minor">
+            <a:schemeClr val="dk1"/>
+          </a:fontRef>
+        </p:style>
+      </p:cxnSp>
+      <p:sp>
+        <p:nvSpPr>
+          <p:cNvPr id="247" name="Flowchart: Decision 96">
+            <a:extLst>
+              <a:ext uri="{FF2B5EF4-FFF2-40B4-BE49-F238E27FC236}">
+                <a16:creationId xmlns:a16="http://schemas.microsoft.com/office/drawing/2014/main" id="{48BFFA69-CC50-47EA-84AA-BB29052615E3}"/>
+              </a:ext>
+            </a:extLst>
+          </p:cNvPr>
+          <p:cNvSpPr/>
+          <p:nvPr/>
+        </p:nvSpPr>
+        <p:spPr>
+          <a:xfrm>
+            <a:off x="7030995" y="4237813"/>
+            <a:ext cx="236048" cy="173380"/>
+          </a:xfrm>
+          <a:prstGeom prst="flowChartDecision">
+            <a:avLst/>
+          </a:prstGeom>
+          <a:solidFill>
+            <a:srgbClr val="7030A0"/>
+          </a:solidFill>
+          <a:ln w="19050">
+            <a:solidFill>
+              <a:srgbClr val="7030A0"/>
+            </a:solidFill>
+          </a:ln>
+          <a:effectLst/>
+        </p:spPr>
+        <p:style>
+          <a:lnRef idx="1">
+            <a:schemeClr val="accent6"/>
+          </a:lnRef>
+          <a:fillRef idx="2">
+            <a:schemeClr val="accent6"/>
+          </a:fillRef>
+          <a:effectRef idx="1">
+            <a:schemeClr val="accent6"/>
+          </a:effectRef>
+          <a:fontRef idx="minor">
+            <a:schemeClr val="dk1"/>
+          </a:fontRef>
+        </p:style>
+        <p:txBody>
+          <a:bodyPr rtlCol="0" anchor="ctr"/>
+          <a:lstStyle/>
+          <a:p>
+            <a:pPr algn="ctr"/>
             <a:endParaRPr lang="en-US" sz="1050"/>
           </a:p>
         </p:txBody>
       </p:sp>
       <p:sp>
         <p:nvSpPr>
-          <p:cNvPr id="230" name="Rectangle 8">
-            <a:extLst>
-              <a:ext uri="{FF2B5EF4-FFF2-40B4-BE49-F238E27FC236}">
-                <a16:creationId xmlns:a16="http://schemas.microsoft.com/office/drawing/2014/main" id="{E9F68D61-B676-433B-B28E-B6A1A35E56F4}"/>
+          <p:cNvPr id="248" name="Rectangle 8">
+            <a:extLst>
+              <a:ext uri="{FF2B5EF4-FFF2-40B4-BE49-F238E27FC236}">
+                <a16:creationId xmlns:a16="http://schemas.microsoft.com/office/drawing/2014/main" id="{49DE0DAA-29FD-4BA9-ACA2-9A42112BEECC}"/>
               </a:ext>
             </a:extLst>
           </p:cNvPr>
@@ -6328,8 +7076,8 @@
         </p:nvSpPr>
         <p:spPr>
           <a:xfrm>
-            <a:off x="4701782" y="4123465"/>
-            <a:ext cx="1156969" cy="346760"/>
+            <a:off x="7712396" y="3847007"/>
+            <a:ext cx="822003" cy="285783"/>
           </a:xfrm>
           <a:prstGeom prst="rect">
             <a:avLst/>
@@ -6366,7 +7114,7 @@
                   <a:srgbClr val="7030A0"/>
                 </a:solidFill>
               </a:rPr>
-              <a:t>UniqueEventList</a:t>
+              <a:t>EventName</a:t>
             </a:r>
             <a:endParaRPr lang="en-SG" sz="1050" dirty="0">
               <a:solidFill>
@@ -6378,10 +7126,10 @@
       </p:sp>
       <p:sp>
         <p:nvSpPr>
-          <p:cNvPr id="231" name="Flowchart: Decision 96">
-            <a:extLst>
-              <a:ext uri="{FF2B5EF4-FFF2-40B4-BE49-F238E27FC236}">
-                <a16:creationId xmlns:a16="http://schemas.microsoft.com/office/drawing/2014/main" id="{2211BBB8-72FB-4217-BF9B-94407CAEEDE3}"/>
+          <p:cNvPr id="249" name="Rectangle 8">
+            <a:extLst>
+              <a:ext uri="{FF2B5EF4-FFF2-40B4-BE49-F238E27FC236}">
+                <a16:creationId xmlns:a16="http://schemas.microsoft.com/office/drawing/2014/main" id="{1F847553-DF9D-45B7-92EF-F382ACEB4C63}"/>
               </a:ext>
             </a:extLst>
           </p:cNvPr>
@@ -6390,15 +7138,813 @@
         </p:nvSpPr>
         <p:spPr>
           <a:xfrm>
-            <a:off x="4334104" y="4330141"/>
+            <a:off x="7712396" y="4182328"/>
+            <a:ext cx="822003" cy="285783"/>
+          </a:xfrm>
+          <a:prstGeom prst="rect">
+            <a:avLst/>
+          </a:prstGeom>
+          <a:ln w="19050">
+            <a:solidFill>
+              <a:srgbClr val="7030A0"/>
+            </a:solidFill>
+          </a:ln>
+          <a:effectLst/>
+        </p:spPr>
+        <p:style>
+          <a:lnRef idx="1">
+            <a:schemeClr val="accent4"/>
+          </a:lnRef>
+          <a:fillRef idx="2">
+            <a:schemeClr val="accent4"/>
+          </a:fillRef>
+          <a:effectRef idx="1">
+            <a:schemeClr val="accent4"/>
+          </a:effectRef>
+          <a:fontRef idx="minor">
+            <a:schemeClr val="dk1"/>
+          </a:fontRef>
+        </p:style>
+        <p:txBody>
+          <a:bodyPr rtlCol="0" anchor="ctr"/>
+          <a:lstStyle/>
+          <a:p>
+            <a:pPr algn="ctr"/>
+            <a:r>
+              <a:rPr lang="en-US" sz="1050" dirty="0">
+                <a:solidFill>
+                  <a:srgbClr val="7030A0"/>
+                </a:solidFill>
+              </a:rPr>
+              <a:t>Description</a:t>
+            </a:r>
+            <a:endParaRPr lang="en-SG" sz="1050" dirty="0">
+              <a:solidFill>
+                <a:srgbClr val="7030A0"/>
+              </a:solidFill>
+            </a:endParaRPr>
+          </a:p>
+        </p:txBody>
+      </p:sp>
+      <p:sp>
+        <p:nvSpPr>
+          <p:cNvPr id="250" name="Rectangle 8">
+            <a:extLst>
+              <a:ext uri="{FF2B5EF4-FFF2-40B4-BE49-F238E27FC236}">
+                <a16:creationId xmlns:a16="http://schemas.microsoft.com/office/drawing/2014/main" id="{83F43990-05A1-4783-81C4-CEAD15CDDF78}"/>
+              </a:ext>
+            </a:extLst>
+          </p:cNvPr>
+          <p:cNvSpPr/>
+          <p:nvPr/>
+        </p:nvSpPr>
+        <p:spPr>
+          <a:xfrm>
+            <a:off x="7705136" y="4530157"/>
+            <a:ext cx="822003" cy="285783"/>
+          </a:xfrm>
+          <a:prstGeom prst="rect">
+            <a:avLst/>
+          </a:prstGeom>
+          <a:ln w="19050">
+            <a:solidFill>
+              <a:srgbClr val="7030A0"/>
+            </a:solidFill>
+          </a:ln>
+          <a:effectLst/>
+        </p:spPr>
+        <p:style>
+          <a:lnRef idx="1">
+            <a:schemeClr val="accent4"/>
+          </a:lnRef>
+          <a:fillRef idx="2">
+            <a:schemeClr val="accent4"/>
+          </a:fillRef>
+          <a:effectRef idx="1">
+            <a:schemeClr val="accent4"/>
+          </a:effectRef>
+          <a:fontRef idx="minor">
+            <a:schemeClr val="dk1"/>
+          </a:fontRef>
+        </p:style>
+        <p:txBody>
+          <a:bodyPr rtlCol="0" anchor="ctr"/>
+          <a:lstStyle/>
+          <a:p>
+            <a:pPr algn="ctr"/>
+            <a:r>
+              <a:rPr lang="en-US" sz="1050" dirty="0">
+                <a:solidFill>
+                  <a:srgbClr val="7030A0"/>
+                </a:solidFill>
+              </a:rPr>
+              <a:t>Location</a:t>
+            </a:r>
+            <a:endParaRPr lang="en-SG" sz="1050" dirty="0">
+              <a:solidFill>
+                <a:srgbClr val="7030A0"/>
+              </a:solidFill>
+            </a:endParaRPr>
+          </a:p>
+        </p:txBody>
+      </p:sp>
+      <p:sp>
+        <p:nvSpPr>
+          <p:cNvPr id="251" name="Rectangle 8">
+            <a:extLst>
+              <a:ext uri="{FF2B5EF4-FFF2-40B4-BE49-F238E27FC236}">
+                <a16:creationId xmlns:a16="http://schemas.microsoft.com/office/drawing/2014/main" id="{520AFD69-CC77-4EEE-A211-20FDDC27923B}"/>
+              </a:ext>
+            </a:extLst>
+          </p:cNvPr>
+          <p:cNvSpPr/>
+          <p:nvPr/>
+        </p:nvSpPr>
+        <p:spPr>
+          <a:xfrm>
+            <a:off x="7712395" y="4877521"/>
+            <a:ext cx="822003" cy="285783"/>
+          </a:xfrm>
+          <a:prstGeom prst="rect">
+            <a:avLst/>
+          </a:prstGeom>
+          <a:ln w="19050">
+            <a:solidFill>
+              <a:srgbClr val="7030A0"/>
+            </a:solidFill>
+          </a:ln>
+          <a:effectLst/>
+        </p:spPr>
+        <p:style>
+          <a:lnRef idx="1">
+            <a:schemeClr val="accent4"/>
+          </a:lnRef>
+          <a:fillRef idx="2">
+            <a:schemeClr val="accent4"/>
+          </a:fillRef>
+          <a:effectRef idx="1">
+            <a:schemeClr val="accent4"/>
+          </a:effectRef>
+          <a:fontRef idx="minor">
+            <a:schemeClr val="dk1"/>
+          </a:fontRef>
+        </p:style>
+        <p:txBody>
+          <a:bodyPr rtlCol="0" anchor="ctr"/>
+          <a:lstStyle/>
+          <a:p>
+            <a:pPr algn="ctr"/>
+            <a:r>
+              <a:rPr lang="en-US" sz="1050" dirty="0">
+                <a:solidFill>
+                  <a:srgbClr val="7030A0"/>
+                </a:solidFill>
+              </a:rPr>
+              <a:t>Date</a:t>
+            </a:r>
+            <a:endParaRPr lang="en-SG" sz="1050" dirty="0">
+              <a:solidFill>
+                <a:srgbClr val="7030A0"/>
+              </a:solidFill>
+            </a:endParaRPr>
+          </a:p>
+        </p:txBody>
+      </p:sp>
+      <p:sp>
+        <p:nvSpPr>
+          <p:cNvPr id="252" name="Rectangle 8">
+            <a:extLst>
+              <a:ext uri="{FF2B5EF4-FFF2-40B4-BE49-F238E27FC236}">
+                <a16:creationId xmlns:a16="http://schemas.microsoft.com/office/drawing/2014/main" id="{8D2A408E-69B8-45AF-8B49-9275841084E3}"/>
+              </a:ext>
+            </a:extLst>
+          </p:cNvPr>
+          <p:cNvSpPr/>
+          <p:nvPr/>
+        </p:nvSpPr>
+        <p:spPr>
+          <a:xfrm>
+            <a:off x="7712395" y="5230426"/>
+            <a:ext cx="822003" cy="285783"/>
+          </a:xfrm>
+          <a:prstGeom prst="rect">
+            <a:avLst/>
+          </a:prstGeom>
+          <a:ln w="19050">
+            <a:solidFill>
+              <a:srgbClr val="7030A0"/>
+            </a:solidFill>
+          </a:ln>
+          <a:effectLst/>
+        </p:spPr>
+        <p:style>
+          <a:lnRef idx="1">
+            <a:schemeClr val="accent4"/>
+          </a:lnRef>
+          <a:fillRef idx="2">
+            <a:schemeClr val="accent4"/>
+          </a:fillRef>
+          <a:effectRef idx="1">
+            <a:schemeClr val="accent4"/>
+          </a:effectRef>
+          <a:fontRef idx="minor">
+            <a:schemeClr val="dk1"/>
+          </a:fontRef>
+        </p:style>
+        <p:txBody>
+          <a:bodyPr rtlCol="0" anchor="ctr"/>
+          <a:lstStyle/>
+          <a:p>
+            <a:pPr algn="ctr"/>
+            <a:r>
+              <a:rPr lang="en-US" sz="1050" dirty="0" err="1">
+                <a:solidFill>
+                  <a:srgbClr val="7030A0"/>
+                </a:solidFill>
+              </a:rPr>
+              <a:t>StartTime</a:t>
+            </a:r>
+            <a:endParaRPr lang="en-SG" sz="1050" dirty="0">
+              <a:solidFill>
+                <a:srgbClr val="7030A0"/>
+              </a:solidFill>
+            </a:endParaRPr>
+          </a:p>
+        </p:txBody>
+      </p:sp>
+      <p:sp>
+        <p:nvSpPr>
+          <p:cNvPr id="253" name="Rectangle 8">
+            <a:extLst>
+              <a:ext uri="{FF2B5EF4-FFF2-40B4-BE49-F238E27FC236}">
+                <a16:creationId xmlns:a16="http://schemas.microsoft.com/office/drawing/2014/main" id="{C3FC6752-0256-4166-ADB7-03270C5EB22F}"/>
+              </a:ext>
+            </a:extLst>
+          </p:cNvPr>
+          <p:cNvSpPr/>
+          <p:nvPr/>
+        </p:nvSpPr>
+        <p:spPr>
+          <a:xfrm>
+            <a:off x="7712395" y="5583331"/>
+            <a:ext cx="822003" cy="285783"/>
+          </a:xfrm>
+          <a:prstGeom prst="rect">
+            <a:avLst/>
+          </a:prstGeom>
+          <a:ln w="19050">
+            <a:solidFill>
+              <a:srgbClr val="7030A0"/>
+            </a:solidFill>
+          </a:ln>
+          <a:effectLst/>
+        </p:spPr>
+        <p:style>
+          <a:lnRef idx="1">
+            <a:schemeClr val="accent4"/>
+          </a:lnRef>
+          <a:fillRef idx="2">
+            <a:schemeClr val="accent4"/>
+          </a:fillRef>
+          <a:effectRef idx="1">
+            <a:schemeClr val="accent4"/>
+          </a:effectRef>
+          <a:fontRef idx="minor">
+            <a:schemeClr val="dk1"/>
+          </a:fontRef>
+        </p:style>
+        <p:txBody>
+          <a:bodyPr rtlCol="0" anchor="ctr"/>
+          <a:lstStyle/>
+          <a:p>
+            <a:pPr algn="ctr"/>
+            <a:r>
+              <a:rPr lang="en-US" sz="1050" dirty="0" err="1">
+                <a:solidFill>
+                  <a:srgbClr val="7030A0"/>
+                </a:solidFill>
+              </a:rPr>
+              <a:t>EndTime</a:t>
+            </a:r>
+            <a:endParaRPr lang="en-SG" sz="1050" dirty="0">
+              <a:solidFill>
+                <a:srgbClr val="7030A0"/>
+              </a:solidFill>
+            </a:endParaRPr>
+          </a:p>
+        </p:txBody>
+      </p:sp>
+      <p:cxnSp>
+        <p:nvCxnSpPr>
+          <p:cNvPr id="254" name="Elbow Connector 80">
+            <a:extLst>
+              <a:ext uri="{FF2B5EF4-FFF2-40B4-BE49-F238E27FC236}">
+                <a16:creationId xmlns:a16="http://schemas.microsoft.com/office/drawing/2014/main" id="{14059A74-FBED-48B2-A63F-F54DA5CAEA2B}"/>
+              </a:ext>
+            </a:extLst>
+          </p:cNvPr>
+          <p:cNvCxnSpPr>
+            <a:cxnSpLocks/>
+            <a:stCxn id="247" idx="3"/>
+            <a:endCxn id="248" idx="1"/>
+          </p:cNvCxnSpPr>
+          <p:nvPr/>
+        </p:nvCxnSpPr>
+        <p:spPr>
+          <a:xfrm flipV="1">
+            <a:off x="7267043" y="3989899"/>
+            <a:ext cx="445353" cy="334604"/>
+          </a:xfrm>
+          <a:prstGeom prst="bentConnector3">
+            <a:avLst/>
+          </a:prstGeom>
+          <a:ln w="19050">
+            <a:solidFill>
+              <a:srgbClr val="7030A0"/>
+            </a:solidFill>
+            <a:headEnd type="none" w="med" len="med"/>
+            <a:tailEnd type="arrow" w="med" len="med"/>
+          </a:ln>
+          <a:effectLst/>
+        </p:spPr>
+        <p:style>
+          <a:lnRef idx="1">
+            <a:schemeClr val="accent2"/>
+          </a:lnRef>
+          <a:fillRef idx="2">
+            <a:schemeClr val="accent2"/>
+          </a:fillRef>
+          <a:effectRef idx="1">
+            <a:schemeClr val="accent2"/>
+          </a:effectRef>
+          <a:fontRef idx="minor">
+            <a:schemeClr val="dk1"/>
+          </a:fontRef>
+        </p:style>
+      </p:cxnSp>
+      <p:cxnSp>
+        <p:nvCxnSpPr>
+          <p:cNvPr id="255" name="Elbow Connector 80">
+            <a:extLst>
+              <a:ext uri="{FF2B5EF4-FFF2-40B4-BE49-F238E27FC236}">
+                <a16:creationId xmlns:a16="http://schemas.microsoft.com/office/drawing/2014/main" id="{FF2D7F1E-C036-4996-9F7E-E8EEF31935EB}"/>
+              </a:ext>
+            </a:extLst>
+          </p:cNvPr>
+          <p:cNvCxnSpPr>
+            <a:cxnSpLocks/>
+            <a:stCxn id="247" idx="3"/>
+            <a:endCxn id="249" idx="1"/>
+          </p:cNvCxnSpPr>
+          <p:nvPr/>
+        </p:nvCxnSpPr>
+        <p:spPr>
+          <a:xfrm>
+            <a:off x="7267043" y="4324503"/>
+            <a:ext cx="445353" cy="717"/>
+          </a:xfrm>
+          <a:prstGeom prst="bentConnector3">
+            <a:avLst/>
+          </a:prstGeom>
+          <a:ln w="19050">
+            <a:solidFill>
+              <a:srgbClr val="7030A0"/>
+            </a:solidFill>
+            <a:headEnd type="none" w="med" len="med"/>
+            <a:tailEnd type="arrow" w="med" len="med"/>
+          </a:ln>
+          <a:effectLst/>
+        </p:spPr>
+        <p:style>
+          <a:lnRef idx="1">
+            <a:schemeClr val="accent2"/>
+          </a:lnRef>
+          <a:fillRef idx="2">
+            <a:schemeClr val="accent2"/>
+          </a:fillRef>
+          <a:effectRef idx="1">
+            <a:schemeClr val="accent2"/>
+          </a:effectRef>
+          <a:fontRef idx="minor">
+            <a:schemeClr val="dk1"/>
+          </a:fontRef>
+        </p:style>
+      </p:cxnSp>
+      <p:cxnSp>
+        <p:nvCxnSpPr>
+          <p:cNvPr id="256" name="Elbow Connector 80">
+            <a:extLst>
+              <a:ext uri="{FF2B5EF4-FFF2-40B4-BE49-F238E27FC236}">
+                <a16:creationId xmlns:a16="http://schemas.microsoft.com/office/drawing/2014/main" id="{23FE1157-879A-4369-82F8-C1C9CF1239BF}"/>
+              </a:ext>
+            </a:extLst>
+          </p:cNvPr>
+          <p:cNvCxnSpPr>
+            <a:cxnSpLocks/>
+            <a:endCxn id="250" idx="1"/>
+          </p:cNvCxnSpPr>
+          <p:nvPr/>
+        </p:nvCxnSpPr>
+        <p:spPr>
+          <a:xfrm>
+            <a:off x="7277995" y="4321101"/>
+            <a:ext cx="427141" cy="351948"/>
+          </a:xfrm>
+          <a:prstGeom prst="bentConnector3">
+            <a:avLst/>
+          </a:prstGeom>
+          <a:ln w="19050">
+            <a:solidFill>
+              <a:srgbClr val="7030A0"/>
+            </a:solidFill>
+            <a:headEnd type="none" w="med" len="med"/>
+            <a:tailEnd type="arrow" w="med" len="med"/>
+          </a:ln>
+          <a:effectLst/>
+        </p:spPr>
+        <p:style>
+          <a:lnRef idx="1">
+            <a:schemeClr val="accent2"/>
+          </a:lnRef>
+          <a:fillRef idx="2">
+            <a:schemeClr val="accent2"/>
+          </a:fillRef>
+          <a:effectRef idx="1">
+            <a:schemeClr val="accent2"/>
+          </a:effectRef>
+          <a:fontRef idx="minor">
+            <a:schemeClr val="dk1"/>
+          </a:fontRef>
+        </p:style>
+      </p:cxnSp>
+      <p:cxnSp>
+        <p:nvCxnSpPr>
+          <p:cNvPr id="257" name="Elbow Connector 80">
+            <a:extLst>
+              <a:ext uri="{FF2B5EF4-FFF2-40B4-BE49-F238E27FC236}">
+                <a16:creationId xmlns:a16="http://schemas.microsoft.com/office/drawing/2014/main" id="{654DBAD8-E72C-42A4-8236-11A19663ED75}"/>
+              </a:ext>
+            </a:extLst>
+          </p:cNvPr>
+          <p:cNvCxnSpPr>
+            <a:cxnSpLocks/>
+            <a:stCxn id="247" idx="3"/>
+            <a:endCxn id="251" idx="1"/>
+          </p:cNvCxnSpPr>
+          <p:nvPr/>
+        </p:nvCxnSpPr>
+        <p:spPr>
+          <a:xfrm>
+            <a:off x="7267043" y="4324503"/>
+            <a:ext cx="445352" cy="695910"/>
+          </a:xfrm>
+          <a:prstGeom prst="bentConnector3">
+            <a:avLst/>
+          </a:prstGeom>
+          <a:ln w="19050">
+            <a:solidFill>
+              <a:srgbClr val="7030A0"/>
+            </a:solidFill>
+            <a:headEnd type="none" w="med" len="med"/>
+            <a:tailEnd type="arrow" w="med" len="med"/>
+          </a:ln>
+          <a:effectLst/>
+        </p:spPr>
+        <p:style>
+          <a:lnRef idx="1">
+            <a:schemeClr val="accent2"/>
+          </a:lnRef>
+          <a:fillRef idx="2">
+            <a:schemeClr val="accent2"/>
+          </a:fillRef>
+          <a:effectRef idx="1">
+            <a:schemeClr val="accent2"/>
+          </a:effectRef>
+          <a:fontRef idx="minor">
+            <a:schemeClr val="dk1"/>
+          </a:fontRef>
+        </p:style>
+      </p:cxnSp>
+      <p:cxnSp>
+        <p:nvCxnSpPr>
+          <p:cNvPr id="258" name="Elbow Connector 80">
+            <a:extLst>
+              <a:ext uri="{FF2B5EF4-FFF2-40B4-BE49-F238E27FC236}">
+                <a16:creationId xmlns:a16="http://schemas.microsoft.com/office/drawing/2014/main" id="{65131DEE-19D9-4462-8AA2-80946A8C00D3}"/>
+              </a:ext>
+            </a:extLst>
+          </p:cNvPr>
+          <p:cNvCxnSpPr>
+            <a:cxnSpLocks/>
+            <a:stCxn id="247" idx="3"/>
+            <a:endCxn id="252" idx="1"/>
+          </p:cNvCxnSpPr>
+          <p:nvPr/>
+        </p:nvCxnSpPr>
+        <p:spPr>
+          <a:xfrm>
+            <a:off x="7267043" y="4324503"/>
+            <a:ext cx="445352" cy="1048815"/>
+          </a:xfrm>
+          <a:prstGeom prst="bentConnector3">
+            <a:avLst>
+              <a:gd name="adj1" fmla="val 50000"/>
+            </a:avLst>
+          </a:prstGeom>
+          <a:ln w="19050">
+            <a:solidFill>
+              <a:srgbClr val="7030A0"/>
+            </a:solidFill>
+            <a:headEnd type="none" w="med" len="med"/>
+            <a:tailEnd type="arrow" w="med" len="med"/>
+          </a:ln>
+          <a:effectLst/>
+        </p:spPr>
+        <p:style>
+          <a:lnRef idx="1">
+            <a:schemeClr val="accent2"/>
+          </a:lnRef>
+          <a:fillRef idx="2">
+            <a:schemeClr val="accent2"/>
+          </a:fillRef>
+          <a:effectRef idx="1">
+            <a:schemeClr val="accent2"/>
+          </a:effectRef>
+          <a:fontRef idx="minor">
+            <a:schemeClr val="dk1"/>
+          </a:fontRef>
+        </p:style>
+      </p:cxnSp>
+      <p:cxnSp>
+        <p:nvCxnSpPr>
+          <p:cNvPr id="259" name="Elbow Connector 80">
+            <a:extLst>
+              <a:ext uri="{FF2B5EF4-FFF2-40B4-BE49-F238E27FC236}">
+                <a16:creationId xmlns:a16="http://schemas.microsoft.com/office/drawing/2014/main" id="{71DA4A65-45BA-41B4-851C-A8143393B315}"/>
+              </a:ext>
+            </a:extLst>
+          </p:cNvPr>
+          <p:cNvCxnSpPr>
+            <a:cxnSpLocks/>
+            <a:stCxn id="247" idx="3"/>
+            <a:endCxn id="253" idx="1"/>
+          </p:cNvCxnSpPr>
+          <p:nvPr/>
+        </p:nvCxnSpPr>
+        <p:spPr>
+          <a:xfrm>
+            <a:off x="7267043" y="4324503"/>
+            <a:ext cx="445352" cy="1401720"/>
+          </a:xfrm>
+          <a:prstGeom prst="bentConnector3">
+            <a:avLst>
+              <a:gd name="adj1" fmla="val 50000"/>
+            </a:avLst>
+          </a:prstGeom>
+          <a:ln w="19050">
+            <a:solidFill>
+              <a:srgbClr val="7030A0"/>
+            </a:solidFill>
+            <a:headEnd type="none" w="med" len="med"/>
+            <a:tailEnd type="arrow" w="med" len="med"/>
+          </a:ln>
+          <a:effectLst/>
+        </p:spPr>
+        <p:style>
+          <a:lnRef idx="1">
+            <a:schemeClr val="accent2"/>
+          </a:lnRef>
+          <a:fillRef idx="2">
+            <a:schemeClr val="accent2"/>
+          </a:fillRef>
+          <a:effectRef idx="1">
+            <a:schemeClr val="accent2"/>
+          </a:effectRef>
+          <a:fontRef idx="minor">
+            <a:schemeClr val="dk1"/>
+          </a:fontRef>
+        </p:style>
+      </p:cxnSp>
+      <p:sp>
+        <p:nvSpPr>
+          <p:cNvPr id="260" name="TextBox 259">
+            <a:extLst>
+              <a:ext uri="{FF2B5EF4-FFF2-40B4-BE49-F238E27FC236}">
+                <a16:creationId xmlns:a16="http://schemas.microsoft.com/office/drawing/2014/main" id="{CCDF2DC3-34B2-4C97-93C5-37F8D0807DA3}"/>
+              </a:ext>
+            </a:extLst>
+          </p:cNvPr>
+          <p:cNvSpPr txBox="1"/>
+          <p:nvPr/>
+        </p:nvSpPr>
+        <p:spPr>
+          <a:xfrm>
+            <a:off x="6456384" y="3949785"/>
+            <a:ext cx="189257" cy="178683"/>
+          </a:xfrm>
+          <a:prstGeom prst="rect">
+            <a:avLst/>
+          </a:prstGeom>
+          <a:noFill/>
+        </p:spPr>
+        <p:txBody>
+          <a:bodyPr wrap="square" lIns="0" tIns="0" rIns="0" bIns="0" rtlCol="0">
+            <a:noAutofit/>
+          </a:bodyPr>
+          <a:lstStyle/>
+          <a:p>
+            <a:pPr algn="ctr"/>
+            <a:r>
+              <a:rPr lang="en-US" sz="1100" dirty="0">
+                <a:solidFill>
+                  <a:srgbClr val="7030A0"/>
+                </a:solidFill>
+              </a:rPr>
+              <a:t>1</a:t>
+            </a:r>
+            <a:endParaRPr lang="en-SG" sz="1100" dirty="0">
+              <a:solidFill>
+                <a:srgbClr val="7030A0"/>
+              </a:solidFill>
+            </a:endParaRPr>
+          </a:p>
+        </p:txBody>
+      </p:sp>
+      <p:sp>
+        <p:nvSpPr>
+          <p:cNvPr id="261" name="Rectangle 8">
+            <a:extLst>
+              <a:ext uri="{FF2B5EF4-FFF2-40B4-BE49-F238E27FC236}">
+                <a16:creationId xmlns:a16="http://schemas.microsoft.com/office/drawing/2014/main" id="{40440DB0-D254-468E-8668-44A057684A94}"/>
+              </a:ext>
+            </a:extLst>
+          </p:cNvPr>
+          <p:cNvSpPr/>
+          <p:nvPr/>
+        </p:nvSpPr>
+        <p:spPr>
+          <a:xfrm>
+            <a:off x="4780047" y="1933935"/>
+            <a:ext cx="1156969" cy="285783"/>
+          </a:xfrm>
+          <a:prstGeom prst="rect">
+            <a:avLst/>
+          </a:prstGeom>
+          <a:ln w="19050">
+            <a:solidFill>
+              <a:srgbClr val="7030A0"/>
+            </a:solidFill>
+          </a:ln>
+          <a:effectLst/>
+        </p:spPr>
+        <p:style>
+          <a:lnRef idx="1">
+            <a:schemeClr val="accent4"/>
+          </a:lnRef>
+          <a:fillRef idx="2">
+            <a:schemeClr val="accent4"/>
+          </a:fillRef>
+          <a:effectRef idx="1">
+            <a:schemeClr val="accent4"/>
+          </a:effectRef>
+          <a:fontRef idx="minor">
+            <a:schemeClr val="dk1"/>
+          </a:fontRef>
+        </p:style>
+        <p:txBody>
+          <a:bodyPr rtlCol="0" anchor="ctr"/>
+          <a:lstStyle/>
+          <a:p>
+            <a:pPr algn="ctr"/>
+            <a:r>
+              <a:rPr lang="en-US" sz="1050" dirty="0" err="1">
+                <a:solidFill>
+                  <a:srgbClr val="7030A0"/>
+                </a:solidFill>
+              </a:rPr>
+              <a:t>UniqueTagList</a:t>
+            </a:r>
+            <a:endParaRPr lang="en-SG" sz="1050" dirty="0">
+              <a:solidFill>
+                <a:srgbClr val="7030A0"/>
+              </a:solidFill>
+            </a:endParaRPr>
+          </a:p>
+        </p:txBody>
+      </p:sp>
+      <p:cxnSp>
+        <p:nvCxnSpPr>
+          <p:cNvPr id="262" name="Elbow Connector 78">
+            <a:extLst>
+              <a:ext uri="{FF2B5EF4-FFF2-40B4-BE49-F238E27FC236}">
+                <a16:creationId xmlns:a16="http://schemas.microsoft.com/office/drawing/2014/main" id="{1B5CC598-D1F7-4158-AE10-30CB5A318697}"/>
+              </a:ext>
+            </a:extLst>
+          </p:cNvPr>
+          <p:cNvCxnSpPr>
+            <a:cxnSpLocks/>
+            <a:endCxn id="261" idx="1"/>
+          </p:cNvCxnSpPr>
+          <p:nvPr/>
+        </p:nvCxnSpPr>
+        <p:spPr>
+          <a:xfrm rot="5400000" flipH="1" flipV="1">
+            <a:off x="4257356" y="2263248"/>
+            <a:ext cx="709111" cy="336271"/>
+          </a:xfrm>
+          <a:prstGeom prst="bentConnector2">
+            <a:avLst/>
+          </a:prstGeom>
+          <a:ln w="19050">
+            <a:solidFill>
+              <a:srgbClr val="7030A0"/>
+            </a:solidFill>
+            <a:headEnd type="none" w="med" len="med"/>
+            <a:tailEnd type="arrow" w="med" len="med"/>
+          </a:ln>
+          <a:effectLst/>
+        </p:spPr>
+        <p:style>
+          <a:lnRef idx="1">
+            <a:schemeClr val="accent2"/>
+          </a:lnRef>
+          <a:fillRef idx="2">
+            <a:schemeClr val="accent2"/>
+          </a:fillRef>
+          <a:effectRef idx="1">
+            <a:schemeClr val="accent2"/>
+          </a:effectRef>
+          <a:fontRef idx="minor">
+            <a:schemeClr val="dk1"/>
+          </a:fontRef>
+        </p:style>
+      </p:cxnSp>
+      <p:sp>
+        <p:nvSpPr>
+          <p:cNvPr id="263" name="TextBox 262">
+            <a:extLst>
+              <a:ext uri="{FF2B5EF4-FFF2-40B4-BE49-F238E27FC236}">
+                <a16:creationId xmlns:a16="http://schemas.microsoft.com/office/drawing/2014/main" id="{036C3F31-C28C-4690-B68D-5533FF17B32C}"/>
+              </a:ext>
+            </a:extLst>
+          </p:cNvPr>
+          <p:cNvSpPr txBox="1"/>
+          <p:nvPr/>
+        </p:nvSpPr>
+        <p:spPr>
+          <a:xfrm>
+            <a:off x="6738519" y="2157795"/>
+            <a:ext cx="189257" cy="178683"/>
+          </a:xfrm>
+          <a:prstGeom prst="rect">
+            <a:avLst/>
+          </a:prstGeom>
+          <a:noFill/>
+        </p:spPr>
+        <p:txBody>
+          <a:bodyPr wrap="square" lIns="0" tIns="0" rIns="0" bIns="0" rtlCol="0">
+            <a:noAutofit/>
+          </a:bodyPr>
+          <a:lstStyle/>
+          <a:p>
+            <a:pPr algn="ctr"/>
+            <a:r>
+              <a:rPr lang="en-US" sz="1100" dirty="0">
+                <a:solidFill>
+                  <a:srgbClr val="7030A0"/>
+                </a:solidFill>
+              </a:rPr>
+              <a:t>*</a:t>
+            </a:r>
+            <a:endParaRPr lang="en-SG" sz="1100" dirty="0">
+              <a:solidFill>
+                <a:srgbClr val="7030A0"/>
+              </a:solidFill>
+            </a:endParaRPr>
+          </a:p>
+        </p:txBody>
+      </p:sp>
+      <p:sp>
+        <p:nvSpPr>
+          <p:cNvPr id="264" name="Flowchart: Decision 96">
+            <a:extLst>
+              <a:ext uri="{FF2B5EF4-FFF2-40B4-BE49-F238E27FC236}">
+                <a16:creationId xmlns:a16="http://schemas.microsoft.com/office/drawing/2014/main" id="{9785EFD0-EF50-48C3-B7BC-AF13AD39E7C4}"/>
+              </a:ext>
+            </a:extLst>
+          </p:cNvPr>
+          <p:cNvSpPr/>
+          <p:nvPr/>
+        </p:nvSpPr>
+        <p:spPr>
+          <a:xfrm rot="16200000">
+            <a:off x="6577440" y="2521046"/>
             <a:ext cx="236048" cy="173380"/>
           </a:xfrm>
           <a:prstGeom prst="flowChartDecision">
             <a:avLst/>
           </a:prstGeom>
-          <a:solidFill>
-            <a:srgbClr val="7030A0"/>
-          </a:solidFill>
+          <a:noFill/>
           <a:ln w="19050">
             <a:solidFill>
               <a:srgbClr val="7030A0"/>
@@ -6429,12 +7975,59 @@
           </a:p>
         </p:txBody>
       </p:sp>
-      <p:sp>
-        <p:nvSpPr>
-          <p:cNvPr id="232" name="Rectangle 8">
-            <a:extLst>
-              <a:ext uri="{FF2B5EF4-FFF2-40B4-BE49-F238E27FC236}">
-                <a16:creationId xmlns:a16="http://schemas.microsoft.com/office/drawing/2014/main" id="{2216C3AB-18CE-4B48-BDE2-DA7C7395E0B2}"/>
+      <p:cxnSp>
+        <p:nvCxnSpPr>
+          <p:cNvPr id="265" name="Elbow Connector 63">
+            <a:extLst>
+              <a:ext uri="{FF2B5EF4-FFF2-40B4-BE49-F238E27FC236}">
+                <a16:creationId xmlns:a16="http://schemas.microsoft.com/office/drawing/2014/main" id="{CD3147BD-CB71-4290-BD5E-DBBF3BA83AC7}"/>
+              </a:ext>
+            </a:extLst>
+          </p:cNvPr>
+          <p:cNvCxnSpPr>
+            <a:cxnSpLocks/>
+            <a:endCxn id="266" idx="1"/>
+          </p:cNvCxnSpPr>
+          <p:nvPr/>
+        </p:nvCxnSpPr>
+        <p:spPr>
+          <a:xfrm flipV="1">
+            <a:off x="5908455" y="1960080"/>
+            <a:ext cx="432916" cy="111294"/>
+          </a:xfrm>
+          <a:prstGeom prst="bentConnector3">
+            <a:avLst/>
+          </a:prstGeom>
+          <a:ln w="19050">
+            <a:solidFill>
+              <a:srgbClr val="7030A0"/>
+            </a:solidFill>
+            <a:headEnd type="none" w="med" len="med"/>
+            <a:tailEnd type="arrow" w="med" len="med"/>
+          </a:ln>
+          <a:effectLst/>
+        </p:spPr>
+        <p:style>
+          <a:lnRef idx="1">
+            <a:schemeClr val="accent2"/>
+          </a:lnRef>
+          <a:fillRef idx="2">
+            <a:schemeClr val="accent2"/>
+          </a:fillRef>
+          <a:effectRef idx="1">
+            <a:schemeClr val="accent2"/>
+          </a:effectRef>
+          <a:fontRef idx="minor">
+            <a:schemeClr val="dk1"/>
+          </a:fontRef>
+        </p:style>
+      </p:cxnSp>
+      <p:sp>
+        <p:nvSpPr>
+          <p:cNvPr id="266" name="Rectangle 8">
+            <a:extLst>
+              <a:ext uri="{FF2B5EF4-FFF2-40B4-BE49-F238E27FC236}">
+                <a16:creationId xmlns:a16="http://schemas.microsoft.com/office/drawing/2014/main" id="{88A6E12A-4257-4782-8709-FF8EF2B63ED0}"/>
               </a:ext>
             </a:extLst>
           </p:cNvPr>
@@ -6443,7 +8036,7 @@
         </p:nvSpPr>
         <p:spPr>
           <a:xfrm>
-            <a:off x="6322809" y="4135369"/>
+            <a:off x="6341371" y="1786700"/>
             <a:ext cx="708186" cy="346760"/>
           </a:xfrm>
           <a:prstGeom prst="rect">
@@ -6481,7 +8074,7 @@
                   <a:srgbClr val="7030A0"/>
                 </a:solidFill>
               </a:rPr>
-              <a:t>Event</a:t>
+              <a:t>Tag</a:t>
             </a:r>
             <a:endParaRPr lang="en-SG" sz="1050" dirty="0">
               <a:solidFill>
@@ -6493,10 +8086,100 @@
       </p:sp>
       <p:sp>
         <p:nvSpPr>
-          <p:cNvPr id="233" name="Flowchart: Decision 96">
-            <a:extLst>
-              <a:ext uri="{FF2B5EF4-FFF2-40B4-BE49-F238E27FC236}">
-                <a16:creationId xmlns:a16="http://schemas.microsoft.com/office/drawing/2014/main" id="{E98CD532-7AA9-4A5D-89CE-67D552B184E5}"/>
+          <p:cNvPr id="267" name="TextBox 266">
+            <a:extLst>
+              <a:ext uri="{FF2B5EF4-FFF2-40B4-BE49-F238E27FC236}">
+                <a16:creationId xmlns:a16="http://schemas.microsoft.com/office/drawing/2014/main" id="{FE64F77B-DFCA-4865-8A67-5636D4BC0CE3}"/>
+              </a:ext>
+            </a:extLst>
+          </p:cNvPr>
+          <p:cNvSpPr txBox="1"/>
+          <p:nvPr/>
+        </p:nvSpPr>
+        <p:spPr>
+          <a:xfrm>
+            <a:off x="6159431" y="2005088"/>
+            <a:ext cx="189257" cy="178683"/>
+          </a:xfrm>
+          <a:prstGeom prst="rect">
+            <a:avLst/>
+          </a:prstGeom>
+          <a:noFill/>
+        </p:spPr>
+        <p:txBody>
+          <a:bodyPr wrap="square" lIns="0" tIns="0" rIns="0" bIns="0" rtlCol="0">
+            <a:noAutofit/>
+          </a:bodyPr>
+          <a:lstStyle/>
+          <a:p>
+            <a:pPr algn="ctr"/>
+            <a:r>
+              <a:rPr lang="en-US" sz="1100" dirty="0">
+                <a:solidFill>
+                  <a:srgbClr val="7030A0"/>
+                </a:solidFill>
+              </a:rPr>
+              <a:t>*</a:t>
+            </a:r>
+            <a:endParaRPr lang="en-SG" sz="1100" dirty="0">
+              <a:solidFill>
+                <a:srgbClr val="7030A0"/>
+              </a:solidFill>
+            </a:endParaRPr>
+          </a:p>
+        </p:txBody>
+      </p:sp>
+      <p:sp>
+        <p:nvSpPr>
+          <p:cNvPr id="268" name="TextBox 267">
+            <a:extLst>
+              <a:ext uri="{FF2B5EF4-FFF2-40B4-BE49-F238E27FC236}">
+                <a16:creationId xmlns:a16="http://schemas.microsoft.com/office/drawing/2014/main" id="{DEBAD80E-9558-4545-9B5C-1011497635DE}"/>
+              </a:ext>
+            </a:extLst>
+          </p:cNvPr>
+          <p:cNvSpPr txBox="1"/>
+          <p:nvPr/>
+        </p:nvSpPr>
+        <p:spPr>
+          <a:xfrm>
+            <a:off x="4391275" y="1900046"/>
+            <a:ext cx="189257" cy="178683"/>
+          </a:xfrm>
+          <a:prstGeom prst="rect">
+            <a:avLst/>
+          </a:prstGeom>
+          <a:noFill/>
+        </p:spPr>
+        <p:txBody>
+          <a:bodyPr wrap="square" lIns="0" tIns="0" rIns="0" bIns="0" rtlCol="0">
+            <a:noAutofit/>
+          </a:bodyPr>
+          <a:lstStyle/>
+          <a:p>
+            <a:pPr algn="ctr"/>
+            <a:r>
+              <a:rPr lang="en-US" sz="1100" dirty="0">
+                <a:solidFill>
+                  <a:srgbClr val="7030A0"/>
+                </a:solidFill>
+              </a:rPr>
+              <a:t>1</a:t>
+            </a:r>
+            <a:endParaRPr lang="en-SG" sz="1100" dirty="0">
+              <a:solidFill>
+                <a:srgbClr val="7030A0"/>
+              </a:solidFill>
+            </a:endParaRPr>
+          </a:p>
+        </p:txBody>
+      </p:sp>
+      <p:sp>
+        <p:nvSpPr>
+          <p:cNvPr id="269" name="Flowchart: Decision 96">
+            <a:extLst>
+              <a:ext uri="{FF2B5EF4-FFF2-40B4-BE49-F238E27FC236}">
+                <a16:creationId xmlns:a16="http://schemas.microsoft.com/office/drawing/2014/main" id="{706253E2-1226-4B48-A404-BCE6BDD4745D}"/>
               </a:ext>
             </a:extLst>
           </p:cNvPr>
@@ -6505,13 +8188,15 @@
         </p:nvSpPr>
         <p:spPr>
           <a:xfrm>
-            <a:off x="5867883" y="4218979"/>
+            <a:off x="5935504" y="1989155"/>
             <a:ext cx="236048" cy="173380"/>
           </a:xfrm>
           <a:prstGeom prst="flowChartDecision">
             <a:avLst/>
           </a:prstGeom>
-          <a:noFill/>
+          <a:solidFill>
+            <a:srgbClr val="7030A0"/>
+          </a:solidFill>
           <a:ln w="19050">
             <a:solidFill>
               <a:srgbClr val="7030A0"/>
@@ -6544,23 +8229,24 @@
       </p:sp>
       <p:cxnSp>
         <p:nvCxnSpPr>
-          <p:cNvPr id="234" name="Elbow Connector 63">
-            <a:extLst>
-              <a:ext uri="{FF2B5EF4-FFF2-40B4-BE49-F238E27FC236}">
-                <a16:creationId xmlns:a16="http://schemas.microsoft.com/office/drawing/2014/main" id="{FEEF3E50-D97E-4AB6-AF95-29613B5E0D57}"/>
+          <p:cNvPr id="270" name="Elbow Connector 63">
+            <a:extLst>
+              <a:ext uri="{FF2B5EF4-FFF2-40B4-BE49-F238E27FC236}">
+                <a16:creationId xmlns:a16="http://schemas.microsoft.com/office/drawing/2014/main" id="{C87BABFE-EDB5-4B1E-891B-C51B3268DDE7}"/>
               </a:ext>
             </a:extLst>
           </p:cNvPr>
           <p:cNvCxnSpPr>
-            <a:stCxn id="233" idx="3"/>
-            <a:endCxn id="232" idx="1"/>
+            <a:cxnSpLocks/>
+            <a:stCxn id="264" idx="3"/>
+            <a:endCxn id="266" idx="2"/>
           </p:cNvCxnSpPr>
           <p:nvPr/>
         </p:nvCxnSpPr>
         <p:spPr>
-          <a:xfrm>
-            <a:off x="6103931" y="4305669"/>
-            <a:ext cx="218878" cy="3080"/>
+          <a:xfrm rot="5400000" flipH="1" flipV="1">
+            <a:off x="6517338" y="2311586"/>
+            <a:ext cx="356252" cy="12700"/>
           </a:xfrm>
           <a:prstGeom prst="bentConnector3">
             <a:avLst/>
@@ -6591,347 +8277,22 @@
       </p:cxnSp>
       <p:sp>
         <p:nvSpPr>
-          <p:cNvPr id="235" name="TextBox 234">
-            <a:extLst>
-              <a:ext uri="{FF2B5EF4-FFF2-40B4-BE49-F238E27FC236}">
-                <a16:creationId xmlns:a16="http://schemas.microsoft.com/office/drawing/2014/main" id="{E3A4F28D-5759-412C-893D-54BE367538B1}"/>
-              </a:ext>
-            </a:extLst>
-          </p:cNvPr>
-          <p:cNvSpPr txBox="1"/>
-          <p:nvPr/>
-        </p:nvSpPr>
-        <p:spPr>
-          <a:xfrm>
-            <a:off x="4484389" y="4464560"/>
-            <a:ext cx="189257" cy="178683"/>
+          <p:cNvPr id="96" name="Rectangle 8">
+            <a:extLst>
+              <a:ext uri="{FF2B5EF4-FFF2-40B4-BE49-F238E27FC236}">
+                <a16:creationId xmlns:a16="http://schemas.microsoft.com/office/drawing/2014/main" id="{4135A876-424B-454F-9E44-8881DB782A2B}"/>
+              </a:ext>
+            </a:extLst>
+          </p:cNvPr>
+          <p:cNvSpPr/>
+          <p:nvPr/>
+        </p:nvSpPr>
+        <p:spPr>
+          <a:xfrm>
+            <a:off x="7712396" y="5927266"/>
+            <a:ext cx="898204" cy="285783"/>
           </a:xfrm>
           <a:prstGeom prst="rect">
-            <a:avLst/>
-          </a:prstGeom>
-          <a:noFill/>
-        </p:spPr>
-        <p:txBody>
-          <a:bodyPr wrap="square" lIns="0" tIns="0" rIns="0" bIns="0" rtlCol="0">
-            <a:noAutofit/>
-          </a:bodyPr>
-          <a:lstStyle/>
-          <a:p>
-            <a:pPr algn="ctr"/>
-            <a:r>
-              <a:rPr lang="en-US" sz="1100" dirty="0">
-                <a:solidFill>
-                  <a:srgbClr val="7030A0"/>
-                </a:solidFill>
-              </a:rPr>
-              <a:t>1</a:t>
-            </a:r>
-            <a:endParaRPr lang="en-SG" sz="1100" dirty="0">
-              <a:solidFill>
-                <a:srgbClr val="7030A0"/>
-              </a:solidFill>
-            </a:endParaRPr>
-          </a:p>
-        </p:txBody>
-      </p:sp>
-      <p:sp>
-        <p:nvSpPr>
-          <p:cNvPr id="236" name="TextBox 235">
-            <a:extLst>
-              <a:ext uri="{FF2B5EF4-FFF2-40B4-BE49-F238E27FC236}">
-                <a16:creationId xmlns:a16="http://schemas.microsoft.com/office/drawing/2014/main" id="{C2C0BA7E-073F-4633-8F25-6547099A30AD}"/>
-              </a:ext>
-            </a:extLst>
-          </p:cNvPr>
-          <p:cNvSpPr txBox="1"/>
-          <p:nvPr/>
-        </p:nvSpPr>
-        <p:spPr>
-          <a:xfrm>
-            <a:off x="6144388" y="4375220"/>
-            <a:ext cx="189257" cy="178683"/>
-          </a:xfrm>
-          <a:prstGeom prst="rect">
-            <a:avLst/>
-          </a:prstGeom>
-          <a:noFill/>
-        </p:spPr>
-        <p:txBody>
-          <a:bodyPr wrap="square" lIns="0" tIns="0" rIns="0" bIns="0" rtlCol="0">
-            <a:noAutofit/>
-          </a:bodyPr>
-          <a:lstStyle/>
-          <a:p>
-            <a:pPr algn="ctr"/>
-            <a:r>
-              <a:rPr lang="en-US" sz="1100" dirty="0">
-                <a:solidFill>
-                  <a:srgbClr val="7030A0"/>
-                </a:solidFill>
-              </a:rPr>
-              <a:t>*</a:t>
-            </a:r>
-            <a:endParaRPr lang="en-SG" sz="1100" dirty="0">
-              <a:solidFill>
-                <a:srgbClr val="7030A0"/>
-              </a:solidFill>
-            </a:endParaRPr>
-          </a:p>
-        </p:txBody>
-      </p:sp>
-      <p:sp>
-        <p:nvSpPr>
-          <p:cNvPr id="237" name="TextBox 236">
-            <a:extLst>
-              <a:ext uri="{FF2B5EF4-FFF2-40B4-BE49-F238E27FC236}">
-                <a16:creationId xmlns:a16="http://schemas.microsoft.com/office/drawing/2014/main" id="{7926C44F-B509-475E-ABB3-1B890D0378B5}"/>
-              </a:ext>
-            </a:extLst>
-          </p:cNvPr>
-          <p:cNvSpPr txBox="1"/>
-          <p:nvPr/>
-        </p:nvSpPr>
-        <p:spPr>
-          <a:xfrm>
-            <a:off x="2582526" y="4034018"/>
-            <a:ext cx="170110" cy="137542"/>
-          </a:xfrm>
-          <a:prstGeom prst="rect">
-            <a:avLst/>
-          </a:prstGeom>
-          <a:noFill/>
-        </p:spPr>
-        <p:txBody>
-          <a:bodyPr wrap="square" lIns="0" tIns="0" rIns="0" bIns="0" rtlCol="0">
-            <a:noAutofit/>
-          </a:bodyPr>
-          <a:lstStyle/>
-          <a:p>
-            <a:pPr algn="ctr"/>
-            <a:r>
-              <a:rPr lang="en-US" sz="1100" dirty="0">
-                <a:solidFill>
-                  <a:srgbClr val="7030A0"/>
-                </a:solidFill>
-              </a:rPr>
-              <a:t>1</a:t>
-            </a:r>
-            <a:endParaRPr lang="en-SG" sz="1100" dirty="0">
-              <a:solidFill>
-                <a:srgbClr val="7030A0"/>
-              </a:solidFill>
-            </a:endParaRPr>
-          </a:p>
-        </p:txBody>
-      </p:sp>
-      <p:cxnSp>
-        <p:nvCxnSpPr>
-          <p:cNvPr id="238" name="Straight Arrow Connector 237">
-            <a:extLst>
-              <a:ext uri="{FF2B5EF4-FFF2-40B4-BE49-F238E27FC236}">
-                <a16:creationId xmlns:a16="http://schemas.microsoft.com/office/drawing/2014/main" id="{221AD497-D1C8-4227-88B1-F79A55C206EF}"/>
-              </a:ext>
-            </a:extLst>
-          </p:cNvPr>
-          <p:cNvCxnSpPr>
-            <a:cxnSpLocks/>
-            <a:endCxn id="230" idx="1"/>
-          </p:cNvCxnSpPr>
-          <p:nvPr/>
-        </p:nvCxnSpPr>
-        <p:spPr>
-          <a:xfrm>
-            <a:off x="4334104" y="4284525"/>
-            <a:ext cx="367678" cy="12320"/>
-          </a:xfrm>
-          <a:prstGeom prst="straightConnector1">
-            <a:avLst/>
-          </a:prstGeom>
-          <a:ln w="19050">
-            <a:solidFill>
-              <a:srgbClr val="7030A0"/>
-            </a:solidFill>
-            <a:headEnd type="none" w="med" len="med"/>
-            <a:tailEnd type="arrow" w="med" len="med"/>
-          </a:ln>
-          <a:effectLst/>
-        </p:spPr>
-        <p:style>
-          <a:lnRef idx="1">
-            <a:schemeClr val="accent2"/>
-          </a:lnRef>
-          <a:fillRef idx="2">
-            <a:schemeClr val="accent2"/>
-          </a:fillRef>
-          <a:effectRef idx="1">
-            <a:schemeClr val="accent2"/>
-          </a:effectRef>
-          <a:fontRef idx="minor">
-            <a:schemeClr val="dk1"/>
-          </a:fontRef>
-        </p:style>
-      </p:cxnSp>
-      <p:cxnSp>
-        <p:nvCxnSpPr>
-          <p:cNvPr id="239" name="Elbow Connector 106">
-            <a:extLst>
-              <a:ext uri="{FF2B5EF4-FFF2-40B4-BE49-F238E27FC236}">
-                <a16:creationId xmlns:a16="http://schemas.microsoft.com/office/drawing/2014/main" id="{51CE78C2-068D-47D9-8B14-B86651FB37F9}"/>
-              </a:ext>
-            </a:extLst>
-          </p:cNvPr>
-          <p:cNvCxnSpPr>
-            <a:cxnSpLocks/>
-            <a:endCxn id="232" idx="0"/>
-          </p:cNvCxnSpPr>
-          <p:nvPr/>
-        </p:nvCxnSpPr>
-        <p:spPr>
-          <a:xfrm>
-            <a:off x="2220076" y="3938972"/>
-            <a:ext cx="4456826" cy="196397"/>
-          </a:xfrm>
-          <a:prstGeom prst="bentConnector2">
-            <a:avLst/>
-          </a:prstGeom>
-          <a:ln w="19050">
-            <a:solidFill>
-              <a:srgbClr val="7030A0"/>
-            </a:solidFill>
-            <a:prstDash val="solid"/>
-            <a:headEnd type="none" w="med" len="med"/>
-            <a:tailEnd type="arrow" w="med" len="med"/>
-          </a:ln>
-          <a:effectLst/>
-        </p:spPr>
-        <p:style>
-          <a:lnRef idx="1">
-            <a:schemeClr val="accent2"/>
-          </a:lnRef>
-          <a:fillRef idx="2">
-            <a:schemeClr val="accent2"/>
-          </a:fillRef>
-          <a:effectRef idx="1">
-            <a:schemeClr val="accent2"/>
-          </a:effectRef>
-          <a:fontRef idx="minor">
-            <a:schemeClr val="dk1"/>
-          </a:fontRef>
-        </p:style>
-      </p:cxnSp>
-      <p:sp>
-        <p:nvSpPr>
-          <p:cNvPr id="240" name="TextBox 239">
-            <a:extLst>
-              <a:ext uri="{FF2B5EF4-FFF2-40B4-BE49-F238E27FC236}">
-                <a16:creationId xmlns:a16="http://schemas.microsoft.com/office/drawing/2014/main" id="{4A5346F5-1BD5-4A06-B22D-9CC08EB5A9F3}"/>
-              </a:ext>
-            </a:extLst>
-          </p:cNvPr>
-          <p:cNvSpPr txBox="1"/>
-          <p:nvPr/>
-        </p:nvSpPr>
-        <p:spPr>
-          <a:xfrm>
-            <a:off x="6302294" y="3670461"/>
-            <a:ext cx="881018" cy="261610"/>
-          </a:xfrm>
-          <a:prstGeom prst="rect">
-            <a:avLst/>
-          </a:prstGeom>
-          <a:noFill/>
-        </p:spPr>
-        <p:txBody>
-          <a:bodyPr wrap="square" rtlCol="0">
-            <a:spAutoFit/>
-          </a:bodyPr>
-          <a:lstStyle/>
-          <a:p>
-            <a:pPr algn="r"/>
-            <a:r>
-              <a:rPr lang="en-US" sz="1100" dirty="0">
-                <a:solidFill>
-                  <a:srgbClr val="7030A0"/>
-                </a:solidFill>
-              </a:rPr>
-              <a:t>filtered list</a:t>
-            </a:r>
-            <a:endParaRPr lang="en-SG" sz="1100" dirty="0">
-              <a:solidFill>
-                <a:srgbClr val="7030A0"/>
-              </a:solidFill>
-            </a:endParaRPr>
-          </a:p>
-        </p:txBody>
-      </p:sp>
-      <p:cxnSp>
-        <p:nvCxnSpPr>
-          <p:cNvPr id="241" name="Elbow Connector 63">
-            <a:extLst>
-              <a:ext uri="{FF2B5EF4-FFF2-40B4-BE49-F238E27FC236}">
-                <a16:creationId xmlns:a16="http://schemas.microsoft.com/office/drawing/2014/main" id="{920C4039-8159-4646-9C2D-DED62064D0BC}"/>
-              </a:ext>
-            </a:extLst>
-          </p:cNvPr>
-          <p:cNvCxnSpPr>
-            <a:cxnSpLocks/>
-            <a:stCxn id="242" idx="3"/>
-          </p:cNvCxnSpPr>
-          <p:nvPr/>
-        </p:nvCxnSpPr>
-        <p:spPr>
-          <a:xfrm rot="16200000" flipV="1">
-            <a:off x="3989653" y="4516981"/>
-            <a:ext cx="119389" cy="2069"/>
-          </a:xfrm>
-          <a:prstGeom prst="bentConnector3">
-            <a:avLst>
-              <a:gd name="adj1" fmla="val 50000"/>
-            </a:avLst>
-          </a:prstGeom>
-          <a:ln w="19050">
-            <a:solidFill>
-              <a:srgbClr val="7030A0"/>
-            </a:solidFill>
-            <a:prstDash val="sysDot"/>
-            <a:headEnd type="none" w="med" len="med"/>
-            <a:tailEnd type="none" w="med" len="med"/>
-          </a:ln>
-          <a:effectLst/>
-        </p:spPr>
-        <p:style>
-          <a:lnRef idx="1">
-            <a:schemeClr val="accent2"/>
-          </a:lnRef>
-          <a:fillRef idx="2">
-            <a:schemeClr val="accent2"/>
-          </a:fillRef>
-          <a:effectRef idx="1">
-            <a:schemeClr val="accent2"/>
-          </a:effectRef>
-          <a:fontRef idx="minor">
-            <a:schemeClr val="dk1"/>
-          </a:fontRef>
-        </p:style>
-      </p:cxnSp>
-      <p:sp>
-        <p:nvSpPr>
-          <p:cNvPr id="242" name="Isosceles Triangle 102">
-            <a:extLst>
-              <a:ext uri="{FF2B5EF4-FFF2-40B4-BE49-F238E27FC236}">
-                <a16:creationId xmlns:a16="http://schemas.microsoft.com/office/drawing/2014/main" id="{526F689F-1E11-4887-A8B8-C3A964E780EB}"/>
-              </a:ext>
-            </a:extLst>
-          </p:cNvPr>
-          <p:cNvSpPr/>
-          <p:nvPr/>
-        </p:nvSpPr>
-        <p:spPr>
-          <a:xfrm flipV="1">
-            <a:off x="3909187" y="4577710"/>
-            <a:ext cx="282387" cy="157062"/>
-          </a:xfrm>
-          <a:prstGeom prst="triangle">
             <a:avLst/>
           </a:prstGeom>
           <a:ln w="19050">
@@ -6960,67 +8321,13 @@
           <a:lstStyle/>
           <a:p>
             <a:pPr algn="ctr"/>
-            <a:endParaRPr lang="en-SG" sz="1050" b="1">
-              <a:solidFill>
-                <a:srgbClr val="92D050"/>
-              </a:solidFill>
-            </a:endParaRPr>
-          </a:p>
-        </p:txBody>
-      </p:sp>
-      <p:sp>
-        <p:nvSpPr>
-          <p:cNvPr id="243" name="Rectangle 8">
-            <a:extLst>
-              <a:ext uri="{FF2B5EF4-FFF2-40B4-BE49-F238E27FC236}">
-                <a16:creationId xmlns:a16="http://schemas.microsoft.com/office/drawing/2014/main" id="{69B1CE57-749A-4561-BEDB-976ADBA2DB5F}"/>
-              </a:ext>
-            </a:extLst>
-          </p:cNvPr>
-          <p:cNvSpPr/>
-          <p:nvPr/>
-        </p:nvSpPr>
-        <p:spPr>
-          <a:xfrm>
-            <a:off x="3479784" y="4751288"/>
-            <a:ext cx="1060683" cy="364396"/>
-          </a:xfrm>
-          <a:prstGeom prst="rect">
-            <a:avLst/>
-          </a:prstGeom>
-          <a:ln w="19050">
-            <a:solidFill>
-              <a:srgbClr val="7030A0"/>
-            </a:solidFill>
-          </a:ln>
-          <a:effectLst/>
-        </p:spPr>
-        <p:style>
-          <a:lnRef idx="1">
-            <a:schemeClr val="accent4"/>
-          </a:lnRef>
-          <a:fillRef idx="2">
-            <a:schemeClr val="accent4"/>
-          </a:fillRef>
-          <a:effectRef idx="1">
-            <a:schemeClr val="accent4"/>
-          </a:effectRef>
-          <a:fontRef idx="minor">
-            <a:schemeClr val="dk1"/>
-          </a:fontRef>
-        </p:style>
-        <p:txBody>
-          <a:bodyPr rtlCol="0" anchor="ctr"/>
-          <a:lstStyle/>
-          <a:p>
-            <a:pPr algn="ctr"/>
-            <a:r>
-              <a:rPr lang="en-US" sz="1050" dirty="0" err="1">
+            <a:r>
+              <a:rPr lang="en-US" sz="1050" dirty="0">
                 <a:solidFill>
                   <a:srgbClr val="7030A0"/>
                 </a:solidFill>
               </a:rPr>
-              <a:t>EventList</a:t>
+              <a:t>Attendees</a:t>
             </a:r>
             <a:endParaRPr lang="en-SG" sz="1050" dirty="0">
               <a:solidFill>
@@ -7030,1431 +8337,31 @@
           </a:p>
         </p:txBody>
       </p:sp>
-      <p:sp>
-        <p:nvSpPr>
-          <p:cNvPr id="244" name="Rectangle 8">
-            <a:extLst>
-              <a:ext uri="{FF2B5EF4-FFF2-40B4-BE49-F238E27FC236}">
-                <a16:creationId xmlns:a16="http://schemas.microsoft.com/office/drawing/2014/main" id="{03C14A99-AFE2-4118-A16F-28A955A84754}"/>
-              </a:ext>
-            </a:extLst>
-          </p:cNvPr>
-          <p:cNvSpPr/>
-          <p:nvPr/>
-        </p:nvSpPr>
-        <p:spPr>
-          <a:xfrm>
-            <a:off x="1582708" y="4751288"/>
-            <a:ext cx="1443661" cy="364396"/>
-          </a:xfrm>
-          <a:prstGeom prst="rect">
-            <a:avLst/>
-          </a:prstGeom>
-          <a:ln w="19050">
-            <a:solidFill>
-              <a:srgbClr val="7030A0"/>
-            </a:solidFill>
-          </a:ln>
-          <a:effectLst/>
-        </p:spPr>
-        <p:style>
-          <a:lnRef idx="1">
-            <a:schemeClr val="accent4"/>
-          </a:lnRef>
-          <a:fillRef idx="2">
-            <a:schemeClr val="accent4"/>
-          </a:fillRef>
-          <a:effectRef idx="1">
-            <a:schemeClr val="accent4"/>
-          </a:effectRef>
-          <a:fontRef idx="minor">
-            <a:schemeClr val="dk1"/>
-          </a:fontRef>
-        </p:style>
-        <p:txBody>
-          <a:bodyPr rtlCol="0" anchor="ctr"/>
-          <a:lstStyle/>
-          <a:p>
-            <a:pPr algn="ctr"/>
-            <a:r>
-              <a:rPr lang="en-US" sz="1050" dirty="0">
-                <a:solidFill>
-                  <a:srgbClr val="7030A0"/>
-                </a:solidFill>
-              </a:rPr>
-              <a:t>&lt;&lt;interface&gt;&gt;</a:t>
-            </a:r>
-            <a:br>
-              <a:rPr lang="en-US" sz="1050" dirty="0">
-                <a:solidFill>
-                  <a:srgbClr val="7030A0"/>
-                </a:solidFill>
-              </a:rPr>
-            </a:br>
-            <a:r>
-              <a:rPr lang="en-US" sz="1050" dirty="0" err="1">
-                <a:solidFill>
-                  <a:srgbClr val="7030A0"/>
-                </a:solidFill>
-              </a:rPr>
-              <a:t>ReadOnlyEventList</a:t>
-            </a:r>
-            <a:endParaRPr lang="en-SG" sz="1050" dirty="0">
-              <a:solidFill>
-                <a:srgbClr val="7030A0"/>
-              </a:solidFill>
-            </a:endParaRPr>
-          </a:p>
-        </p:txBody>
-      </p:sp>
-      <p:sp>
-        <p:nvSpPr>
-          <p:cNvPr id="245" name="Isosceles Triangle 102">
-            <a:extLst>
-              <a:ext uri="{FF2B5EF4-FFF2-40B4-BE49-F238E27FC236}">
-                <a16:creationId xmlns:a16="http://schemas.microsoft.com/office/drawing/2014/main" id="{E4824317-C158-4E45-941F-4FCDC2ED7FBD}"/>
-              </a:ext>
-            </a:extLst>
-          </p:cNvPr>
-          <p:cNvSpPr/>
-          <p:nvPr/>
-        </p:nvSpPr>
-        <p:spPr>
-          <a:xfrm rot="16200000">
-            <a:off x="2990859" y="4822096"/>
-            <a:ext cx="271014" cy="187417"/>
-          </a:xfrm>
-          <a:prstGeom prst="triangle">
-            <a:avLst>
-              <a:gd name="adj" fmla="val 44517"/>
-            </a:avLst>
-          </a:prstGeom>
-          <a:solidFill>
-            <a:schemeClr val="accent4">
-              <a:lumMod val="20000"/>
-              <a:lumOff val="80000"/>
-            </a:schemeClr>
-          </a:solidFill>
-          <a:ln w="19050">
-            <a:solidFill>
-              <a:srgbClr val="7030A0"/>
-            </a:solidFill>
-          </a:ln>
-          <a:effectLst/>
-        </p:spPr>
-        <p:style>
-          <a:lnRef idx="1">
-            <a:schemeClr val="accent6"/>
-          </a:lnRef>
-          <a:fillRef idx="2">
-            <a:schemeClr val="accent6"/>
-          </a:fillRef>
-          <a:effectRef idx="1">
-            <a:schemeClr val="accent6"/>
-          </a:effectRef>
-          <a:fontRef idx="minor">
-            <a:schemeClr val="dk1"/>
-          </a:fontRef>
-        </p:style>
-        <p:txBody>
-          <a:bodyPr rtlCol="0" anchor="ctr"/>
-          <a:lstStyle/>
-          <a:p>
-            <a:pPr algn="ctr"/>
-            <a:endParaRPr lang="en-SG" sz="1050"/>
-          </a:p>
-        </p:txBody>
-      </p:sp>
       <p:cxnSp>
         <p:nvCxnSpPr>
-          <p:cNvPr id="246" name="Elbow Connector 63">
-            <a:extLst>
-              <a:ext uri="{FF2B5EF4-FFF2-40B4-BE49-F238E27FC236}">
-                <a16:creationId xmlns:a16="http://schemas.microsoft.com/office/drawing/2014/main" id="{E83DBFE0-E92A-4F52-8869-3C6BDDA369AB}"/>
+          <p:cNvPr id="97" name="Elbow Connector 78">
+            <a:extLst>
+              <a:ext uri="{FF2B5EF4-FFF2-40B4-BE49-F238E27FC236}">
+                <a16:creationId xmlns:a16="http://schemas.microsoft.com/office/drawing/2014/main" id="{CC3C9732-03A9-4E00-9B93-6711B6A180A5}"/>
               </a:ext>
             </a:extLst>
           </p:cNvPr>
           <p:cNvCxnSpPr>
-            <a:stCxn id="245" idx="3"/>
+            <a:cxnSpLocks/>
+            <a:stCxn id="247" idx="3"/>
+            <a:endCxn id="96" idx="1"/>
           </p:cNvCxnSpPr>
           <p:nvPr/>
         </p:nvCxnSpPr>
         <p:spPr>
           <a:xfrm>
-            <a:off x="3220075" y="4930665"/>
-            <a:ext cx="271892" cy="2821"/>
+            <a:off x="7267043" y="4324503"/>
+            <a:ext cx="445353" cy="1745655"/>
           </a:xfrm>
           <a:prstGeom prst="bentConnector3">
             <a:avLst>
               <a:gd name="adj1" fmla="val 50000"/>
             </a:avLst>
-          </a:prstGeom>
-          <a:ln w="19050">
-            <a:solidFill>
-              <a:srgbClr val="7030A0"/>
-            </a:solidFill>
-            <a:prstDash val="sysDot"/>
-            <a:headEnd type="none" w="med" len="med"/>
-            <a:tailEnd type="none" w="med" len="med"/>
-          </a:ln>
-          <a:effectLst/>
-        </p:spPr>
-        <p:style>
-          <a:lnRef idx="1">
-            <a:schemeClr val="accent2"/>
-          </a:lnRef>
-          <a:fillRef idx="2">
-            <a:schemeClr val="accent2"/>
-          </a:fillRef>
-          <a:effectRef idx="1">
-            <a:schemeClr val="accent2"/>
-          </a:effectRef>
-          <a:fontRef idx="minor">
-            <a:schemeClr val="dk1"/>
-          </a:fontRef>
-        </p:style>
-      </p:cxnSp>
-      <p:sp>
-        <p:nvSpPr>
-          <p:cNvPr id="247" name="Flowchart: Decision 96">
-            <a:extLst>
-              <a:ext uri="{FF2B5EF4-FFF2-40B4-BE49-F238E27FC236}">
-                <a16:creationId xmlns:a16="http://schemas.microsoft.com/office/drawing/2014/main" id="{48BFFA69-CC50-47EA-84AA-BB29052615E3}"/>
-              </a:ext>
-            </a:extLst>
-          </p:cNvPr>
-          <p:cNvSpPr/>
-          <p:nvPr/>
-        </p:nvSpPr>
-        <p:spPr>
-          <a:xfrm>
-            <a:off x="7030995" y="4237813"/>
-            <a:ext cx="236048" cy="173380"/>
-          </a:xfrm>
-          <a:prstGeom prst="flowChartDecision">
-            <a:avLst/>
-          </a:prstGeom>
-          <a:solidFill>
-            <a:srgbClr val="7030A0"/>
-          </a:solidFill>
-          <a:ln w="19050">
-            <a:solidFill>
-              <a:srgbClr val="7030A0"/>
-            </a:solidFill>
-          </a:ln>
-          <a:effectLst/>
-        </p:spPr>
-        <p:style>
-          <a:lnRef idx="1">
-            <a:schemeClr val="accent6"/>
-          </a:lnRef>
-          <a:fillRef idx="2">
-            <a:schemeClr val="accent6"/>
-          </a:fillRef>
-          <a:effectRef idx="1">
-            <a:schemeClr val="accent6"/>
-          </a:effectRef>
-          <a:fontRef idx="minor">
-            <a:schemeClr val="dk1"/>
-          </a:fontRef>
-        </p:style>
-        <p:txBody>
-          <a:bodyPr rtlCol="0" anchor="ctr"/>
-          <a:lstStyle/>
-          <a:p>
-            <a:pPr algn="ctr"/>
-            <a:endParaRPr lang="en-US" sz="1050"/>
-          </a:p>
-        </p:txBody>
-      </p:sp>
-      <p:sp>
-        <p:nvSpPr>
-          <p:cNvPr id="248" name="Rectangle 8">
-            <a:extLst>
-              <a:ext uri="{FF2B5EF4-FFF2-40B4-BE49-F238E27FC236}">
-                <a16:creationId xmlns:a16="http://schemas.microsoft.com/office/drawing/2014/main" id="{49DE0DAA-29FD-4BA9-ACA2-9A42112BEECC}"/>
-              </a:ext>
-            </a:extLst>
-          </p:cNvPr>
-          <p:cNvSpPr/>
-          <p:nvPr/>
-        </p:nvSpPr>
-        <p:spPr>
-          <a:xfrm>
-            <a:off x="7712396" y="3847007"/>
-            <a:ext cx="822003" cy="285783"/>
-          </a:xfrm>
-          <a:prstGeom prst="rect">
-            <a:avLst/>
-          </a:prstGeom>
-          <a:ln w="19050">
-            <a:solidFill>
-              <a:srgbClr val="7030A0"/>
-            </a:solidFill>
-          </a:ln>
-          <a:effectLst/>
-        </p:spPr>
-        <p:style>
-          <a:lnRef idx="1">
-            <a:schemeClr val="accent4"/>
-          </a:lnRef>
-          <a:fillRef idx="2">
-            <a:schemeClr val="accent4"/>
-          </a:fillRef>
-          <a:effectRef idx="1">
-            <a:schemeClr val="accent4"/>
-          </a:effectRef>
-          <a:fontRef idx="minor">
-            <a:schemeClr val="dk1"/>
-          </a:fontRef>
-        </p:style>
-        <p:txBody>
-          <a:bodyPr rtlCol="0" anchor="ctr"/>
-          <a:lstStyle/>
-          <a:p>
-            <a:pPr algn="ctr"/>
-            <a:r>
-              <a:rPr lang="en-US" sz="1050" dirty="0" err="1">
-                <a:solidFill>
-                  <a:srgbClr val="7030A0"/>
-                </a:solidFill>
-              </a:rPr>
-              <a:t>EventName</a:t>
-            </a:r>
-            <a:endParaRPr lang="en-SG" sz="1050" dirty="0">
-              <a:solidFill>
-                <a:srgbClr val="7030A0"/>
-              </a:solidFill>
-            </a:endParaRPr>
-          </a:p>
-        </p:txBody>
-      </p:sp>
-      <p:sp>
-        <p:nvSpPr>
-          <p:cNvPr id="249" name="Rectangle 8">
-            <a:extLst>
-              <a:ext uri="{FF2B5EF4-FFF2-40B4-BE49-F238E27FC236}">
-                <a16:creationId xmlns:a16="http://schemas.microsoft.com/office/drawing/2014/main" id="{1F847553-DF9D-45B7-92EF-F382ACEB4C63}"/>
-              </a:ext>
-            </a:extLst>
-          </p:cNvPr>
-          <p:cNvSpPr/>
-          <p:nvPr/>
-        </p:nvSpPr>
-        <p:spPr>
-          <a:xfrm>
-            <a:off x="7712396" y="4182328"/>
-            <a:ext cx="822003" cy="285783"/>
-          </a:xfrm>
-          <a:prstGeom prst="rect">
-            <a:avLst/>
-          </a:prstGeom>
-          <a:ln w="19050">
-            <a:solidFill>
-              <a:srgbClr val="7030A0"/>
-            </a:solidFill>
-          </a:ln>
-          <a:effectLst/>
-        </p:spPr>
-        <p:style>
-          <a:lnRef idx="1">
-            <a:schemeClr val="accent4"/>
-          </a:lnRef>
-          <a:fillRef idx="2">
-            <a:schemeClr val="accent4"/>
-          </a:fillRef>
-          <a:effectRef idx="1">
-            <a:schemeClr val="accent4"/>
-          </a:effectRef>
-          <a:fontRef idx="minor">
-            <a:schemeClr val="dk1"/>
-          </a:fontRef>
-        </p:style>
-        <p:txBody>
-          <a:bodyPr rtlCol="0" anchor="ctr"/>
-          <a:lstStyle/>
-          <a:p>
-            <a:pPr algn="ctr"/>
-            <a:r>
-              <a:rPr lang="en-US" sz="1050" dirty="0">
-                <a:solidFill>
-                  <a:srgbClr val="7030A0"/>
-                </a:solidFill>
-              </a:rPr>
-              <a:t>Description</a:t>
-            </a:r>
-            <a:endParaRPr lang="en-SG" sz="1050" dirty="0">
-              <a:solidFill>
-                <a:srgbClr val="7030A0"/>
-              </a:solidFill>
-            </a:endParaRPr>
-          </a:p>
-        </p:txBody>
-      </p:sp>
-      <p:sp>
-        <p:nvSpPr>
-          <p:cNvPr id="250" name="Rectangle 8">
-            <a:extLst>
-              <a:ext uri="{FF2B5EF4-FFF2-40B4-BE49-F238E27FC236}">
-                <a16:creationId xmlns:a16="http://schemas.microsoft.com/office/drawing/2014/main" id="{83F43990-05A1-4783-81C4-CEAD15CDDF78}"/>
-              </a:ext>
-            </a:extLst>
-          </p:cNvPr>
-          <p:cNvSpPr/>
-          <p:nvPr/>
-        </p:nvSpPr>
-        <p:spPr>
-          <a:xfrm>
-            <a:off x="7705136" y="4530157"/>
-            <a:ext cx="822003" cy="285783"/>
-          </a:xfrm>
-          <a:prstGeom prst="rect">
-            <a:avLst/>
-          </a:prstGeom>
-          <a:ln w="19050">
-            <a:solidFill>
-              <a:srgbClr val="7030A0"/>
-            </a:solidFill>
-          </a:ln>
-          <a:effectLst/>
-        </p:spPr>
-        <p:style>
-          <a:lnRef idx="1">
-            <a:schemeClr val="accent4"/>
-          </a:lnRef>
-          <a:fillRef idx="2">
-            <a:schemeClr val="accent4"/>
-          </a:fillRef>
-          <a:effectRef idx="1">
-            <a:schemeClr val="accent4"/>
-          </a:effectRef>
-          <a:fontRef idx="minor">
-            <a:schemeClr val="dk1"/>
-          </a:fontRef>
-        </p:style>
-        <p:txBody>
-          <a:bodyPr rtlCol="0" anchor="ctr"/>
-          <a:lstStyle/>
-          <a:p>
-            <a:pPr algn="ctr"/>
-            <a:r>
-              <a:rPr lang="en-US" sz="1050" dirty="0">
-                <a:solidFill>
-                  <a:srgbClr val="7030A0"/>
-                </a:solidFill>
-              </a:rPr>
-              <a:t>Location</a:t>
-            </a:r>
-            <a:endParaRPr lang="en-SG" sz="1050" dirty="0">
-              <a:solidFill>
-                <a:srgbClr val="7030A0"/>
-              </a:solidFill>
-            </a:endParaRPr>
-          </a:p>
-        </p:txBody>
-      </p:sp>
-      <p:sp>
-        <p:nvSpPr>
-          <p:cNvPr id="251" name="Rectangle 8">
-            <a:extLst>
-              <a:ext uri="{FF2B5EF4-FFF2-40B4-BE49-F238E27FC236}">
-                <a16:creationId xmlns:a16="http://schemas.microsoft.com/office/drawing/2014/main" id="{520AFD69-CC77-4EEE-A211-20FDDC27923B}"/>
-              </a:ext>
-            </a:extLst>
-          </p:cNvPr>
-          <p:cNvSpPr/>
-          <p:nvPr/>
-        </p:nvSpPr>
-        <p:spPr>
-          <a:xfrm>
-            <a:off x="7712395" y="4877521"/>
-            <a:ext cx="822003" cy="285783"/>
-          </a:xfrm>
-          <a:prstGeom prst="rect">
-            <a:avLst/>
-          </a:prstGeom>
-          <a:ln w="19050">
-            <a:solidFill>
-              <a:srgbClr val="7030A0"/>
-            </a:solidFill>
-          </a:ln>
-          <a:effectLst/>
-        </p:spPr>
-        <p:style>
-          <a:lnRef idx="1">
-            <a:schemeClr val="accent4"/>
-          </a:lnRef>
-          <a:fillRef idx="2">
-            <a:schemeClr val="accent4"/>
-          </a:fillRef>
-          <a:effectRef idx="1">
-            <a:schemeClr val="accent4"/>
-          </a:effectRef>
-          <a:fontRef idx="minor">
-            <a:schemeClr val="dk1"/>
-          </a:fontRef>
-        </p:style>
-        <p:txBody>
-          <a:bodyPr rtlCol="0" anchor="ctr"/>
-          <a:lstStyle/>
-          <a:p>
-            <a:pPr algn="ctr"/>
-            <a:r>
-              <a:rPr lang="en-US" sz="1050" dirty="0">
-                <a:solidFill>
-                  <a:srgbClr val="7030A0"/>
-                </a:solidFill>
-              </a:rPr>
-              <a:t>Date</a:t>
-            </a:r>
-            <a:endParaRPr lang="en-SG" sz="1050" dirty="0">
-              <a:solidFill>
-                <a:srgbClr val="7030A0"/>
-              </a:solidFill>
-            </a:endParaRPr>
-          </a:p>
-        </p:txBody>
-      </p:sp>
-      <p:sp>
-        <p:nvSpPr>
-          <p:cNvPr id="252" name="Rectangle 8">
-            <a:extLst>
-              <a:ext uri="{FF2B5EF4-FFF2-40B4-BE49-F238E27FC236}">
-                <a16:creationId xmlns:a16="http://schemas.microsoft.com/office/drawing/2014/main" id="{8D2A408E-69B8-45AF-8B49-9275841084E3}"/>
-              </a:ext>
-            </a:extLst>
-          </p:cNvPr>
-          <p:cNvSpPr/>
-          <p:nvPr/>
-        </p:nvSpPr>
-        <p:spPr>
-          <a:xfrm>
-            <a:off x="7712395" y="5230426"/>
-            <a:ext cx="822003" cy="285783"/>
-          </a:xfrm>
-          <a:prstGeom prst="rect">
-            <a:avLst/>
-          </a:prstGeom>
-          <a:ln w="19050">
-            <a:solidFill>
-              <a:srgbClr val="7030A0"/>
-            </a:solidFill>
-          </a:ln>
-          <a:effectLst/>
-        </p:spPr>
-        <p:style>
-          <a:lnRef idx="1">
-            <a:schemeClr val="accent4"/>
-          </a:lnRef>
-          <a:fillRef idx="2">
-            <a:schemeClr val="accent4"/>
-          </a:fillRef>
-          <a:effectRef idx="1">
-            <a:schemeClr val="accent4"/>
-          </a:effectRef>
-          <a:fontRef idx="minor">
-            <a:schemeClr val="dk1"/>
-          </a:fontRef>
-        </p:style>
-        <p:txBody>
-          <a:bodyPr rtlCol="0" anchor="ctr"/>
-          <a:lstStyle/>
-          <a:p>
-            <a:pPr algn="ctr"/>
-            <a:r>
-              <a:rPr lang="en-US" sz="1050" dirty="0" err="1">
-                <a:solidFill>
-                  <a:srgbClr val="7030A0"/>
-                </a:solidFill>
-              </a:rPr>
-              <a:t>StartTime</a:t>
-            </a:r>
-            <a:endParaRPr lang="en-SG" sz="1050" dirty="0">
-              <a:solidFill>
-                <a:srgbClr val="7030A0"/>
-              </a:solidFill>
-            </a:endParaRPr>
-          </a:p>
-        </p:txBody>
-      </p:sp>
-      <p:sp>
-        <p:nvSpPr>
-          <p:cNvPr id="253" name="Rectangle 8">
-            <a:extLst>
-              <a:ext uri="{FF2B5EF4-FFF2-40B4-BE49-F238E27FC236}">
-                <a16:creationId xmlns:a16="http://schemas.microsoft.com/office/drawing/2014/main" id="{C3FC6752-0256-4166-ADB7-03270C5EB22F}"/>
-              </a:ext>
-            </a:extLst>
-          </p:cNvPr>
-          <p:cNvSpPr/>
-          <p:nvPr/>
-        </p:nvSpPr>
-        <p:spPr>
-          <a:xfrm>
-            <a:off x="7712395" y="5583331"/>
-            <a:ext cx="822003" cy="285783"/>
-          </a:xfrm>
-          <a:prstGeom prst="rect">
-            <a:avLst/>
-          </a:prstGeom>
-          <a:ln w="19050">
-            <a:solidFill>
-              <a:srgbClr val="7030A0"/>
-            </a:solidFill>
-          </a:ln>
-          <a:effectLst/>
-        </p:spPr>
-        <p:style>
-          <a:lnRef idx="1">
-            <a:schemeClr val="accent4"/>
-          </a:lnRef>
-          <a:fillRef idx="2">
-            <a:schemeClr val="accent4"/>
-          </a:fillRef>
-          <a:effectRef idx="1">
-            <a:schemeClr val="accent4"/>
-          </a:effectRef>
-          <a:fontRef idx="minor">
-            <a:schemeClr val="dk1"/>
-          </a:fontRef>
-        </p:style>
-        <p:txBody>
-          <a:bodyPr rtlCol="0" anchor="ctr"/>
-          <a:lstStyle/>
-          <a:p>
-            <a:pPr algn="ctr"/>
-            <a:r>
-              <a:rPr lang="en-US" sz="1050" dirty="0" err="1">
-                <a:solidFill>
-                  <a:srgbClr val="7030A0"/>
-                </a:solidFill>
-              </a:rPr>
-              <a:t>EndTime</a:t>
-            </a:r>
-            <a:endParaRPr lang="en-SG" sz="1050" dirty="0">
-              <a:solidFill>
-                <a:srgbClr val="7030A0"/>
-              </a:solidFill>
-            </a:endParaRPr>
-          </a:p>
-        </p:txBody>
-      </p:sp>
-      <p:cxnSp>
-        <p:nvCxnSpPr>
-          <p:cNvPr id="254" name="Elbow Connector 80">
-            <a:extLst>
-              <a:ext uri="{FF2B5EF4-FFF2-40B4-BE49-F238E27FC236}">
-                <a16:creationId xmlns:a16="http://schemas.microsoft.com/office/drawing/2014/main" id="{14059A74-FBED-48B2-A63F-F54DA5CAEA2B}"/>
-              </a:ext>
-            </a:extLst>
-          </p:cNvPr>
-          <p:cNvCxnSpPr>
-            <a:cxnSpLocks/>
-            <a:stCxn id="247" idx="3"/>
-            <a:endCxn id="248" idx="1"/>
-          </p:cNvCxnSpPr>
-          <p:nvPr/>
-        </p:nvCxnSpPr>
-        <p:spPr>
-          <a:xfrm flipV="1">
-            <a:off x="7267043" y="3989899"/>
-            <a:ext cx="445353" cy="334604"/>
-          </a:xfrm>
-          <a:prstGeom prst="bentConnector3">
-            <a:avLst/>
-          </a:prstGeom>
-          <a:ln w="19050">
-            <a:solidFill>
-              <a:srgbClr val="7030A0"/>
-            </a:solidFill>
-            <a:headEnd type="none" w="med" len="med"/>
-            <a:tailEnd type="arrow" w="med" len="med"/>
-          </a:ln>
-          <a:effectLst/>
-        </p:spPr>
-        <p:style>
-          <a:lnRef idx="1">
-            <a:schemeClr val="accent2"/>
-          </a:lnRef>
-          <a:fillRef idx="2">
-            <a:schemeClr val="accent2"/>
-          </a:fillRef>
-          <a:effectRef idx="1">
-            <a:schemeClr val="accent2"/>
-          </a:effectRef>
-          <a:fontRef idx="minor">
-            <a:schemeClr val="dk1"/>
-          </a:fontRef>
-        </p:style>
-      </p:cxnSp>
-      <p:cxnSp>
-        <p:nvCxnSpPr>
-          <p:cNvPr id="255" name="Elbow Connector 80">
-            <a:extLst>
-              <a:ext uri="{FF2B5EF4-FFF2-40B4-BE49-F238E27FC236}">
-                <a16:creationId xmlns:a16="http://schemas.microsoft.com/office/drawing/2014/main" id="{FF2D7F1E-C036-4996-9F7E-E8EEF31935EB}"/>
-              </a:ext>
-            </a:extLst>
-          </p:cNvPr>
-          <p:cNvCxnSpPr>
-            <a:cxnSpLocks/>
-            <a:stCxn id="247" idx="3"/>
-            <a:endCxn id="249" idx="1"/>
-          </p:cNvCxnSpPr>
-          <p:nvPr/>
-        </p:nvCxnSpPr>
-        <p:spPr>
-          <a:xfrm>
-            <a:off x="7267043" y="4324503"/>
-            <a:ext cx="445353" cy="717"/>
-          </a:xfrm>
-          <a:prstGeom prst="bentConnector3">
-            <a:avLst/>
-          </a:prstGeom>
-          <a:ln w="19050">
-            <a:solidFill>
-              <a:srgbClr val="7030A0"/>
-            </a:solidFill>
-            <a:headEnd type="none" w="med" len="med"/>
-            <a:tailEnd type="arrow" w="med" len="med"/>
-          </a:ln>
-          <a:effectLst/>
-        </p:spPr>
-        <p:style>
-          <a:lnRef idx="1">
-            <a:schemeClr val="accent2"/>
-          </a:lnRef>
-          <a:fillRef idx="2">
-            <a:schemeClr val="accent2"/>
-          </a:fillRef>
-          <a:effectRef idx="1">
-            <a:schemeClr val="accent2"/>
-          </a:effectRef>
-          <a:fontRef idx="minor">
-            <a:schemeClr val="dk1"/>
-          </a:fontRef>
-        </p:style>
-      </p:cxnSp>
-      <p:cxnSp>
-        <p:nvCxnSpPr>
-          <p:cNvPr id="256" name="Elbow Connector 80">
-            <a:extLst>
-              <a:ext uri="{FF2B5EF4-FFF2-40B4-BE49-F238E27FC236}">
-                <a16:creationId xmlns:a16="http://schemas.microsoft.com/office/drawing/2014/main" id="{23FE1157-879A-4369-82F8-C1C9CF1239BF}"/>
-              </a:ext>
-            </a:extLst>
-          </p:cNvPr>
-          <p:cNvCxnSpPr>
-            <a:cxnSpLocks/>
-            <a:endCxn id="250" idx="1"/>
-          </p:cNvCxnSpPr>
-          <p:nvPr/>
-        </p:nvCxnSpPr>
-        <p:spPr>
-          <a:xfrm>
-            <a:off x="7277995" y="4321101"/>
-            <a:ext cx="427141" cy="351948"/>
-          </a:xfrm>
-          <a:prstGeom prst="bentConnector3">
-            <a:avLst/>
-          </a:prstGeom>
-          <a:ln w="19050">
-            <a:solidFill>
-              <a:srgbClr val="7030A0"/>
-            </a:solidFill>
-            <a:headEnd type="none" w="med" len="med"/>
-            <a:tailEnd type="arrow" w="med" len="med"/>
-          </a:ln>
-          <a:effectLst/>
-        </p:spPr>
-        <p:style>
-          <a:lnRef idx="1">
-            <a:schemeClr val="accent2"/>
-          </a:lnRef>
-          <a:fillRef idx="2">
-            <a:schemeClr val="accent2"/>
-          </a:fillRef>
-          <a:effectRef idx="1">
-            <a:schemeClr val="accent2"/>
-          </a:effectRef>
-          <a:fontRef idx="minor">
-            <a:schemeClr val="dk1"/>
-          </a:fontRef>
-        </p:style>
-      </p:cxnSp>
-      <p:cxnSp>
-        <p:nvCxnSpPr>
-          <p:cNvPr id="257" name="Elbow Connector 80">
-            <a:extLst>
-              <a:ext uri="{FF2B5EF4-FFF2-40B4-BE49-F238E27FC236}">
-                <a16:creationId xmlns:a16="http://schemas.microsoft.com/office/drawing/2014/main" id="{654DBAD8-E72C-42A4-8236-11A19663ED75}"/>
-              </a:ext>
-            </a:extLst>
-          </p:cNvPr>
-          <p:cNvCxnSpPr>
-            <a:cxnSpLocks/>
-            <a:stCxn id="247" idx="3"/>
-            <a:endCxn id="251" idx="1"/>
-          </p:cNvCxnSpPr>
-          <p:nvPr/>
-        </p:nvCxnSpPr>
-        <p:spPr>
-          <a:xfrm>
-            <a:off x="7267043" y="4324503"/>
-            <a:ext cx="445352" cy="695910"/>
-          </a:xfrm>
-          <a:prstGeom prst="bentConnector3">
-            <a:avLst/>
-          </a:prstGeom>
-          <a:ln w="19050">
-            <a:solidFill>
-              <a:srgbClr val="7030A0"/>
-            </a:solidFill>
-            <a:headEnd type="none" w="med" len="med"/>
-            <a:tailEnd type="arrow" w="med" len="med"/>
-          </a:ln>
-          <a:effectLst/>
-        </p:spPr>
-        <p:style>
-          <a:lnRef idx="1">
-            <a:schemeClr val="accent2"/>
-          </a:lnRef>
-          <a:fillRef idx="2">
-            <a:schemeClr val="accent2"/>
-          </a:fillRef>
-          <a:effectRef idx="1">
-            <a:schemeClr val="accent2"/>
-          </a:effectRef>
-          <a:fontRef idx="minor">
-            <a:schemeClr val="dk1"/>
-          </a:fontRef>
-        </p:style>
-      </p:cxnSp>
-      <p:cxnSp>
-        <p:nvCxnSpPr>
-          <p:cNvPr id="258" name="Elbow Connector 80">
-            <a:extLst>
-              <a:ext uri="{FF2B5EF4-FFF2-40B4-BE49-F238E27FC236}">
-                <a16:creationId xmlns:a16="http://schemas.microsoft.com/office/drawing/2014/main" id="{65131DEE-19D9-4462-8AA2-80946A8C00D3}"/>
-              </a:ext>
-            </a:extLst>
-          </p:cNvPr>
-          <p:cNvCxnSpPr>
-            <a:cxnSpLocks/>
-            <a:stCxn id="247" idx="3"/>
-            <a:endCxn id="252" idx="1"/>
-          </p:cNvCxnSpPr>
-          <p:nvPr/>
-        </p:nvCxnSpPr>
-        <p:spPr>
-          <a:xfrm>
-            <a:off x="7267043" y="4324503"/>
-            <a:ext cx="445352" cy="1048815"/>
-          </a:xfrm>
-          <a:prstGeom prst="bentConnector3">
-            <a:avLst>
-              <a:gd name="adj1" fmla="val 50000"/>
-            </a:avLst>
-          </a:prstGeom>
-          <a:ln w="19050">
-            <a:solidFill>
-              <a:srgbClr val="7030A0"/>
-            </a:solidFill>
-            <a:headEnd type="none" w="med" len="med"/>
-            <a:tailEnd type="arrow" w="med" len="med"/>
-          </a:ln>
-          <a:effectLst/>
-        </p:spPr>
-        <p:style>
-          <a:lnRef idx="1">
-            <a:schemeClr val="accent2"/>
-          </a:lnRef>
-          <a:fillRef idx="2">
-            <a:schemeClr val="accent2"/>
-          </a:fillRef>
-          <a:effectRef idx="1">
-            <a:schemeClr val="accent2"/>
-          </a:effectRef>
-          <a:fontRef idx="minor">
-            <a:schemeClr val="dk1"/>
-          </a:fontRef>
-        </p:style>
-      </p:cxnSp>
-      <p:cxnSp>
-        <p:nvCxnSpPr>
-          <p:cNvPr id="259" name="Elbow Connector 80">
-            <a:extLst>
-              <a:ext uri="{FF2B5EF4-FFF2-40B4-BE49-F238E27FC236}">
-                <a16:creationId xmlns:a16="http://schemas.microsoft.com/office/drawing/2014/main" id="{71DA4A65-45BA-41B4-851C-A8143393B315}"/>
-              </a:ext>
-            </a:extLst>
-          </p:cNvPr>
-          <p:cNvCxnSpPr>
-            <a:cxnSpLocks/>
-            <a:stCxn id="247" idx="3"/>
-            <a:endCxn id="253" idx="1"/>
-          </p:cNvCxnSpPr>
-          <p:nvPr/>
-        </p:nvCxnSpPr>
-        <p:spPr>
-          <a:xfrm>
-            <a:off x="7267043" y="4324503"/>
-            <a:ext cx="445352" cy="1401720"/>
-          </a:xfrm>
-          <a:prstGeom prst="bentConnector3">
-            <a:avLst>
-              <a:gd name="adj1" fmla="val 50000"/>
-            </a:avLst>
-          </a:prstGeom>
-          <a:ln w="19050">
-            <a:solidFill>
-              <a:srgbClr val="7030A0"/>
-            </a:solidFill>
-            <a:headEnd type="none" w="med" len="med"/>
-            <a:tailEnd type="arrow" w="med" len="med"/>
-          </a:ln>
-          <a:effectLst/>
-        </p:spPr>
-        <p:style>
-          <a:lnRef idx="1">
-            <a:schemeClr val="accent2"/>
-          </a:lnRef>
-          <a:fillRef idx="2">
-            <a:schemeClr val="accent2"/>
-          </a:fillRef>
-          <a:effectRef idx="1">
-            <a:schemeClr val="accent2"/>
-          </a:effectRef>
-          <a:fontRef idx="minor">
-            <a:schemeClr val="dk1"/>
-          </a:fontRef>
-        </p:style>
-      </p:cxnSp>
-      <p:sp>
-        <p:nvSpPr>
-          <p:cNvPr id="260" name="TextBox 259">
-            <a:extLst>
-              <a:ext uri="{FF2B5EF4-FFF2-40B4-BE49-F238E27FC236}">
-                <a16:creationId xmlns:a16="http://schemas.microsoft.com/office/drawing/2014/main" id="{CCDF2DC3-34B2-4C97-93C5-37F8D0807DA3}"/>
-              </a:ext>
-            </a:extLst>
-          </p:cNvPr>
-          <p:cNvSpPr txBox="1"/>
-          <p:nvPr/>
-        </p:nvSpPr>
-        <p:spPr>
-          <a:xfrm>
-            <a:off x="6456384" y="3949785"/>
-            <a:ext cx="189257" cy="178683"/>
-          </a:xfrm>
-          <a:prstGeom prst="rect">
-            <a:avLst/>
-          </a:prstGeom>
-          <a:noFill/>
-        </p:spPr>
-        <p:txBody>
-          <a:bodyPr wrap="square" lIns="0" tIns="0" rIns="0" bIns="0" rtlCol="0">
-            <a:noAutofit/>
-          </a:bodyPr>
-          <a:lstStyle/>
-          <a:p>
-            <a:pPr algn="ctr"/>
-            <a:r>
-              <a:rPr lang="en-US" sz="1100" dirty="0">
-                <a:solidFill>
-                  <a:srgbClr val="7030A0"/>
-                </a:solidFill>
-              </a:rPr>
-              <a:t>1</a:t>
-            </a:r>
-            <a:endParaRPr lang="en-SG" sz="1100" dirty="0">
-              <a:solidFill>
-                <a:srgbClr val="7030A0"/>
-              </a:solidFill>
-            </a:endParaRPr>
-          </a:p>
-        </p:txBody>
-      </p:sp>
-      <p:sp>
-        <p:nvSpPr>
-          <p:cNvPr id="261" name="Rectangle 8">
-            <a:extLst>
-              <a:ext uri="{FF2B5EF4-FFF2-40B4-BE49-F238E27FC236}">
-                <a16:creationId xmlns:a16="http://schemas.microsoft.com/office/drawing/2014/main" id="{40440DB0-D254-468E-8668-44A057684A94}"/>
-              </a:ext>
-            </a:extLst>
-          </p:cNvPr>
-          <p:cNvSpPr/>
-          <p:nvPr/>
-        </p:nvSpPr>
-        <p:spPr>
-          <a:xfrm>
-            <a:off x="4780047" y="1933935"/>
-            <a:ext cx="1156969" cy="285783"/>
-          </a:xfrm>
-          <a:prstGeom prst="rect">
-            <a:avLst/>
-          </a:prstGeom>
-          <a:ln w="19050">
-            <a:solidFill>
-              <a:srgbClr val="7030A0"/>
-            </a:solidFill>
-          </a:ln>
-          <a:effectLst/>
-        </p:spPr>
-        <p:style>
-          <a:lnRef idx="1">
-            <a:schemeClr val="accent4"/>
-          </a:lnRef>
-          <a:fillRef idx="2">
-            <a:schemeClr val="accent4"/>
-          </a:fillRef>
-          <a:effectRef idx="1">
-            <a:schemeClr val="accent4"/>
-          </a:effectRef>
-          <a:fontRef idx="minor">
-            <a:schemeClr val="dk1"/>
-          </a:fontRef>
-        </p:style>
-        <p:txBody>
-          <a:bodyPr rtlCol="0" anchor="ctr"/>
-          <a:lstStyle/>
-          <a:p>
-            <a:pPr algn="ctr"/>
-            <a:r>
-              <a:rPr lang="en-US" sz="1050" dirty="0" err="1">
-                <a:solidFill>
-                  <a:srgbClr val="7030A0"/>
-                </a:solidFill>
-              </a:rPr>
-              <a:t>UniqueTagList</a:t>
-            </a:r>
-            <a:endParaRPr lang="en-SG" sz="1050" dirty="0">
-              <a:solidFill>
-                <a:srgbClr val="7030A0"/>
-              </a:solidFill>
-            </a:endParaRPr>
-          </a:p>
-        </p:txBody>
-      </p:sp>
-      <p:cxnSp>
-        <p:nvCxnSpPr>
-          <p:cNvPr id="262" name="Elbow Connector 78">
-            <a:extLst>
-              <a:ext uri="{FF2B5EF4-FFF2-40B4-BE49-F238E27FC236}">
-                <a16:creationId xmlns:a16="http://schemas.microsoft.com/office/drawing/2014/main" id="{1B5CC598-D1F7-4158-AE10-30CB5A318697}"/>
-              </a:ext>
-            </a:extLst>
-          </p:cNvPr>
-          <p:cNvCxnSpPr>
-            <a:cxnSpLocks/>
-            <a:endCxn id="261" idx="1"/>
-          </p:cNvCxnSpPr>
-          <p:nvPr/>
-        </p:nvCxnSpPr>
-        <p:spPr>
-          <a:xfrm rot="5400000" flipH="1" flipV="1">
-            <a:off x="4257356" y="2263248"/>
-            <a:ext cx="709111" cy="336271"/>
-          </a:xfrm>
-          <a:prstGeom prst="bentConnector2">
-            <a:avLst/>
-          </a:prstGeom>
-          <a:ln w="19050">
-            <a:solidFill>
-              <a:srgbClr val="7030A0"/>
-            </a:solidFill>
-            <a:headEnd type="none" w="med" len="med"/>
-            <a:tailEnd type="arrow" w="med" len="med"/>
-          </a:ln>
-          <a:effectLst/>
-        </p:spPr>
-        <p:style>
-          <a:lnRef idx="1">
-            <a:schemeClr val="accent2"/>
-          </a:lnRef>
-          <a:fillRef idx="2">
-            <a:schemeClr val="accent2"/>
-          </a:fillRef>
-          <a:effectRef idx="1">
-            <a:schemeClr val="accent2"/>
-          </a:effectRef>
-          <a:fontRef idx="minor">
-            <a:schemeClr val="dk1"/>
-          </a:fontRef>
-        </p:style>
-      </p:cxnSp>
-      <p:sp>
-        <p:nvSpPr>
-          <p:cNvPr id="263" name="TextBox 262">
-            <a:extLst>
-              <a:ext uri="{FF2B5EF4-FFF2-40B4-BE49-F238E27FC236}">
-                <a16:creationId xmlns:a16="http://schemas.microsoft.com/office/drawing/2014/main" id="{036C3F31-C28C-4690-B68D-5533FF17B32C}"/>
-              </a:ext>
-            </a:extLst>
-          </p:cNvPr>
-          <p:cNvSpPr txBox="1"/>
-          <p:nvPr/>
-        </p:nvSpPr>
-        <p:spPr>
-          <a:xfrm>
-            <a:off x="6738519" y="2157795"/>
-            <a:ext cx="189257" cy="178683"/>
-          </a:xfrm>
-          <a:prstGeom prst="rect">
-            <a:avLst/>
-          </a:prstGeom>
-          <a:noFill/>
-        </p:spPr>
-        <p:txBody>
-          <a:bodyPr wrap="square" lIns="0" tIns="0" rIns="0" bIns="0" rtlCol="0">
-            <a:noAutofit/>
-          </a:bodyPr>
-          <a:lstStyle/>
-          <a:p>
-            <a:pPr algn="ctr"/>
-            <a:r>
-              <a:rPr lang="en-US" sz="1100" dirty="0">
-                <a:solidFill>
-                  <a:srgbClr val="7030A0"/>
-                </a:solidFill>
-              </a:rPr>
-              <a:t>*</a:t>
-            </a:r>
-            <a:endParaRPr lang="en-SG" sz="1100" dirty="0">
-              <a:solidFill>
-                <a:srgbClr val="7030A0"/>
-              </a:solidFill>
-            </a:endParaRPr>
-          </a:p>
-        </p:txBody>
-      </p:sp>
-      <p:sp>
-        <p:nvSpPr>
-          <p:cNvPr id="264" name="Flowchart: Decision 96">
-            <a:extLst>
-              <a:ext uri="{FF2B5EF4-FFF2-40B4-BE49-F238E27FC236}">
-                <a16:creationId xmlns:a16="http://schemas.microsoft.com/office/drawing/2014/main" id="{9785EFD0-EF50-48C3-B7BC-AF13AD39E7C4}"/>
-              </a:ext>
-            </a:extLst>
-          </p:cNvPr>
-          <p:cNvSpPr/>
-          <p:nvPr/>
-        </p:nvSpPr>
-        <p:spPr>
-          <a:xfrm rot="16200000">
-            <a:off x="6577440" y="2521046"/>
-            <a:ext cx="236048" cy="173380"/>
-          </a:xfrm>
-          <a:prstGeom prst="flowChartDecision">
-            <a:avLst/>
-          </a:prstGeom>
-          <a:noFill/>
-          <a:ln w="19050">
-            <a:solidFill>
-              <a:srgbClr val="7030A0"/>
-            </a:solidFill>
-          </a:ln>
-          <a:effectLst/>
-        </p:spPr>
-        <p:style>
-          <a:lnRef idx="1">
-            <a:schemeClr val="accent6"/>
-          </a:lnRef>
-          <a:fillRef idx="2">
-            <a:schemeClr val="accent6"/>
-          </a:fillRef>
-          <a:effectRef idx="1">
-            <a:schemeClr val="accent6"/>
-          </a:effectRef>
-          <a:fontRef idx="minor">
-            <a:schemeClr val="dk1"/>
-          </a:fontRef>
-        </p:style>
-        <p:txBody>
-          <a:bodyPr rtlCol="0" anchor="ctr"/>
-          <a:lstStyle/>
-          <a:p>
-            <a:pPr algn="ctr"/>
-            <a:endParaRPr lang="en-US" sz="1050"/>
-          </a:p>
-        </p:txBody>
-      </p:sp>
-      <p:cxnSp>
-        <p:nvCxnSpPr>
-          <p:cNvPr id="265" name="Elbow Connector 63">
-            <a:extLst>
-              <a:ext uri="{FF2B5EF4-FFF2-40B4-BE49-F238E27FC236}">
-                <a16:creationId xmlns:a16="http://schemas.microsoft.com/office/drawing/2014/main" id="{CD3147BD-CB71-4290-BD5E-DBBF3BA83AC7}"/>
-              </a:ext>
-            </a:extLst>
-          </p:cNvPr>
-          <p:cNvCxnSpPr>
-            <a:cxnSpLocks/>
-            <a:endCxn id="266" idx="1"/>
-          </p:cNvCxnSpPr>
-          <p:nvPr/>
-        </p:nvCxnSpPr>
-        <p:spPr>
-          <a:xfrm flipV="1">
-            <a:off x="5908455" y="1960080"/>
-            <a:ext cx="432916" cy="111294"/>
-          </a:xfrm>
-          <a:prstGeom prst="bentConnector3">
-            <a:avLst/>
-          </a:prstGeom>
-          <a:ln w="19050">
-            <a:solidFill>
-              <a:srgbClr val="7030A0"/>
-            </a:solidFill>
-            <a:headEnd type="none" w="med" len="med"/>
-            <a:tailEnd type="arrow" w="med" len="med"/>
-          </a:ln>
-          <a:effectLst/>
-        </p:spPr>
-        <p:style>
-          <a:lnRef idx="1">
-            <a:schemeClr val="accent2"/>
-          </a:lnRef>
-          <a:fillRef idx="2">
-            <a:schemeClr val="accent2"/>
-          </a:fillRef>
-          <a:effectRef idx="1">
-            <a:schemeClr val="accent2"/>
-          </a:effectRef>
-          <a:fontRef idx="minor">
-            <a:schemeClr val="dk1"/>
-          </a:fontRef>
-        </p:style>
-      </p:cxnSp>
-      <p:sp>
-        <p:nvSpPr>
-          <p:cNvPr id="266" name="Rectangle 8">
-            <a:extLst>
-              <a:ext uri="{FF2B5EF4-FFF2-40B4-BE49-F238E27FC236}">
-                <a16:creationId xmlns:a16="http://schemas.microsoft.com/office/drawing/2014/main" id="{88A6E12A-4257-4782-8709-FF8EF2B63ED0}"/>
-              </a:ext>
-            </a:extLst>
-          </p:cNvPr>
-          <p:cNvSpPr/>
-          <p:nvPr/>
-        </p:nvSpPr>
-        <p:spPr>
-          <a:xfrm>
-            <a:off x="6341371" y="1786700"/>
-            <a:ext cx="708186" cy="346760"/>
-          </a:xfrm>
-          <a:prstGeom prst="rect">
-            <a:avLst/>
-          </a:prstGeom>
-          <a:ln w="19050">
-            <a:solidFill>
-              <a:srgbClr val="7030A0"/>
-            </a:solidFill>
-          </a:ln>
-          <a:effectLst/>
-        </p:spPr>
-        <p:style>
-          <a:lnRef idx="1">
-            <a:schemeClr val="accent4"/>
-          </a:lnRef>
-          <a:fillRef idx="2">
-            <a:schemeClr val="accent4"/>
-          </a:fillRef>
-          <a:effectRef idx="1">
-            <a:schemeClr val="accent4"/>
-          </a:effectRef>
-          <a:fontRef idx="minor">
-            <a:schemeClr val="dk1"/>
-          </a:fontRef>
-        </p:style>
-        <p:txBody>
-          <a:bodyPr rtlCol="0" anchor="ctr"/>
-          <a:lstStyle/>
-          <a:p>
-            <a:pPr algn="ctr"/>
-            <a:r>
-              <a:rPr lang="en-US" sz="1050" dirty="0">
-                <a:solidFill>
-                  <a:srgbClr val="7030A0"/>
-                </a:solidFill>
-              </a:rPr>
-              <a:t>Tag</a:t>
-            </a:r>
-            <a:endParaRPr lang="en-SG" sz="1050" dirty="0">
-              <a:solidFill>
-                <a:srgbClr val="7030A0"/>
-              </a:solidFill>
-            </a:endParaRPr>
-          </a:p>
-        </p:txBody>
-      </p:sp>
-      <p:sp>
-        <p:nvSpPr>
-          <p:cNvPr id="267" name="TextBox 266">
-            <a:extLst>
-              <a:ext uri="{FF2B5EF4-FFF2-40B4-BE49-F238E27FC236}">
-                <a16:creationId xmlns:a16="http://schemas.microsoft.com/office/drawing/2014/main" id="{FE64F77B-DFCA-4865-8A67-5636D4BC0CE3}"/>
-              </a:ext>
-            </a:extLst>
-          </p:cNvPr>
-          <p:cNvSpPr txBox="1"/>
-          <p:nvPr/>
-        </p:nvSpPr>
-        <p:spPr>
-          <a:xfrm>
-            <a:off x="6159431" y="2005088"/>
-            <a:ext cx="189257" cy="178683"/>
-          </a:xfrm>
-          <a:prstGeom prst="rect">
-            <a:avLst/>
-          </a:prstGeom>
-          <a:noFill/>
-        </p:spPr>
-        <p:txBody>
-          <a:bodyPr wrap="square" lIns="0" tIns="0" rIns="0" bIns="0" rtlCol="0">
-            <a:noAutofit/>
-          </a:bodyPr>
-          <a:lstStyle/>
-          <a:p>
-            <a:pPr algn="ctr"/>
-            <a:r>
-              <a:rPr lang="en-US" sz="1100" dirty="0">
-                <a:solidFill>
-                  <a:srgbClr val="7030A0"/>
-                </a:solidFill>
-              </a:rPr>
-              <a:t>*</a:t>
-            </a:r>
-            <a:endParaRPr lang="en-SG" sz="1100" dirty="0">
-              <a:solidFill>
-                <a:srgbClr val="7030A0"/>
-              </a:solidFill>
-            </a:endParaRPr>
-          </a:p>
-        </p:txBody>
-      </p:sp>
-      <p:sp>
-        <p:nvSpPr>
-          <p:cNvPr id="268" name="TextBox 267">
-            <a:extLst>
-              <a:ext uri="{FF2B5EF4-FFF2-40B4-BE49-F238E27FC236}">
-                <a16:creationId xmlns:a16="http://schemas.microsoft.com/office/drawing/2014/main" id="{DEBAD80E-9558-4545-9B5C-1011497635DE}"/>
-              </a:ext>
-            </a:extLst>
-          </p:cNvPr>
-          <p:cNvSpPr txBox="1"/>
-          <p:nvPr/>
-        </p:nvSpPr>
-        <p:spPr>
-          <a:xfrm>
-            <a:off x="4391275" y="1900046"/>
-            <a:ext cx="189257" cy="178683"/>
-          </a:xfrm>
-          <a:prstGeom prst="rect">
-            <a:avLst/>
-          </a:prstGeom>
-          <a:noFill/>
-        </p:spPr>
-        <p:txBody>
-          <a:bodyPr wrap="square" lIns="0" tIns="0" rIns="0" bIns="0" rtlCol="0">
-            <a:noAutofit/>
-          </a:bodyPr>
-          <a:lstStyle/>
-          <a:p>
-            <a:pPr algn="ctr"/>
-            <a:r>
-              <a:rPr lang="en-US" sz="1100" dirty="0">
-                <a:solidFill>
-                  <a:srgbClr val="7030A0"/>
-                </a:solidFill>
-              </a:rPr>
-              <a:t>1</a:t>
-            </a:r>
-            <a:endParaRPr lang="en-SG" sz="1100" dirty="0">
-              <a:solidFill>
-                <a:srgbClr val="7030A0"/>
-              </a:solidFill>
-            </a:endParaRPr>
-          </a:p>
-        </p:txBody>
-      </p:sp>
-      <p:sp>
-        <p:nvSpPr>
-          <p:cNvPr id="269" name="Flowchart: Decision 96">
-            <a:extLst>
-              <a:ext uri="{FF2B5EF4-FFF2-40B4-BE49-F238E27FC236}">
-                <a16:creationId xmlns:a16="http://schemas.microsoft.com/office/drawing/2014/main" id="{706253E2-1226-4B48-A404-BCE6BDD4745D}"/>
-              </a:ext>
-            </a:extLst>
-          </p:cNvPr>
-          <p:cNvSpPr/>
-          <p:nvPr/>
-        </p:nvSpPr>
-        <p:spPr>
-          <a:xfrm>
-            <a:off x="5935504" y="1989155"/>
-            <a:ext cx="236048" cy="173380"/>
-          </a:xfrm>
-          <a:prstGeom prst="flowChartDecision">
-            <a:avLst/>
-          </a:prstGeom>
-          <a:solidFill>
-            <a:srgbClr val="7030A0"/>
-          </a:solidFill>
-          <a:ln w="19050">
-            <a:solidFill>
-              <a:srgbClr val="7030A0"/>
-            </a:solidFill>
-          </a:ln>
-          <a:effectLst/>
-        </p:spPr>
-        <p:style>
-          <a:lnRef idx="1">
-            <a:schemeClr val="accent6"/>
-          </a:lnRef>
-          <a:fillRef idx="2">
-            <a:schemeClr val="accent6"/>
-          </a:fillRef>
-          <a:effectRef idx="1">
-            <a:schemeClr val="accent6"/>
-          </a:effectRef>
-          <a:fontRef idx="minor">
-            <a:schemeClr val="dk1"/>
-          </a:fontRef>
-        </p:style>
-        <p:txBody>
-          <a:bodyPr rtlCol="0" anchor="ctr"/>
-          <a:lstStyle/>
-          <a:p>
-            <a:pPr algn="ctr"/>
-            <a:endParaRPr lang="en-US" sz="1050"/>
-          </a:p>
-        </p:txBody>
-      </p:sp>
-      <p:cxnSp>
-        <p:nvCxnSpPr>
-          <p:cNvPr id="270" name="Elbow Connector 63">
-            <a:extLst>
-              <a:ext uri="{FF2B5EF4-FFF2-40B4-BE49-F238E27FC236}">
-                <a16:creationId xmlns:a16="http://schemas.microsoft.com/office/drawing/2014/main" id="{C87BABFE-EDB5-4B1E-891B-C51B3268DDE7}"/>
-              </a:ext>
-            </a:extLst>
-          </p:cNvPr>
-          <p:cNvCxnSpPr>
-            <a:cxnSpLocks/>
-            <a:stCxn id="264" idx="3"/>
-            <a:endCxn id="266" idx="2"/>
-          </p:cNvCxnSpPr>
-          <p:nvPr/>
-        </p:nvCxnSpPr>
-        <p:spPr>
-          <a:xfrm rot="5400000" flipH="1" flipV="1">
-            <a:off x="6517338" y="2311586"/>
-            <a:ext cx="356252" cy="12700"/>
-          </a:xfrm>
-          <a:prstGeom prst="bentConnector3">
-            <a:avLst/>
           </a:prstGeom>
           <a:ln w="19050">
             <a:solidFill>

</xml_diff>